<commit_message>
Update Status Report - Modelo Padrão.pptx
</commit_message>
<xml_diff>
--- a/Status Report - Modelo Padrão.pptx
+++ b/Status Report - Modelo Padrão.pptx
@@ -10,7 +10,7 @@
   <p:sldIdLst>
     <p:sldId id="2142534752" r:id="rId5"/>
     <p:sldId id="2142534755" r:id="rId6"/>
-    <p:sldId id="2142534756" r:id="rId7"/>
+    <p:sldId id="2142534757" r:id="rId7"/>
   </p:sldIdLst>
   <p:sldSz cx="12192000" cy="6858000"/>
   <p:notesSz cx="6858000" cy="9144000"/>
@@ -238,7 +238,7 @@
           <a:p>
             <a:fld id="{847D26F8-AAA9-4A39-955F-B6FCA9E32DCC}" type="datetimeFigureOut">
               <a:rPr lang="pt-BR" smtClean="0"/>
-              <a:t>22/10/2024</a:t>
+              <a:t>01/11/2024</a:t>
             </a:fld>
             <a:endParaRPr lang="pt-BR"/>
           </a:p>
@@ -918,7 +918,7 @@
           <a:p>
             <a:fld id="{2D7C807E-92A2-4308-9314-7543783FA94F}" type="datetimeFigureOut">
               <a:rPr lang="pt-BR" smtClean="0"/>
-              <a:t>22/10/2024</a:t>
+              <a:t>01/11/2024</a:t>
             </a:fld>
             <a:endParaRPr lang="pt-BR"/>
           </a:p>
@@ -1156,7 +1156,7 @@
           <a:p>
             <a:fld id="{2D7C807E-92A2-4308-9314-7543783FA94F}" type="datetimeFigureOut">
               <a:rPr lang="pt-BR" smtClean="0"/>
-              <a:t>22/10/2024</a:t>
+              <a:t>01/11/2024</a:t>
             </a:fld>
             <a:endParaRPr lang="pt-BR"/>
           </a:p>
@@ -1394,7 +1394,7 @@
           <a:p>
             <a:fld id="{2D7C807E-92A2-4308-9314-7543783FA94F}" type="datetimeFigureOut">
               <a:rPr lang="pt-BR" smtClean="0"/>
-              <a:t>22/10/2024</a:t>
+              <a:t>01/11/2024</a:t>
             </a:fld>
             <a:endParaRPr lang="pt-BR"/>
           </a:p>
@@ -1632,7 +1632,7 @@
           <a:p>
             <a:fld id="{2D7C807E-92A2-4308-9314-7543783FA94F}" type="datetimeFigureOut">
               <a:rPr lang="pt-BR" smtClean="0"/>
-              <a:t>22/10/2024</a:t>
+              <a:t>01/11/2024</a:t>
             </a:fld>
             <a:endParaRPr lang="pt-BR"/>
           </a:p>
@@ -1937,7 +1937,7 @@
           <a:p>
             <a:fld id="{2D7C807E-92A2-4308-9314-7543783FA94F}" type="datetimeFigureOut">
               <a:rPr lang="pt-BR" smtClean="0"/>
-              <a:t>22/10/2024</a:t>
+              <a:t>01/11/2024</a:t>
             </a:fld>
             <a:endParaRPr lang="pt-BR"/>
           </a:p>
@@ -2240,7 +2240,7 @@
           <a:p>
             <a:fld id="{2D7C807E-92A2-4308-9314-7543783FA94F}" type="datetimeFigureOut">
               <a:rPr lang="pt-BR" smtClean="0"/>
-              <a:t>22/10/2024</a:t>
+              <a:t>01/11/2024</a:t>
             </a:fld>
             <a:endParaRPr lang="pt-BR"/>
           </a:p>
@@ -2691,7 +2691,7 @@
           <a:p>
             <a:fld id="{2D7C807E-92A2-4308-9314-7543783FA94F}" type="datetimeFigureOut">
               <a:rPr lang="pt-BR" smtClean="0"/>
-              <a:t>22/10/2024</a:t>
+              <a:t>01/11/2024</a:t>
             </a:fld>
             <a:endParaRPr lang="pt-BR"/>
           </a:p>
@@ -2864,7 +2864,7 @@
           <a:p>
             <a:fld id="{2D7C807E-92A2-4308-9314-7543783FA94F}" type="datetimeFigureOut">
               <a:rPr lang="pt-BR" smtClean="0"/>
-              <a:t>22/10/2024</a:t>
+              <a:t>01/11/2024</a:t>
             </a:fld>
             <a:endParaRPr lang="pt-BR"/>
           </a:p>
@@ -3001,7 +3001,7 @@
           <a:p>
             <a:fld id="{2D7C807E-92A2-4308-9314-7543783FA94F}" type="datetimeFigureOut">
               <a:rPr lang="pt-BR" smtClean="0"/>
-              <a:t>22/10/2024</a:t>
+              <a:t>01/11/2024</a:t>
             </a:fld>
             <a:endParaRPr lang="pt-BR"/>
           </a:p>
@@ -3345,7 +3345,7 @@
           <a:p>
             <a:fld id="{2D7C807E-92A2-4308-9314-7543783FA94F}" type="datetimeFigureOut">
               <a:rPr lang="pt-BR" smtClean="0"/>
-              <a:t>22/10/2024</a:t>
+              <a:t>01/11/2024</a:t>
             </a:fld>
             <a:endParaRPr lang="pt-BR"/>
           </a:p>
@@ -3666,7 +3666,7 @@
           <a:p>
             <a:fld id="{2D7C807E-92A2-4308-9314-7543783FA94F}" type="datetimeFigureOut">
               <a:rPr lang="pt-BR" smtClean="0"/>
-              <a:t>22/10/2024</a:t>
+              <a:t>01/11/2024</a:t>
             </a:fld>
             <a:endParaRPr lang="pt-BR"/>
           </a:p>
@@ -13813,14 +13813,6 @@
 <file path=ppt/slides/slide3.xml><?xml version="1.0" encoding="utf-8"?>
 <p:sld xmlns:a="http://schemas.openxmlformats.org/drawingml/2006/main" xmlns:r="http://schemas.openxmlformats.org/officeDocument/2006/relationships" xmlns:p="http://schemas.openxmlformats.org/presentationml/2006/main">
   <p:cSld>
-    <p:bg>
-      <p:bgPr>
-        <a:solidFill>
-          <a:schemeClr val="bg1"/>
-        </a:solidFill>
-        <a:effectLst/>
-      </p:bgPr>
-    </p:bg>
     <p:spTree>
       <p:nvGrpSpPr>
         <p:cNvPr id="1" name=""/>
@@ -14199,7 +14191,7 @@
                 <a:ea typeface="Calibri"/>
                 <a:cs typeface="Arial"/>
               </a:rPr>
-              <a:t>Atualizado em 17/10/2024</a:t>
+              <a:t>Atualizado em 01/11/2024</a:t>
             </a:r>
             <a:endParaRPr lang="pt-BR" altLang="pt-BR" sz="1400" dirty="0">
               <a:solidFill>
@@ -14308,8 +14300,8 @@
         </p:nvSpPr>
         <p:spPr>
           <a:xfrm>
-            <a:off x="2838001" y="1180097"/>
-            <a:ext cx="8981999" cy="1008000"/>
+            <a:off x="2786340" y="1180097"/>
+            <a:ext cx="6179389" cy="930509"/>
           </a:xfrm>
           <a:prstGeom prst="roundRect">
             <a:avLst>
@@ -14380,7 +14372,7 @@
         </p:nvSpPr>
         <p:spPr>
           <a:xfrm>
-            <a:off x="5143239" y="1058641"/>
+            <a:off x="3632154" y="1058641"/>
             <a:ext cx="4284551" cy="252000"/>
           </a:xfrm>
           <a:prstGeom prst="roundRect">
@@ -14876,2068 +14868,6 @@
           </a:p>
         </p:txBody>
       </p:sp>
-      <p:graphicFrame>
-        <p:nvGraphicFramePr>
-          <p:cNvPr id="21" name="Tabela 20">
-            <a:extLst>
-              <a:ext uri="{FF2B5EF4-FFF2-40B4-BE49-F238E27FC236}">
-                <a16:creationId xmlns:a16="http://schemas.microsoft.com/office/drawing/2014/main" id="{4C8CBB5C-AAB1-43C4-82CE-991EEFD4B0FD}"/>
-              </a:ext>
-            </a:extLst>
-          </p:cNvPr>
-          <p:cNvGraphicFramePr>
-            <a:graphicFrameLocks noGrp="1"/>
-          </p:cNvGraphicFramePr>
-          <p:nvPr>
-            <p:extLst/>
-          </p:nvPr>
-        </p:nvGraphicFramePr>
-        <p:xfrm>
-          <a:off x="587578" y="4240453"/>
-          <a:ext cx="2598965" cy="2016000"/>
-        </p:xfrm>
-        <a:graphic>
-          <a:graphicData uri="http://schemas.openxmlformats.org/drawingml/2006/table">
-            <a:tbl>
-              <a:tblPr>
-                <a:tableStyleId>{5C22544A-7EE6-4342-B048-85BDC9FD1C3A}</a:tableStyleId>
-              </a:tblPr>
-              <a:tblGrid>
-                <a:gridCol w="252000">
-                  <a:extLst>
-                    <a:ext uri="{9D8B030D-6E8A-4147-A177-3AD203B41FA5}">
-                      <a16:colId xmlns:a16="http://schemas.microsoft.com/office/drawing/2014/main" val="2659013763"/>
-                    </a:ext>
-                  </a:extLst>
-                </a:gridCol>
-                <a:gridCol w="78965">
-                  <a:extLst>
-                    <a:ext uri="{9D8B030D-6E8A-4147-A177-3AD203B41FA5}">
-                      <a16:colId xmlns:a16="http://schemas.microsoft.com/office/drawing/2014/main" val="3408455369"/>
-                    </a:ext>
-                  </a:extLst>
-                </a:gridCol>
-                <a:gridCol w="1512000">
-                  <a:extLst>
-                    <a:ext uri="{9D8B030D-6E8A-4147-A177-3AD203B41FA5}">
-                      <a16:colId xmlns:a16="http://schemas.microsoft.com/office/drawing/2014/main" val="4128488300"/>
-                    </a:ext>
-                  </a:extLst>
-                </a:gridCol>
-                <a:gridCol w="756000">
-                  <a:extLst>
-                    <a:ext uri="{9D8B030D-6E8A-4147-A177-3AD203B41FA5}">
-                      <a16:colId xmlns:a16="http://schemas.microsoft.com/office/drawing/2014/main" val="4197296562"/>
-                    </a:ext>
-                  </a:extLst>
-                </a:gridCol>
-              </a:tblGrid>
-              <a:tr h="252000">
-                <a:tc>
-                  <a:txBody>
-                    <a:bodyPr/>
-                    <a:lstStyle/>
-                    <a:p>
-                      <a:pPr algn="ctr" fontAlgn="ctr"/>
-                      <a:endParaRPr lang="pt-BR" sz="1400" b="0" i="0" u="none" strike="noStrike" dirty="0">
-                        <a:solidFill>
-                          <a:schemeClr val="tx2"/>
-                        </a:solidFill>
-                        <a:effectLst/>
-                        <a:latin typeface="Arial" panose="020B0604020202020204" pitchFamily="34" charset="0"/>
-                        <a:cs typeface="Arial" panose="020B0604020202020204" pitchFamily="34" charset="0"/>
-                      </a:endParaRPr>
-                    </a:p>
-                  </a:txBody>
-                  <a:tcPr marL="6350" marR="6350" marT="6350" marB="0" anchor="ctr">
-                    <a:lnL w="19050" cap="flat" cmpd="sng" algn="ctr">
-                      <a:solidFill>
-                        <a:schemeClr val="bg1"/>
-                      </a:solidFill>
-                      <a:prstDash val="solid"/>
-                      <a:round/>
-                      <a:headEnd type="none" w="med" len="med"/>
-                      <a:tailEnd type="none" w="med" len="med"/>
-                    </a:lnL>
-                    <a:lnR w="19050" cap="flat" cmpd="sng" algn="ctr">
-                      <a:solidFill>
-                        <a:schemeClr val="bg1"/>
-                      </a:solidFill>
-                      <a:prstDash val="solid"/>
-                      <a:round/>
-                      <a:headEnd type="none" w="med" len="med"/>
-                      <a:tailEnd type="none" w="med" len="med"/>
-                    </a:lnR>
-                    <a:lnT w="19050" cap="flat" cmpd="sng" algn="ctr">
-                      <a:solidFill>
-                        <a:schemeClr val="bg1"/>
-                      </a:solidFill>
-                      <a:prstDash val="solid"/>
-                      <a:round/>
-                      <a:headEnd type="none" w="med" len="med"/>
-                      <a:tailEnd type="none" w="med" len="med"/>
-                    </a:lnT>
-                    <a:lnB w="19050" cap="flat" cmpd="sng" algn="ctr">
-                      <a:solidFill>
-                        <a:schemeClr val="bg1"/>
-                      </a:solidFill>
-                      <a:prstDash val="solid"/>
-                      <a:round/>
-                      <a:headEnd type="none" w="med" len="med"/>
-                      <a:tailEnd type="none" w="med" len="med"/>
-                    </a:lnB>
-                    <a:solidFill>
-                      <a:srgbClr val="00B050"/>
-                    </a:solidFill>
-                  </a:tcPr>
-                </a:tc>
-                <a:tc>
-                  <a:txBody>
-                    <a:bodyPr/>
-                    <a:lstStyle/>
-                    <a:p>
-                      <a:pPr algn="ctr" fontAlgn="ctr"/>
-                      <a:endParaRPr lang="pt-BR" sz="1400" b="0" i="0" u="none" strike="noStrike">
-                        <a:solidFill>
-                          <a:schemeClr val="tx2"/>
-                        </a:solidFill>
-                        <a:effectLst/>
-                        <a:latin typeface="Arial" panose="020B0604020202020204" pitchFamily="34" charset="0"/>
-                        <a:cs typeface="Arial" panose="020B0604020202020204" pitchFamily="34" charset="0"/>
-                      </a:endParaRPr>
-                    </a:p>
-                  </a:txBody>
-                  <a:tcPr marL="6350" marR="6350" marT="6350" marB="0" anchor="ctr">
-                    <a:lnL w="19050" cap="flat" cmpd="sng" algn="ctr">
-                      <a:solidFill>
-                        <a:schemeClr val="bg1"/>
-                      </a:solidFill>
-                      <a:prstDash val="solid"/>
-                      <a:round/>
-                      <a:headEnd type="none" w="med" len="med"/>
-                      <a:tailEnd type="none" w="med" len="med"/>
-                    </a:lnL>
-                    <a:lnR w="19050" cap="flat" cmpd="sng" algn="ctr">
-                      <a:solidFill>
-                        <a:schemeClr val="bg1"/>
-                      </a:solidFill>
-                      <a:prstDash val="solid"/>
-                      <a:round/>
-                      <a:headEnd type="none" w="med" len="med"/>
-                      <a:tailEnd type="none" w="med" len="med"/>
-                    </a:lnR>
-                    <a:lnT w="19050" cap="flat" cmpd="sng" algn="ctr">
-                      <a:solidFill>
-                        <a:schemeClr val="bg1"/>
-                      </a:solidFill>
-                      <a:prstDash val="solid"/>
-                      <a:round/>
-                      <a:headEnd type="none" w="med" len="med"/>
-                      <a:tailEnd type="none" w="med" len="med"/>
-                    </a:lnT>
-                    <a:lnB w="19050" cap="flat" cmpd="sng" algn="ctr">
-                      <a:solidFill>
-                        <a:schemeClr val="bg1"/>
-                      </a:solidFill>
-                      <a:prstDash val="solid"/>
-                      <a:round/>
-                      <a:headEnd type="none" w="med" len="med"/>
-                      <a:tailEnd type="none" w="med" len="med"/>
-                    </a:lnB>
-                    <a:noFill/>
-                  </a:tcPr>
-                </a:tc>
-                <a:tc>
-                  <a:txBody>
-                    <a:bodyPr/>
-                    <a:lstStyle/>
-                    <a:p>
-                      <a:pPr algn="l" fontAlgn="ctr"/>
-                      <a:r>
-                        <a:rPr lang="pt-BR" sz="1400" u="none" strike="noStrike" dirty="0">
-                          <a:solidFill>
-                            <a:schemeClr val="tx2"/>
-                          </a:solidFill>
-                          <a:effectLst/>
-                          <a:latin typeface="Arial" panose="020B0604020202020204" pitchFamily="34" charset="0"/>
-                          <a:cs typeface="Arial" panose="020B0604020202020204" pitchFamily="34" charset="0"/>
-                        </a:rPr>
-                        <a:t>Diagnóstico inicial</a:t>
-                      </a:r>
-                      <a:endParaRPr lang="pt-BR" sz="1400" b="0" i="0" u="none" strike="noStrike" dirty="0">
-                        <a:solidFill>
-                          <a:schemeClr val="tx2"/>
-                        </a:solidFill>
-                        <a:effectLst/>
-                        <a:latin typeface="Arial" panose="020B0604020202020204" pitchFamily="34" charset="0"/>
-                        <a:cs typeface="Arial" panose="020B0604020202020204" pitchFamily="34" charset="0"/>
-                      </a:endParaRPr>
-                    </a:p>
-                  </a:txBody>
-                  <a:tcPr marL="6350" marR="6350" marT="6350" marB="0" anchor="ctr">
-                    <a:lnL w="19050" cap="flat" cmpd="sng" algn="ctr">
-                      <a:solidFill>
-                        <a:schemeClr val="bg1"/>
-                      </a:solidFill>
-                      <a:prstDash val="solid"/>
-                      <a:round/>
-                      <a:headEnd type="none" w="med" len="med"/>
-                      <a:tailEnd type="none" w="med" len="med"/>
-                    </a:lnL>
-                    <a:lnR w="19050" cap="flat" cmpd="sng" algn="ctr">
-                      <a:solidFill>
-                        <a:schemeClr val="bg1"/>
-                      </a:solidFill>
-                      <a:prstDash val="solid"/>
-                      <a:round/>
-                      <a:headEnd type="none" w="med" len="med"/>
-                      <a:tailEnd type="none" w="med" len="med"/>
-                    </a:lnR>
-                    <a:lnT w="19050" cap="flat" cmpd="sng" algn="ctr">
-                      <a:solidFill>
-                        <a:schemeClr val="bg1"/>
-                      </a:solidFill>
-                      <a:prstDash val="solid"/>
-                      <a:round/>
-                      <a:headEnd type="none" w="med" len="med"/>
-                      <a:tailEnd type="none" w="med" len="med"/>
-                    </a:lnT>
-                    <a:lnB w="19050" cap="flat" cmpd="sng" algn="ctr">
-                      <a:solidFill>
-                        <a:schemeClr val="bg1"/>
-                      </a:solidFill>
-                      <a:prstDash val="solid"/>
-                      <a:round/>
-                      <a:headEnd type="none" w="med" len="med"/>
-                      <a:tailEnd type="none" w="med" len="med"/>
-                    </a:lnB>
-                    <a:noFill/>
-                  </a:tcPr>
-                </a:tc>
-                <a:tc>
-                  <a:txBody>
-                    <a:bodyPr/>
-                    <a:lstStyle/>
-                    <a:p>
-                      <a:pPr algn="ctr" fontAlgn="ctr"/>
-                      <a:r>
-                        <a:rPr lang="pt-BR" sz="1400" b="0" i="0" u="none" strike="noStrike" dirty="0">
-                          <a:solidFill>
-                            <a:schemeClr val="tx2"/>
-                          </a:solidFill>
-                          <a:effectLst/>
-                          <a:latin typeface="Arial"/>
-                          <a:cs typeface="Arial"/>
-                        </a:rPr>
-                        <a:t>100%</a:t>
-                      </a:r>
-                      <a:endParaRPr lang="pt-BR" sz="1400" b="0" i="0" u="none" strike="noStrike" dirty="0">
-                        <a:solidFill>
-                          <a:schemeClr val="tx2"/>
-                        </a:solidFill>
-                        <a:effectLst/>
-                        <a:latin typeface="Arial" panose="020B0604020202020204" pitchFamily="34" charset="0"/>
-                        <a:cs typeface="Arial" panose="020B0604020202020204" pitchFamily="34" charset="0"/>
-                      </a:endParaRPr>
-                    </a:p>
-                  </a:txBody>
-                  <a:tcPr marL="0" marR="0" marT="0" marB="0" anchor="ctr">
-                    <a:lnL w="19050" cap="flat" cmpd="sng" algn="ctr">
-                      <a:solidFill>
-                        <a:schemeClr val="bg1"/>
-                      </a:solidFill>
-                      <a:prstDash val="solid"/>
-                      <a:round/>
-                      <a:headEnd type="none" w="med" len="med"/>
-                      <a:tailEnd type="none" w="med" len="med"/>
-                    </a:lnL>
-                    <a:lnR w="19050" cap="flat" cmpd="sng" algn="ctr">
-                      <a:solidFill>
-                        <a:schemeClr val="bg1"/>
-                      </a:solidFill>
-                      <a:prstDash val="solid"/>
-                      <a:round/>
-                      <a:headEnd type="none" w="med" len="med"/>
-                      <a:tailEnd type="none" w="med" len="med"/>
-                    </a:lnR>
-                    <a:lnT w="19050" cap="flat" cmpd="sng" algn="ctr">
-                      <a:solidFill>
-                        <a:schemeClr val="bg1"/>
-                      </a:solidFill>
-                      <a:prstDash val="solid"/>
-                      <a:round/>
-                      <a:headEnd type="none" w="med" len="med"/>
-                      <a:tailEnd type="none" w="med" len="med"/>
-                    </a:lnT>
-                    <a:lnB w="19050" cap="flat" cmpd="sng" algn="ctr">
-                      <a:solidFill>
-                        <a:schemeClr val="bg1"/>
-                      </a:solidFill>
-                      <a:prstDash val="solid"/>
-                      <a:round/>
-                      <a:headEnd type="none" w="med" len="med"/>
-                      <a:tailEnd type="none" w="med" len="med"/>
-                    </a:lnB>
-                    <a:noFill/>
-                  </a:tcPr>
-                </a:tc>
-                <a:extLst>
-                  <a:ext uri="{0D108BD9-81ED-4DB2-BD59-A6C34878D82A}">
-                    <a16:rowId xmlns:a16="http://schemas.microsoft.com/office/drawing/2014/main" val="1907476501"/>
-                  </a:ext>
-                </a:extLst>
-              </a:tr>
-              <a:tr h="252000">
-                <a:tc>
-                  <a:txBody>
-                    <a:bodyPr/>
-                    <a:lstStyle/>
-                    <a:p>
-                      <a:pPr algn="ctr" fontAlgn="ctr"/>
-                      <a:endParaRPr lang="pt-BR" sz="1400" b="0" i="0" u="none" strike="noStrike" dirty="0">
-                        <a:solidFill>
-                          <a:schemeClr val="tx2"/>
-                        </a:solidFill>
-                        <a:effectLst/>
-                        <a:latin typeface="Arial" panose="020B0604020202020204" pitchFamily="34" charset="0"/>
-                        <a:cs typeface="Arial" panose="020B0604020202020204" pitchFamily="34" charset="0"/>
-                      </a:endParaRPr>
-                    </a:p>
-                  </a:txBody>
-                  <a:tcPr marL="6350" marR="6350" marT="6350" marB="0" anchor="ctr">
-                    <a:lnL w="19050" cap="flat" cmpd="sng" algn="ctr">
-                      <a:solidFill>
-                        <a:schemeClr val="bg1"/>
-                      </a:solidFill>
-                      <a:prstDash val="solid"/>
-                      <a:round/>
-                      <a:headEnd type="none" w="med" len="med"/>
-                      <a:tailEnd type="none" w="med" len="med"/>
-                    </a:lnL>
-                    <a:lnR w="19050" cap="flat" cmpd="sng" algn="ctr">
-                      <a:solidFill>
-                        <a:schemeClr val="bg1"/>
-                      </a:solidFill>
-                      <a:prstDash val="solid"/>
-                      <a:round/>
-                      <a:headEnd type="none" w="med" len="med"/>
-                      <a:tailEnd type="none" w="med" len="med"/>
-                    </a:lnR>
-                    <a:lnT w="19050" cap="flat" cmpd="sng" algn="ctr">
-                      <a:solidFill>
-                        <a:schemeClr val="bg1"/>
-                      </a:solidFill>
-                      <a:prstDash val="solid"/>
-                      <a:round/>
-                      <a:headEnd type="none" w="med" len="med"/>
-                      <a:tailEnd type="none" w="med" len="med"/>
-                    </a:lnT>
-                    <a:lnB w="19050" cap="flat" cmpd="sng" algn="ctr">
-                      <a:solidFill>
-                        <a:schemeClr val="bg1"/>
-                      </a:solidFill>
-                      <a:prstDash val="solid"/>
-                      <a:round/>
-                      <a:headEnd type="none" w="med" len="med"/>
-                      <a:tailEnd type="none" w="med" len="med"/>
-                    </a:lnB>
-                    <a:solidFill>
-                      <a:srgbClr val="FFFF00"/>
-                    </a:solidFill>
-                  </a:tcPr>
-                </a:tc>
-                <a:tc>
-                  <a:txBody>
-                    <a:bodyPr/>
-                    <a:lstStyle/>
-                    <a:p>
-                      <a:pPr algn="ctr" fontAlgn="ctr"/>
-                      <a:endParaRPr lang="pt-BR" sz="1400" b="0" i="0" u="none" strike="noStrike">
-                        <a:solidFill>
-                          <a:schemeClr val="tx2"/>
-                        </a:solidFill>
-                        <a:effectLst/>
-                        <a:latin typeface="Arial" panose="020B0604020202020204" pitchFamily="34" charset="0"/>
-                        <a:cs typeface="Arial" panose="020B0604020202020204" pitchFamily="34" charset="0"/>
-                      </a:endParaRPr>
-                    </a:p>
-                  </a:txBody>
-                  <a:tcPr marL="6350" marR="6350" marT="6350" marB="0" anchor="ctr">
-                    <a:lnL w="19050" cap="flat" cmpd="sng" algn="ctr">
-                      <a:solidFill>
-                        <a:schemeClr val="bg1"/>
-                      </a:solidFill>
-                      <a:prstDash val="solid"/>
-                      <a:round/>
-                      <a:headEnd type="none" w="med" len="med"/>
-                      <a:tailEnd type="none" w="med" len="med"/>
-                    </a:lnL>
-                    <a:lnR w="19050" cap="flat" cmpd="sng" algn="ctr">
-                      <a:solidFill>
-                        <a:schemeClr val="bg1"/>
-                      </a:solidFill>
-                      <a:prstDash val="solid"/>
-                      <a:round/>
-                      <a:headEnd type="none" w="med" len="med"/>
-                      <a:tailEnd type="none" w="med" len="med"/>
-                    </a:lnR>
-                    <a:lnT w="19050" cap="flat" cmpd="sng" algn="ctr">
-                      <a:solidFill>
-                        <a:schemeClr val="bg1"/>
-                      </a:solidFill>
-                      <a:prstDash val="solid"/>
-                      <a:round/>
-                      <a:headEnd type="none" w="med" len="med"/>
-                      <a:tailEnd type="none" w="med" len="med"/>
-                    </a:lnT>
-                    <a:lnB w="19050" cap="flat" cmpd="sng" algn="ctr">
-                      <a:solidFill>
-                        <a:schemeClr val="bg1"/>
-                      </a:solidFill>
-                      <a:prstDash val="solid"/>
-                      <a:round/>
-                      <a:headEnd type="none" w="med" len="med"/>
-                      <a:tailEnd type="none" w="med" len="med"/>
-                    </a:lnB>
-                    <a:noFill/>
-                  </a:tcPr>
-                </a:tc>
-                <a:tc>
-                  <a:txBody>
-                    <a:bodyPr/>
-                    <a:lstStyle/>
-                    <a:p>
-                      <a:pPr algn="l" fontAlgn="ctr"/>
-                      <a:r>
-                        <a:rPr lang="pt-BR" sz="1400" u="none" strike="noStrike" dirty="0">
-                          <a:solidFill>
-                            <a:schemeClr val="tx2"/>
-                          </a:solidFill>
-                          <a:effectLst/>
-                          <a:latin typeface="Arial" panose="020B0604020202020204" pitchFamily="34" charset="0"/>
-                          <a:cs typeface="Arial" panose="020B0604020202020204" pitchFamily="34" charset="0"/>
-                        </a:rPr>
-                        <a:t>Entrevistas</a:t>
-                      </a:r>
-                      <a:endParaRPr lang="pt-BR" sz="1400" b="0" i="0" u="none" strike="noStrike" dirty="0">
-                        <a:solidFill>
-                          <a:schemeClr val="tx2"/>
-                        </a:solidFill>
-                        <a:effectLst/>
-                        <a:latin typeface="Arial" panose="020B0604020202020204" pitchFamily="34" charset="0"/>
-                        <a:cs typeface="Arial" panose="020B0604020202020204" pitchFamily="34" charset="0"/>
-                      </a:endParaRPr>
-                    </a:p>
-                  </a:txBody>
-                  <a:tcPr marL="6350" marR="6350" marT="6350" marB="0" anchor="ctr">
-                    <a:lnL w="19050" cap="flat" cmpd="sng" algn="ctr">
-                      <a:solidFill>
-                        <a:schemeClr val="bg1"/>
-                      </a:solidFill>
-                      <a:prstDash val="solid"/>
-                      <a:round/>
-                      <a:headEnd type="none" w="med" len="med"/>
-                      <a:tailEnd type="none" w="med" len="med"/>
-                    </a:lnL>
-                    <a:lnR w="19050" cap="flat" cmpd="sng" algn="ctr">
-                      <a:solidFill>
-                        <a:schemeClr val="bg1"/>
-                      </a:solidFill>
-                      <a:prstDash val="solid"/>
-                      <a:round/>
-                      <a:headEnd type="none" w="med" len="med"/>
-                      <a:tailEnd type="none" w="med" len="med"/>
-                    </a:lnR>
-                    <a:lnT w="19050" cap="flat" cmpd="sng" algn="ctr">
-                      <a:solidFill>
-                        <a:schemeClr val="bg1"/>
-                      </a:solidFill>
-                      <a:prstDash val="solid"/>
-                      <a:round/>
-                      <a:headEnd type="none" w="med" len="med"/>
-                      <a:tailEnd type="none" w="med" len="med"/>
-                    </a:lnT>
-                    <a:lnB w="19050" cap="flat" cmpd="sng" algn="ctr">
-                      <a:solidFill>
-                        <a:schemeClr val="bg1"/>
-                      </a:solidFill>
-                      <a:prstDash val="solid"/>
-                      <a:round/>
-                      <a:headEnd type="none" w="med" len="med"/>
-                      <a:tailEnd type="none" w="med" len="med"/>
-                    </a:lnB>
-                    <a:noFill/>
-                  </a:tcPr>
-                </a:tc>
-                <a:tc>
-                  <a:txBody>
-                    <a:bodyPr/>
-                    <a:lstStyle/>
-                    <a:p>
-                      <a:pPr algn="ctr" fontAlgn="ctr"/>
-                      <a:r>
-                        <a:rPr lang="pt-BR" sz="1400" b="0" i="0" u="none" strike="noStrike" dirty="0">
-                          <a:solidFill>
-                            <a:schemeClr val="tx2"/>
-                          </a:solidFill>
-                          <a:effectLst/>
-                          <a:latin typeface="Arial"/>
-                          <a:cs typeface="Arial"/>
-                        </a:rPr>
-                        <a:t>10%</a:t>
-                      </a:r>
-                    </a:p>
-                  </a:txBody>
-                  <a:tcPr marL="0" marR="0" marT="0" marB="0" anchor="ctr">
-                    <a:lnL w="19050" cap="flat" cmpd="sng" algn="ctr">
-                      <a:solidFill>
-                        <a:schemeClr val="bg1"/>
-                      </a:solidFill>
-                      <a:prstDash val="solid"/>
-                      <a:round/>
-                      <a:headEnd type="none" w="med" len="med"/>
-                      <a:tailEnd type="none" w="med" len="med"/>
-                    </a:lnL>
-                    <a:lnR w="19050" cap="flat" cmpd="sng" algn="ctr">
-                      <a:solidFill>
-                        <a:schemeClr val="bg1"/>
-                      </a:solidFill>
-                      <a:prstDash val="solid"/>
-                      <a:round/>
-                      <a:headEnd type="none" w="med" len="med"/>
-                      <a:tailEnd type="none" w="med" len="med"/>
-                    </a:lnR>
-                    <a:lnT w="19050" cap="flat" cmpd="sng" algn="ctr">
-                      <a:solidFill>
-                        <a:schemeClr val="bg1"/>
-                      </a:solidFill>
-                      <a:prstDash val="solid"/>
-                      <a:round/>
-                      <a:headEnd type="none" w="med" len="med"/>
-                      <a:tailEnd type="none" w="med" len="med"/>
-                    </a:lnT>
-                    <a:lnB w="19050" cap="flat" cmpd="sng" algn="ctr">
-                      <a:solidFill>
-                        <a:schemeClr val="bg1"/>
-                      </a:solidFill>
-                      <a:prstDash val="solid"/>
-                      <a:round/>
-                      <a:headEnd type="none" w="med" len="med"/>
-                      <a:tailEnd type="none" w="med" len="med"/>
-                    </a:lnB>
-                    <a:noFill/>
-                  </a:tcPr>
-                </a:tc>
-                <a:extLst>
-                  <a:ext uri="{0D108BD9-81ED-4DB2-BD59-A6C34878D82A}">
-                    <a16:rowId xmlns:a16="http://schemas.microsoft.com/office/drawing/2014/main" val="2204163848"/>
-                  </a:ext>
-                </a:extLst>
-              </a:tr>
-              <a:tr h="252000">
-                <a:tc>
-                  <a:txBody>
-                    <a:bodyPr/>
-                    <a:lstStyle/>
-                    <a:p>
-                      <a:pPr algn="ctr" fontAlgn="ctr"/>
-                      <a:endParaRPr lang="pt-BR" sz="1400" b="0" i="0" u="none" strike="noStrike" dirty="0">
-                        <a:solidFill>
-                          <a:schemeClr val="tx2"/>
-                        </a:solidFill>
-                        <a:effectLst/>
-                        <a:latin typeface="Arial" panose="020B0604020202020204" pitchFamily="34" charset="0"/>
-                        <a:cs typeface="Arial" panose="020B0604020202020204" pitchFamily="34" charset="0"/>
-                      </a:endParaRPr>
-                    </a:p>
-                  </a:txBody>
-                  <a:tcPr marL="6350" marR="6350" marT="6350" marB="0" anchor="ctr">
-                    <a:lnL w="19050" cap="flat" cmpd="sng" algn="ctr">
-                      <a:solidFill>
-                        <a:schemeClr val="bg1"/>
-                      </a:solidFill>
-                      <a:prstDash val="solid"/>
-                      <a:round/>
-                      <a:headEnd type="none" w="med" len="med"/>
-                      <a:tailEnd type="none" w="med" len="med"/>
-                    </a:lnL>
-                    <a:lnR w="19050" cap="flat" cmpd="sng" algn="ctr">
-                      <a:solidFill>
-                        <a:schemeClr val="bg1"/>
-                      </a:solidFill>
-                      <a:prstDash val="solid"/>
-                      <a:round/>
-                      <a:headEnd type="none" w="med" len="med"/>
-                      <a:tailEnd type="none" w="med" len="med"/>
-                    </a:lnR>
-                    <a:lnT w="19050" cap="flat" cmpd="sng" algn="ctr">
-                      <a:solidFill>
-                        <a:schemeClr val="bg1"/>
-                      </a:solidFill>
-                      <a:prstDash val="solid"/>
-                      <a:round/>
-                      <a:headEnd type="none" w="med" len="med"/>
-                      <a:tailEnd type="none" w="med" len="med"/>
-                    </a:lnT>
-                    <a:lnB w="19050" cap="flat" cmpd="sng" algn="ctr">
-                      <a:solidFill>
-                        <a:schemeClr val="bg1"/>
-                      </a:solidFill>
-                      <a:prstDash val="solid"/>
-                      <a:round/>
-                      <a:headEnd type="none" w="med" len="med"/>
-                      <a:tailEnd type="none" w="med" len="med"/>
-                    </a:lnB>
-                    <a:solidFill>
-                      <a:srgbClr val="FFFF00"/>
-                    </a:solidFill>
-                  </a:tcPr>
-                </a:tc>
-                <a:tc>
-                  <a:txBody>
-                    <a:bodyPr/>
-                    <a:lstStyle/>
-                    <a:p>
-                      <a:pPr algn="ctr" fontAlgn="ctr"/>
-                      <a:endParaRPr lang="pt-BR" sz="1400" b="0" i="0" u="none" strike="noStrike">
-                        <a:solidFill>
-                          <a:schemeClr val="tx2"/>
-                        </a:solidFill>
-                        <a:effectLst/>
-                        <a:latin typeface="Arial" panose="020B0604020202020204" pitchFamily="34" charset="0"/>
-                        <a:cs typeface="Arial" panose="020B0604020202020204" pitchFamily="34" charset="0"/>
-                      </a:endParaRPr>
-                    </a:p>
-                  </a:txBody>
-                  <a:tcPr marL="6350" marR="6350" marT="6350" marB="0" anchor="ctr">
-                    <a:lnL w="19050" cap="flat" cmpd="sng" algn="ctr">
-                      <a:solidFill>
-                        <a:schemeClr val="bg1"/>
-                      </a:solidFill>
-                      <a:prstDash val="solid"/>
-                      <a:round/>
-                      <a:headEnd type="none" w="med" len="med"/>
-                      <a:tailEnd type="none" w="med" len="med"/>
-                    </a:lnL>
-                    <a:lnR w="19050" cap="flat" cmpd="sng" algn="ctr">
-                      <a:solidFill>
-                        <a:schemeClr val="bg1"/>
-                      </a:solidFill>
-                      <a:prstDash val="solid"/>
-                      <a:round/>
-                      <a:headEnd type="none" w="med" len="med"/>
-                      <a:tailEnd type="none" w="med" len="med"/>
-                    </a:lnR>
-                    <a:lnT w="19050" cap="flat" cmpd="sng" algn="ctr">
-                      <a:solidFill>
-                        <a:schemeClr val="bg1"/>
-                      </a:solidFill>
-                      <a:prstDash val="solid"/>
-                      <a:round/>
-                      <a:headEnd type="none" w="med" len="med"/>
-                      <a:tailEnd type="none" w="med" len="med"/>
-                    </a:lnT>
-                    <a:lnB w="19050" cap="flat" cmpd="sng" algn="ctr">
-                      <a:solidFill>
-                        <a:schemeClr val="bg1"/>
-                      </a:solidFill>
-                      <a:prstDash val="solid"/>
-                      <a:round/>
-                      <a:headEnd type="none" w="med" len="med"/>
-                      <a:tailEnd type="none" w="med" len="med"/>
-                    </a:lnB>
-                    <a:noFill/>
-                  </a:tcPr>
-                </a:tc>
-                <a:tc>
-                  <a:txBody>
-                    <a:bodyPr/>
-                    <a:lstStyle/>
-                    <a:p>
-                      <a:pPr algn="l" fontAlgn="ctr"/>
-                      <a:r>
-                        <a:rPr lang="pt-BR" sz="1400" u="none" strike="noStrike" dirty="0" err="1">
-                          <a:solidFill>
-                            <a:schemeClr val="tx2"/>
-                          </a:solidFill>
-                          <a:effectLst/>
-                          <a:latin typeface="Arial" panose="020B0604020202020204" pitchFamily="34" charset="0"/>
-                          <a:cs typeface="Arial" panose="020B0604020202020204" pitchFamily="34" charset="0"/>
-                        </a:rPr>
-                        <a:t>To</a:t>
-                      </a:r>
-                      <a:r>
-                        <a:rPr lang="pt-BR" sz="1400" u="none" strike="noStrike" dirty="0">
-                          <a:solidFill>
-                            <a:schemeClr val="tx2"/>
-                          </a:solidFill>
-                          <a:effectLst/>
-                          <a:latin typeface="Arial" panose="020B0604020202020204" pitchFamily="34" charset="0"/>
-                          <a:cs typeface="Arial" panose="020B0604020202020204" pitchFamily="34" charset="0"/>
-                        </a:rPr>
-                        <a:t> Be</a:t>
-                      </a:r>
-                      <a:endParaRPr lang="pt-BR" sz="1400" b="0" i="0" u="none" strike="noStrike" dirty="0">
-                        <a:solidFill>
-                          <a:schemeClr val="tx2"/>
-                        </a:solidFill>
-                        <a:effectLst/>
-                        <a:latin typeface="Arial" panose="020B0604020202020204" pitchFamily="34" charset="0"/>
-                        <a:cs typeface="Arial" panose="020B0604020202020204" pitchFamily="34" charset="0"/>
-                      </a:endParaRPr>
-                    </a:p>
-                  </a:txBody>
-                  <a:tcPr marL="6350" marR="6350" marT="6350" marB="0" anchor="ctr">
-                    <a:lnL w="19050" cap="flat" cmpd="sng" algn="ctr">
-                      <a:solidFill>
-                        <a:schemeClr val="bg1"/>
-                      </a:solidFill>
-                      <a:prstDash val="solid"/>
-                      <a:round/>
-                      <a:headEnd type="none" w="med" len="med"/>
-                      <a:tailEnd type="none" w="med" len="med"/>
-                    </a:lnL>
-                    <a:lnR w="19050" cap="flat" cmpd="sng" algn="ctr">
-                      <a:solidFill>
-                        <a:schemeClr val="bg1"/>
-                      </a:solidFill>
-                      <a:prstDash val="solid"/>
-                      <a:round/>
-                      <a:headEnd type="none" w="med" len="med"/>
-                      <a:tailEnd type="none" w="med" len="med"/>
-                    </a:lnR>
-                    <a:lnT w="19050" cap="flat" cmpd="sng" algn="ctr">
-                      <a:solidFill>
-                        <a:schemeClr val="bg1"/>
-                      </a:solidFill>
-                      <a:prstDash val="solid"/>
-                      <a:round/>
-                      <a:headEnd type="none" w="med" len="med"/>
-                      <a:tailEnd type="none" w="med" len="med"/>
-                    </a:lnT>
-                    <a:lnB w="19050" cap="flat" cmpd="sng" algn="ctr">
-                      <a:solidFill>
-                        <a:schemeClr val="bg1"/>
-                      </a:solidFill>
-                      <a:prstDash val="solid"/>
-                      <a:round/>
-                      <a:headEnd type="none" w="med" len="med"/>
-                      <a:tailEnd type="none" w="med" len="med"/>
-                    </a:lnB>
-                    <a:noFill/>
-                  </a:tcPr>
-                </a:tc>
-                <a:tc>
-                  <a:txBody>
-                    <a:bodyPr/>
-                    <a:lstStyle/>
-                    <a:p>
-                      <a:pPr algn="ctr" fontAlgn="ctr"/>
-                      <a:r>
-                        <a:rPr lang="pt-BR" sz="1400" b="0" i="0" u="none" strike="noStrike" dirty="0">
-                          <a:solidFill>
-                            <a:schemeClr val="tx2"/>
-                          </a:solidFill>
-                          <a:effectLst/>
-                          <a:latin typeface="Arial"/>
-                          <a:cs typeface="Arial"/>
-                        </a:rPr>
-                        <a:t>8%</a:t>
-                      </a:r>
-                    </a:p>
-                  </a:txBody>
-                  <a:tcPr marL="0" marR="0" marT="0" marB="0" anchor="ctr">
-                    <a:lnL w="19050" cap="flat" cmpd="sng" algn="ctr">
-                      <a:solidFill>
-                        <a:schemeClr val="bg1"/>
-                      </a:solidFill>
-                      <a:prstDash val="solid"/>
-                      <a:round/>
-                      <a:headEnd type="none" w="med" len="med"/>
-                      <a:tailEnd type="none" w="med" len="med"/>
-                    </a:lnL>
-                    <a:lnR w="19050" cap="flat" cmpd="sng" algn="ctr">
-                      <a:solidFill>
-                        <a:schemeClr val="bg1"/>
-                      </a:solidFill>
-                      <a:prstDash val="solid"/>
-                      <a:round/>
-                      <a:headEnd type="none" w="med" len="med"/>
-                      <a:tailEnd type="none" w="med" len="med"/>
-                    </a:lnR>
-                    <a:lnT w="19050" cap="flat" cmpd="sng" algn="ctr">
-                      <a:solidFill>
-                        <a:schemeClr val="bg1"/>
-                      </a:solidFill>
-                      <a:prstDash val="solid"/>
-                      <a:round/>
-                      <a:headEnd type="none" w="med" len="med"/>
-                      <a:tailEnd type="none" w="med" len="med"/>
-                    </a:lnT>
-                    <a:lnB w="19050" cap="flat" cmpd="sng" algn="ctr">
-                      <a:solidFill>
-                        <a:schemeClr val="bg1"/>
-                      </a:solidFill>
-                      <a:prstDash val="solid"/>
-                      <a:round/>
-                      <a:headEnd type="none" w="med" len="med"/>
-                      <a:tailEnd type="none" w="med" len="med"/>
-                    </a:lnB>
-                    <a:noFill/>
-                  </a:tcPr>
-                </a:tc>
-                <a:extLst>
-                  <a:ext uri="{0D108BD9-81ED-4DB2-BD59-A6C34878D82A}">
-                    <a16:rowId xmlns:a16="http://schemas.microsoft.com/office/drawing/2014/main" val="3108259092"/>
-                  </a:ext>
-                </a:extLst>
-              </a:tr>
-              <a:tr h="252000">
-                <a:tc>
-                  <a:txBody>
-                    <a:bodyPr/>
-                    <a:lstStyle/>
-                    <a:p>
-                      <a:pPr algn="ctr" fontAlgn="ctr"/>
-                      <a:endParaRPr lang="pt-BR" sz="1400" b="0" i="0" u="none" strike="noStrike" dirty="0">
-                        <a:solidFill>
-                          <a:schemeClr val="tx2"/>
-                        </a:solidFill>
-                        <a:effectLst/>
-                        <a:latin typeface="Arial" panose="020B0604020202020204" pitchFamily="34" charset="0"/>
-                        <a:cs typeface="Arial" panose="020B0604020202020204" pitchFamily="34" charset="0"/>
-                      </a:endParaRPr>
-                    </a:p>
-                  </a:txBody>
-                  <a:tcPr marL="6350" marR="6350" marT="6350" marB="0" anchor="ctr">
-                    <a:lnL w="19050" cap="flat" cmpd="sng" algn="ctr">
-                      <a:solidFill>
-                        <a:schemeClr val="bg1"/>
-                      </a:solidFill>
-                      <a:prstDash val="solid"/>
-                      <a:round/>
-                      <a:headEnd type="none" w="med" len="med"/>
-                      <a:tailEnd type="none" w="med" len="med"/>
-                    </a:lnL>
-                    <a:lnR w="19050" cap="flat" cmpd="sng" algn="ctr">
-                      <a:solidFill>
-                        <a:schemeClr val="bg1"/>
-                      </a:solidFill>
-                      <a:prstDash val="solid"/>
-                      <a:round/>
-                      <a:headEnd type="none" w="med" len="med"/>
-                      <a:tailEnd type="none" w="med" len="med"/>
-                    </a:lnR>
-                    <a:lnT w="19050" cap="flat" cmpd="sng" algn="ctr">
-                      <a:solidFill>
-                        <a:schemeClr val="bg1"/>
-                      </a:solidFill>
-                      <a:prstDash val="solid"/>
-                      <a:round/>
-                      <a:headEnd type="none" w="med" len="med"/>
-                      <a:tailEnd type="none" w="med" len="med"/>
-                    </a:lnT>
-                    <a:lnB w="19050" cap="flat" cmpd="sng" algn="ctr">
-                      <a:solidFill>
-                        <a:schemeClr val="bg1"/>
-                      </a:solidFill>
-                      <a:prstDash val="solid"/>
-                      <a:round/>
-                      <a:headEnd type="none" w="med" len="med"/>
-                      <a:tailEnd type="none" w="med" len="med"/>
-                    </a:lnB>
-                    <a:solidFill>
-                      <a:srgbClr val="FFFF00"/>
-                    </a:solidFill>
-                  </a:tcPr>
-                </a:tc>
-                <a:tc>
-                  <a:txBody>
-                    <a:bodyPr/>
-                    <a:lstStyle/>
-                    <a:p>
-                      <a:pPr algn="ctr" fontAlgn="ctr"/>
-                      <a:endParaRPr lang="pt-BR" sz="1400" b="0" i="0" u="none" strike="noStrike">
-                        <a:solidFill>
-                          <a:schemeClr val="tx2"/>
-                        </a:solidFill>
-                        <a:effectLst/>
-                        <a:latin typeface="Arial" panose="020B0604020202020204" pitchFamily="34" charset="0"/>
-                        <a:cs typeface="Arial" panose="020B0604020202020204" pitchFamily="34" charset="0"/>
-                      </a:endParaRPr>
-                    </a:p>
-                  </a:txBody>
-                  <a:tcPr marL="6350" marR="6350" marT="6350" marB="0" anchor="ctr">
-                    <a:lnL w="19050" cap="flat" cmpd="sng" algn="ctr">
-                      <a:solidFill>
-                        <a:schemeClr val="bg1"/>
-                      </a:solidFill>
-                      <a:prstDash val="solid"/>
-                      <a:round/>
-                      <a:headEnd type="none" w="med" len="med"/>
-                      <a:tailEnd type="none" w="med" len="med"/>
-                    </a:lnL>
-                    <a:lnR w="19050" cap="flat" cmpd="sng" algn="ctr">
-                      <a:solidFill>
-                        <a:schemeClr val="bg1"/>
-                      </a:solidFill>
-                      <a:prstDash val="solid"/>
-                      <a:round/>
-                      <a:headEnd type="none" w="med" len="med"/>
-                      <a:tailEnd type="none" w="med" len="med"/>
-                    </a:lnR>
-                    <a:lnT w="19050" cap="flat" cmpd="sng" algn="ctr">
-                      <a:solidFill>
-                        <a:schemeClr val="bg1"/>
-                      </a:solidFill>
-                      <a:prstDash val="solid"/>
-                      <a:round/>
-                      <a:headEnd type="none" w="med" len="med"/>
-                      <a:tailEnd type="none" w="med" len="med"/>
-                    </a:lnT>
-                    <a:lnB w="19050" cap="flat" cmpd="sng" algn="ctr">
-                      <a:solidFill>
-                        <a:schemeClr val="bg1"/>
-                      </a:solidFill>
-                      <a:prstDash val="solid"/>
-                      <a:round/>
-                      <a:headEnd type="none" w="med" len="med"/>
-                      <a:tailEnd type="none" w="med" len="med"/>
-                    </a:lnB>
-                    <a:noFill/>
-                  </a:tcPr>
-                </a:tc>
-                <a:tc>
-                  <a:txBody>
-                    <a:bodyPr/>
-                    <a:lstStyle/>
-                    <a:p>
-                      <a:pPr algn="l" fontAlgn="ctr"/>
-                      <a:r>
-                        <a:rPr lang="pt-BR" sz="1400" u="none" strike="noStrike" dirty="0">
-                          <a:solidFill>
-                            <a:schemeClr val="tx2"/>
-                          </a:solidFill>
-                          <a:effectLst/>
-                          <a:latin typeface="Arial" panose="020B0604020202020204" pitchFamily="34" charset="0"/>
-                          <a:cs typeface="Arial" panose="020B0604020202020204" pitchFamily="34" charset="0"/>
-                        </a:rPr>
-                        <a:t>Apresentação</a:t>
-                      </a:r>
-                      <a:endParaRPr lang="pt-BR" sz="1400" b="0" i="0" u="none" strike="noStrike" dirty="0">
-                        <a:solidFill>
-                          <a:schemeClr val="tx2"/>
-                        </a:solidFill>
-                        <a:effectLst/>
-                        <a:latin typeface="Arial" panose="020B0604020202020204" pitchFamily="34" charset="0"/>
-                        <a:cs typeface="Arial" panose="020B0604020202020204" pitchFamily="34" charset="0"/>
-                      </a:endParaRPr>
-                    </a:p>
-                  </a:txBody>
-                  <a:tcPr marL="6350" marR="6350" marT="6350" marB="0" anchor="ctr">
-                    <a:lnL w="19050" cap="flat" cmpd="sng" algn="ctr">
-                      <a:solidFill>
-                        <a:schemeClr val="bg1"/>
-                      </a:solidFill>
-                      <a:prstDash val="solid"/>
-                      <a:round/>
-                      <a:headEnd type="none" w="med" len="med"/>
-                      <a:tailEnd type="none" w="med" len="med"/>
-                    </a:lnL>
-                    <a:lnR w="19050" cap="flat" cmpd="sng" algn="ctr">
-                      <a:solidFill>
-                        <a:schemeClr val="bg1"/>
-                      </a:solidFill>
-                      <a:prstDash val="solid"/>
-                      <a:round/>
-                      <a:headEnd type="none" w="med" len="med"/>
-                      <a:tailEnd type="none" w="med" len="med"/>
-                    </a:lnR>
-                    <a:lnT w="19050" cap="flat" cmpd="sng" algn="ctr">
-                      <a:solidFill>
-                        <a:schemeClr val="bg1"/>
-                      </a:solidFill>
-                      <a:prstDash val="solid"/>
-                      <a:round/>
-                      <a:headEnd type="none" w="med" len="med"/>
-                      <a:tailEnd type="none" w="med" len="med"/>
-                    </a:lnT>
-                    <a:lnB w="19050" cap="flat" cmpd="sng" algn="ctr">
-                      <a:solidFill>
-                        <a:schemeClr val="bg1"/>
-                      </a:solidFill>
-                      <a:prstDash val="solid"/>
-                      <a:round/>
-                      <a:headEnd type="none" w="med" len="med"/>
-                      <a:tailEnd type="none" w="med" len="med"/>
-                    </a:lnB>
-                    <a:noFill/>
-                  </a:tcPr>
-                </a:tc>
-                <a:tc>
-                  <a:txBody>
-                    <a:bodyPr/>
-                    <a:lstStyle/>
-                    <a:p>
-                      <a:pPr algn="ctr" fontAlgn="ctr"/>
-                      <a:r>
-                        <a:rPr lang="pt-BR" sz="1400" b="0" i="0" u="none" strike="noStrike">
-                          <a:solidFill>
-                            <a:schemeClr val="tx2"/>
-                          </a:solidFill>
-                          <a:effectLst/>
-                          <a:latin typeface="Arial"/>
-                          <a:cs typeface="Arial"/>
-                        </a:rPr>
-                        <a:t>0%</a:t>
-                      </a:r>
-                    </a:p>
-                  </a:txBody>
-                  <a:tcPr marL="0" marR="0" marT="0" marB="0" anchor="ctr">
-                    <a:lnL w="19050" cap="flat" cmpd="sng" algn="ctr">
-                      <a:solidFill>
-                        <a:schemeClr val="bg1"/>
-                      </a:solidFill>
-                      <a:prstDash val="solid"/>
-                      <a:round/>
-                      <a:headEnd type="none" w="med" len="med"/>
-                      <a:tailEnd type="none" w="med" len="med"/>
-                    </a:lnL>
-                    <a:lnR w="19050" cap="flat" cmpd="sng" algn="ctr">
-                      <a:solidFill>
-                        <a:schemeClr val="bg1"/>
-                      </a:solidFill>
-                      <a:prstDash val="solid"/>
-                      <a:round/>
-                      <a:headEnd type="none" w="med" len="med"/>
-                      <a:tailEnd type="none" w="med" len="med"/>
-                    </a:lnR>
-                    <a:lnT w="19050" cap="flat" cmpd="sng" algn="ctr">
-                      <a:solidFill>
-                        <a:schemeClr val="bg1"/>
-                      </a:solidFill>
-                      <a:prstDash val="solid"/>
-                      <a:round/>
-                      <a:headEnd type="none" w="med" len="med"/>
-                      <a:tailEnd type="none" w="med" len="med"/>
-                    </a:lnT>
-                    <a:lnB w="19050" cap="flat" cmpd="sng" algn="ctr">
-                      <a:solidFill>
-                        <a:schemeClr val="bg1"/>
-                      </a:solidFill>
-                      <a:prstDash val="solid"/>
-                      <a:round/>
-                      <a:headEnd type="none" w="med" len="med"/>
-                      <a:tailEnd type="none" w="med" len="med"/>
-                    </a:lnB>
-                    <a:noFill/>
-                  </a:tcPr>
-                </a:tc>
-                <a:extLst>
-                  <a:ext uri="{0D108BD9-81ED-4DB2-BD59-A6C34878D82A}">
-                    <a16:rowId xmlns:a16="http://schemas.microsoft.com/office/drawing/2014/main" val="1799319753"/>
-                  </a:ext>
-                </a:extLst>
-              </a:tr>
-              <a:tr h="252000">
-                <a:tc>
-                  <a:txBody>
-                    <a:bodyPr/>
-                    <a:lstStyle/>
-                    <a:p>
-                      <a:pPr algn="ctr" fontAlgn="ctr"/>
-                      <a:endParaRPr lang="pt-BR" sz="1400" b="0" i="0" u="none" strike="noStrike" dirty="0">
-                        <a:solidFill>
-                          <a:schemeClr val="tx2"/>
-                        </a:solidFill>
-                        <a:effectLst/>
-                        <a:latin typeface="Arial" panose="020B0604020202020204" pitchFamily="34" charset="0"/>
-                        <a:cs typeface="Arial" panose="020B0604020202020204" pitchFamily="34" charset="0"/>
-                      </a:endParaRPr>
-                    </a:p>
-                  </a:txBody>
-                  <a:tcPr marL="6350" marR="6350" marT="6350" marB="0" anchor="ctr">
-                    <a:lnL w="19050" cap="flat" cmpd="sng" algn="ctr">
-                      <a:solidFill>
-                        <a:schemeClr val="bg1"/>
-                      </a:solidFill>
-                      <a:prstDash val="solid"/>
-                      <a:round/>
-                      <a:headEnd type="none" w="med" len="med"/>
-                      <a:tailEnd type="none" w="med" len="med"/>
-                    </a:lnL>
-                    <a:lnR w="19050" cap="flat" cmpd="sng" algn="ctr">
-                      <a:solidFill>
-                        <a:schemeClr val="bg1"/>
-                      </a:solidFill>
-                      <a:prstDash val="solid"/>
-                      <a:round/>
-                      <a:headEnd type="none" w="med" len="med"/>
-                      <a:tailEnd type="none" w="med" len="med"/>
-                    </a:lnR>
-                    <a:lnT w="19050" cap="flat" cmpd="sng" algn="ctr">
-                      <a:solidFill>
-                        <a:schemeClr val="bg1"/>
-                      </a:solidFill>
-                      <a:prstDash val="solid"/>
-                      <a:round/>
-                      <a:headEnd type="none" w="med" len="med"/>
-                      <a:tailEnd type="none" w="med" len="med"/>
-                    </a:lnT>
-                    <a:lnB w="19050" cap="flat" cmpd="sng" algn="ctr">
-                      <a:solidFill>
-                        <a:schemeClr val="bg1"/>
-                      </a:solidFill>
-                      <a:prstDash val="solid"/>
-                      <a:round/>
-                      <a:headEnd type="none" w="med" len="med"/>
-                      <a:tailEnd type="none" w="med" len="med"/>
-                    </a:lnB>
-                    <a:solidFill>
-                      <a:srgbClr val="FFFF00"/>
-                    </a:solidFill>
-                  </a:tcPr>
-                </a:tc>
-                <a:tc>
-                  <a:txBody>
-                    <a:bodyPr/>
-                    <a:lstStyle/>
-                    <a:p>
-                      <a:pPr algn="ctr" fontAlgn="ctr"/>
-                      <a:endParaRPr lang="pt-BR" sz="1400" b="0" i="0" u="none" strike="noStrike">
-                        <a:solidFill>
-                          <a:schemeClr val="tx2"/>
-                        </a:solidFill>
-                        <a:effectLst/>
-                        <a:latin typeface="Arial" panose="020B0604020202020204" pitchFamily="34" charset="0"/>
-                        <a:cs typeface="Arial" panose="020B0604020202020204" pitchFamily="34" charset="0"/>
-                      </a:endParaRPr>
-                    </a:p>
-                  </a:txBody>
-                  <a:tcPr marL="6350" marR="6350" marT="6350" marB="0" anchor="ctr">
-                    <a:lnL w="19050" cap="flat" cmpd="sng" algn="ctr">
-                      <a:solidFill>
-                        <a:schemeClr val="bg1"/>
-                      </a:solidFill>
-                      <a:prstDash val="solid"/>
-                      <a:round/>
-                      <a:headEnd type="none" w="med" len="med"/>
-                      <a:tailEnd type="none" w="med" len="med"/>
-                    </a:lnL>
-                    <a:lnR w="19050" cap="flat" cmpd="sng" algn="ctr">
-                      <a:solidFill>
-                        <a:schemeClr val="bg1"/>
-                      </a:solidFill>
-                      <a:prstDash val="solid"/>
-                      <a:round/>
-                      <a:headEnd type="none" w="med" len="med"/>
-                      <a:tailEnd type="none" w="med" len="med"/>
-                    </a:lnR>
-                    <a:lnT w="19050" cap="flat" cmpd="sng" algn="ctr">
-                      <a:solidFill>
-                        <a:schemeClr val="bg1"/>
-                      </a:solidFill>
-                      <a:prstDash val="solid"/>
-                      <a:round/>
-                      <a:headEnd type="none" w="med" len="med"/>
-                      <a:tailEnd type="none" w="med" len="med"/>
-                    </a:lnT>
-                    <a:lnB w="19050" cap="flat" cmpd="sng" algn="ctr">
-                      <a:solidFill>
-                        <a:schemeClr val="bg1"/>
-                      </a:solidFill>
-                      <a:prstDash val="solid"/>
-                      <a:round/>
-                      <a:headEnd type="none" w="med" len="med"/>
-                      <a:tailEnd type="none" w="med" len="med"/>
-                    </a:lnB>
-                    <a:noFill/>
-                  </a:tcPr>
-                </a:tc>
-                <a:tc>
-                  <a:txBody>
-                    <a:bodyPr/>
-                    <a:lstStyle/>
-                    <a:p>
-                      <a:pPr algn="l" fontAlgn="ctr"/>
-                      <a:r>
-                        <a:rPr lang="pt-BR" sz="1400" u="none" strike="noStrike" dirty="0">
-                          <a:solidFill>
-                            <a:schemeClr val="tx2"/>
-                          </a:solidFill>
-                          <a:effectLst/>
-                          <a:latin typeface="Arial" panose="020B0604020202020204" pitchFamily="34" charset="0"/>
-                          <a:cs typeface="Arial" panose="020B0604020202020204" pitchFamily="34" charset="0"/>
-                        </a:rPr>
-                        <a:t>Roteiros</a:t>
-                      </a:r>
-                      <a:endParaRPr lang="pt-BR" sz="1400" b="0" i="0" u="none" strike="noStrike" dirty="0">
-                        <a:solidFill>
-                          <a:schemeClr val="tx2"/>
-                        </a:solidFill>
-                        <a:effectLst/>
-                        <a:latin typeface="Arial" panose="020B0604020202020204" pitchFamily="34" charset="0"/>
-                        <a:cs typeface="Arial" panose="020B0604020202020204" pitchFamily="34" charset="0"/>
-                      </a:endParaRPr>
-                    </a:p>
-                  </a:txBody>
-                  <a:tcPr marL="6350" marR="6350" marT="6350" marB="0" anchor="ctr">
-                    <a:lnL w="19050" cap="flat" cmpd="sng" algn="ctr">
-                      <a:solidFill>
-                        <a:schemeClr val="bg1"/>
-                      </a:solidFill>
-                      <a:prstDash val="solid"/>
-                      <a:round/>
-                      <a:headEnd type="none" w="med" len="med"/>
-                      <a:tailEnd type="none" w="med" len="med"/>
-                    </a:lnL>
-                    <a:lnR w="19050" cap="flat" cmpd="sng" algn="ctr">
-                      <a:solidFill>
-                        <a:schemeClr val="bg1"/>
-                      </a:solidFill>
-                      <a:prstDash val="solid"/>
-                      <a:round/>
-                      <a:headEnd type="none" w="med" len="med"/>
-                      <a:tailEnd type="none" w="med" len="med"/>
-                    </a:lnR>
-                    <a:lnT w="19050" cap="flat" cmpd="sng" algn="ctr">
-                      <a:solidFill>
-                        <a:schemeClr val="bg1"/>
-                      </a:solidFill>
-                      <a:prstDash val="solid"/>
-                      <a:round/>
-                      <a:headEnd type="none" w="med" len="med"/>
-                      <a:tailEnd type="none" w="med" len="med"/>
-                    </a:lnT>
-                    <a:lnB w="19050" cap="flat" cmpd="sng" algn="ctr">
-                      <a:solidFill>
-                        <a:schemeClr val="bg1"/>
-                      </a:solidFill>
-                      <a:prstDash val="solid"/>
-                      <a:round/>
-                      <a:headEnd type="none" w="med" len="med"/>
-                      <a:tailEnd type="none" w="med" len="med"/>
-                    </a:lnB>
-                    <a:noFill/>
-                  </a:tcPr>
-                </a:tc>
-                <a:tc>
-                  <a:txBody>
-                    <a:bodyPr/>
-                    <a:lstStyle/>
-                    <a:p>
-                      <a:pPr algn="ctr" fontAlgn="ctr"/>
-                      <a:r>
-                        <a:rPr lang="pt-BR" sz="1400" b="0" i="0" u="none" strike="noStrike">
-                          <a:solidFill>
-                            <a:schemeClr val="tx2"/>
-                          </a:solidFill>
-                          <a:effectLst/>
-                          <a:latin typeface="Arial"/>
-                          <a:cs typeface="Arial"/>
-                        </a:rPr>
-                        <a:t>0%</a:t>
-                      </a:r>
-                    </a:p>
-                  </a:txBody>
-                  <a:tcPr marL="0" marR="0" marT="0" marB="0" anchor="ctr">
-                    <a:lnL w="19050" cap="flat" cmpd="sng" algn="ctr">
-                      <a:solidFill>
-                        <a:schemeClr val="bg1"/>
-                      </a:solidFill>
-                      <a:prstDash val="solid"/>
-                      <a:round/>
-                      <a:headEnd type="none" w="med" len="med"/>
-                      <a:tailEnd type="none" w="med" len="med"/>
-                    </a:lnL>
-                    <a:lnR w="19050" cap="flat" cmpd="sng" algn="ctr">
-                      <a:solidFill>
-                        <a:schemeClr val="bg1"/>
-                      </a:solidFill>
-                      <a:prstDash val="solid"/>
-                      <a:round/>
-                      <a:headEnd type="none" w="med" len="med"/>
-                      <a:tailEnd type="none" w="med" len="med"/>
-                    </a:lnR>
-                    <a:lnT w="19050" cap="flat" cmpd="sng" algn="ctr">
-                      <a:solidFill>
-                        <a:schemeClr val="bg1"/>
-                      </a:solidFill>
-                      <a:prstDash val="solid"/>
-                      <a:round/>
-                      <a:headEnd type="none" w="med" len="med"/>
-                      <a:tailEnd type="none" w="med" len="med"/>
-                    </a:lnT>
-                    <a:lnB w="19050" cap="flat" cmpd="sng" algn="ctr">
-                      <a:solidFill>
-                        <a:schemeClr val="bg1"/>
-                      </a:solidFill>
-                      <a:prstDash val="solid"/>
-                      <a:round/>
-                      <a:headEnd type="none" w="med" len="med"/>
-                      <a:tailEnd type="none" w="med" len="med"/>
-                    </a:lnB>
-                    <a:noFill/>
-                  </a:tcPr>
-                </a:tc>
-                <a:extLst>
-                  <a:ext uri="{0D108BD9-81ED-4DB2-BD59-A6C34878D82A}">
-                    <a16:rowId xmlns:a16="http://schemas.microsoft.com/office/drawing/2014/main" val="3206921140"/>
-                  </a:ext>
-                </a:extLst>
-              </a:tr>
-              <a:tr h="252000">
-                <a:tc>
-                  <a:txBody>
-                    <a:bodyPr/>
-                    <a:lstStyle/>
-                    <a:p>
-                      <a:pPr algn="ctr" fontAlgn="ctr"/>
-                      <a:endParaRPr lang="pt-BR" sz="1400" b="0" i="0" u="none" strike="noStrike" dirty="0">
-                        <a:solidFill>
-                          <a:schemeClr val="tx2"/>
-                        </a:solidFill>
-                        <a:effectLst/>
-                        <a:latin typeface="Arial" panose="020B0604020202020204" pitchFamily="34" charset="0"/>
-                        <a:cs typeface="Arial" panose="020B0604020202020204" pitchFamily="34" charset="0"/>
-                      </a:endParaRPr>
-                    </a:p>
-                  </a:txBody>
-                  <a:tcPr marL="6350" marR="6350" marT="6350" marB="0" anchor="ctr">
-                    <a:lnL w="19050" cap="flat" cmpd="sng" algn="ctr">
-                      <a:solidFill>
-                        <a:schemeClr val="bg1"/>
-                      </a:solidFill>
-                      <a:prstDash val="solid"/>
-                      <a:round/>
-                      <a:headEnd type="none" w="med" len="med"/>
-                      <a:tailEnd type="none" w="med" len="med"/>
-                    </a:lnL>
-                    <a:lnR w="19050" cap="flat" cmpd="sng" algn="ctr">
-                      <a:solidFill>
-                        <a:schemeClr val="bg1"/>
-                      </a:solidFill>
-                      <a:prstDash val="solid"/>
-                      <a:round/>
-                      <a:headEnd type="none" w="med" len="med"/>
-                      <a:tailEnd type="none" w="med" len="med"/>
-                    </a:lnR>
-                    <a:lnT w="19050" cap="flat" cmpd="sng" algn="ctr">
-                      <a:solidFill>
-                        <a:schemeClr val="bg1"/>
-                      </a:solidFill>
-                      <a:prstDash val="solid"/>
-                      <a:round/>
-                      <a:headEnd type="none" w="med" len="med"/>
-                      <a:tailEnd type="none" w="med" len="med"/>
-                    </a:lnT>
-                    <a:lnB w="19050" cap="flat" cmpd="sng" algn="ctr">
-                      <a:solidFill>
-                        <a:schemeClr val="bg1"/>
-                      </a:solidFill>
-                      <a:prstDash val="solid"/>
-                      <a:round/>
-                      <a:headEnd type="none" w="med" len="med"/>
-                      <a:tailEnd type="none" w="med" len="med"/>
-                    </a:lnB>
-                    <a:solidFill>
-                      <a:schemeClr val="tx1">
-                        <a:lumMod val="50000"/>
-                        <a:lumOff val="50000"/>
-                      </a:schemeClr>
-                    </a:solidFill>
-                  </a:tcPr>
-                </a:tc>
-                <a:tc>
-                  <a:txBody>
-                    <a:bodyPr/>
-                    <a:lstStyle/>
-                    <a:p>
-                      <a:pPr algn="ctr" fontAlgn="ctr"/>
-                      <a:endParaRPr lang="pt-BR" sz="1400" b="0" i="0" u="none" strike="noStrike">
-                        <a:solidFill>
-                          <a:schemeClr val="tx2"/>
-                        </a:solidFill>
-                        <a:effectLst/>
-                        <a:latin typeface="Arial" panose="020B0604020202020204" pitchFamily="34" charset="0"/>
-                        <a:cs typeface="Arial" panose="020B0604020202020204" pitchFamily="34" charset="0"/>
-                      </a:endParaRPr>
-                    </a:p>
-                  </a:txBody>
-                  <a:tcPr marL="6350" marR="6350" marT="6350" marB="0" anchor="ctr">
-                    <a:lnL w="19050" cap="flat" cmpd="sng" algn="ctr">
-                      <a:solidFill>
-                        <a:schemeClr val="bg1"/>
-                      </a:solidFill>
-                      <a:prstDash val="solid"/>
-                      <a:round/>
-                      <a:headEnd type="none" w="med" len="med"/>
-                      <a:tailEnd type="none" w="med" len="med"/>
-                    </a:lnL>
-                    <a:lnR w="19050" cap="flat" cmpd="sng" algn="ctr">
-                      <a:solidFill>
-                        <a:schemeClr val="bg1"/>
-                      </a:solidFill>
-                      <a:prstDash val="solid"/>
-                      <a:round/>
-                      <a:headEnd type="none" w="med" len="med"/>
-                      <a:tailEnd type="none" w="med" len="med"/>
-                    </a:lnR>
-                    <a:lnT w="19050" cap="flat" cmpd="sng" algn="ctr">
-                      <a:solidFill>
-                        <a:schemeClr val="bg1"/>
-                      </a:solidFill>
-                      <a:prstDash val="solid"/>
-                      <a:round/>
-                      <a:headEnd type="none" w="med" len="med"/>
-                      <a:tailEnd type="none" w="med" len="med"/>
-                    </a:lnT>
-                    <a:lnB w="19050" cap="flat" cmpd="sng" algn="ctr">
-                      <a:solidFill>
-                        <a:schemeClr val="bg1"/>
-                      </a:solidFill>
-                      <a:prstDash val="solid"/>
-                      <a:round/>
-                      <a:headEnd type="none" w="med" len="med"/>
-                      <a:tailEnd type="none" w="med" len="med"/>
-                    </a:lnB>
-                    <a:noFill/>
-                  </a:tcPr>
-                </a:tc>
-                <a:tc>
-                  <a:txBody>
-                    <a:bodyPr/>
-                    <a:lstStyle/>
-                    <a:p>
-                      <a:pPr algn="l" fontAlgn="ctr"/>
-                      <a:r>
-                        <a:rPr lang="pt-BR" sz="1400" u="none" strike="noStrike" dirty="0">
-                          <a:solidFill>
-                            <a:schemeClr val="tx2"/>
-                          </a:solidFill>
-                          <a:effectLst/>
-                          <a:latin typeface="Arial" panose="020B0604020202020204" pitchFamily="34" charset="0"/>
-                          <a:cs typeface="Arial" panose="020B0604020202020204" pitchFamily="34" charset="0"/>
-                        </a:rPr>
-                        <a:t>Comunicação</a:t>
-                      </a:r>
-                      <a:endParaRPr lang="pt-BR" sz="1400" b="0" i="0" u="none" strike="noStrike" dirty="0">
-                        <a:solidFill>
-                          <a:schemeClr val="tx2"/>
-                        </a:solidFill>
-                        <a:effectLst/>
-                        <a:latin typeface="Arial" panose="020B0604020202020204" pitchFamily="34" charset="0"/>
-                        <a:cs typeface="Arial" panose="020B0604020202020204" pitchFamily="34" charset="0"/>
-                      </a:endParaRPr>
-                    </a:p>
-                  </a:txBody>
-                  <a:tcPr marL="6350" marR="6350" marT="6350" marB="0" anchor="ctr">
-                    <a:lnL w="19050" cap="flat" cmpd="sng" algn="ctr">
-                      <a:solidFill>
-                        <a:schemeClr val="bg1"/>
-                      </a:solidFill>
-                      <a:prstDash val="solid"/>
-                      <a:round/>
-                      <a:headEnd type="none" w="med" len="med"/>
-                      <a:tailEnd type="none" w="med" len="med"/>
-                    </a:lnL>
-                    <a:lnR w="19050" cap="flat" cmpd="sng" algn="ctr">
-                      <a:solidFill>
-                        <a:schemeClr val="bg1"/>
-                      </a:solidFill>
-                      <a:prstDash val="solid"/>
-                      <a:round/>
-                      <a:headEnd type="none" w="med" len="med"/>
-                      <a:tailEnd type="none" w="med" len="med"/>
-                    </a:lnR>
-                    <a:lnT w="19050" cap="flat" cmpd="sng" algn="ctr">
-                      <a:solidFill>
-                        <a:schemeClr val="bg1"/>
-                      </a:solidFill>
-                      <a:prstDash val="solid"/>
-                      <a:round/>
-                      <a:headEnd type="none" w="med" len="med"/>
-                      <a:tailEnd type="none" w="med" len="med"/>
-                    </a:lnT>
-                    <a:lnB w="19050" cap="flat" cmpd="sng" algn="ctr">
-                      <a:solidFill>
-                        <a:schemeClr val="bg1"/>
-                      </a:solidFill>
-                      <a:prstDash val="solid"/>
-                      <a:round/>
-                      <a:headEnd type="none" w="med" len="med"/>
-                      <a:tailEnd type="none" w="med" len="med"/>
-                    </a:lnB>
-                    <a:noFill/>
-                  </a:tcPr>
-                </a:tc>
-                <a:tc>
-                  <a:txBody>
-                    <a:bodyPr/>
-                    <a:lstStyle/>
-                    <a:p>
-                      <a:pPr lvl="0" algn="ctr">
-                        <a:buNone/>
-                      </a:pPr>
-                      <a:r>
-                        <a:rPr lang="pt-BR" sz="1400" b="0" i="0" u="none" strike="noStrike">
-                          <a:solidFill>
-                            <a:schemeClr val="tx2"/>
-                          </a:solidFill>
-                          <a:effectLst/>
-                          <a:latin typeface="Arial"/>
-                          <a:cs typeface="Arial"/>
-                        </a:rPr>
-                        <a:t>0%</a:t>
-                      </a:r>
-                    </a:p>
-                  </a:txBody>
-                  <a:tcPr marL="0" marR="0" marT="0" marB="0" anchor="ctr">
-                    <a:lnL w="19050" cap="flat" cmpd="sng" algn="ctr">
-                      <a:solidFill>
-                        <a:schemeClr val="bg1"/>
-                      </a:solidFill>
-                      <a:prstDash val="solid"/>
-                      <a:round/>
-                      <a:headEnd type="none" w="med" len="med"/>
-                      <a:tailEnd type="none" w="med" len="med"/>
-                    </a:lnL>
-                    <a:lnR w="19050" cap="flat" cmpd="sng" algn="ctr">
-                      <a:solidFill>
-                        <a:schemeClr val="bg1"/>
-                      </a:solidFill>
-                      <a:prstDash val="solid"/>
-                      <a:round/>
-                      <a:headEnd type="none" w="med" len="med"/>
-                      <a:tailEnd type="none" w="med" len="med"/>
-                    </a:lnR>
-                    <a:lnT w="19050" cap="flat" cmpd="sng" algn="ctr">
-                      <a:solidFill>
-                        <a:schemeClr val="bg1"/>
-                      </a:solidFill>
-                      <a:prstDash val="solid"/>
-                      <a:round/>
-                      <a:headEnd type="none" w="med" len="med"/>
-                      <a:tailEnd type="none" w="med" len="med"/>
-                    </a:lnT>
-                    <a:lnB w="19050" cap="flat" cmpd="sng" algn="ctr">
-                      <a:solidFill>
-                        <a:schemeClr val="bg1"/>
-                      </a:solidFill>
-                      <a:prstDash val="solid"/>
-                      <a:round/>
-                      <a:headEnd type="none" w="med" len="med"/>
-                      <a:tailEnd type="none" w="med" len="med"/>
-                    </a:lnB>
-                    <a:noFill/>
-                  </a:tcPr>
-                </a:tc>
-                <a:extLst>
-                  <a:ext uri="{0D108BD9-81ED-4DB2-BD59-A6C34878D82A}">
-                    <a16:rowId xmlns:a16="http://schemas.microsoft.com/office/drawing/2014/main" val="2042666682"/>
-                  </a:ext>
-                </a:extLst>
-              </a:tr>
-              <a:tr h="252000">
-                <a:tc>
-                  <a:txBody>
-                    <a:bodyPr/>
-                    <a:lstStyle/>
-                    <a:p>
-                      <a:pPr algn="ctr" fontAlgn="ctr"/>
-                      <a:endParaRPr lang="pt-BR" sz="1400" b="0" i="0" u="none" strike="noStrike" dirty="0">
-                        <a:solidFill>
-                          <a:schemeClr val="tx2"/>
-                        </a:solidFill>
-                        <a:effectLst/>
-                        <a:latin typeface="Arial" panose="020B0604020202020204" pitchFamily="34" charset="0"/>
-                        <a:cs typeface="Arial" panose="020B0604020202020204" pitchFamily="34" charset="0"/>
-                      </a:endParaRPr>
-                    </a:p>
-                  </a:txBody>
-                  <a:tcPr marL="6350" marR="6350" marT="6350" marB="0" anchor="ctr">
-                    <a:lnL w="19050" cap="flat" cmpd="sng" algn="ctr">
-                      <a:solidFill>
-                        <a:schemeClr val="bg1"/>
-                      </a:solidFill>
-                      <a:prstDash val="solid"/>
-                      <a:round/>
-                      <a:headEnd type="none" w="med" len="med"/>
-                      <a:tailEnd type="none" w="med" len="med"/>
-                    </a:lnL>
-                    <a:lnR w="19050" cap="flat" cmpd="sng" algn="ctr">
-                      <a:solidFill>
-                        <a:schemeClr val="bg1"/>
-                      </a:solidFill>
-                      <a:prstDash val="solid"/>
-                      <a:round/>
-                      <a:headEnd type="none" w="med" len="med"/>
-                      <a:tailEnd type="none" w="med" len="med"/>
-                    </a:lnR>
-                    <a:lnT w="19050" cap="flat" cmpd="sng" algn="ctr">
-                      <a:solidFill>
-                        <a:schemeClr val="bg1"/>
-                      </a:solidFill>
-                      <a:prstDash val="solid"/>
-                      <a:round/>
-                      <a:headEnd type="none" w="med" len="med"/>
-                      <a:tailEnd type="none" w="med" len="med"/>
-                    </a:lnT>
-                    <a:lnB w="19050" cap="flat" cmpd="sng" algn="ctr">
-                      <a:solidFill>
-                        <a:schemeClr val="bg1"/>
-                      </a:solidFill>
-                      <a:prstDash val="solid"/>
-                      <a:round/>
-                      <a:headEnd type="none" w="med" len="med"/>
-                      <a:tailEnd type="none" w="med" len="med"/>
-                    </a:lnB>
-                    <a:solidFill>
-                      <a:schemeClr val="tx1">
-                        <a:lumMod val="50000"/>
-                        <a:lumOff val="50000"/>
-                      </a:schemeClr>
-                    </a:solidFill>
-                  </a:tcPr>
-                </a:tc>
-                <a:tc>
-                  <a:txBody>
-                    <a:bodyPr/>
-                    <a:lstStyle/>
-                    <a:p>
-                      <a:pPr algn="ctr" fontAlgn="ctr"/>
-                      <a:endParaRPr lang="pt-BR" sz="1400" b="0" i="0" u="none" strike="noStrike">
-                        <a:solidFill>
-                          <a:schemeClr val="tx2"/>
-                        </a:solidFill>
-                        <a:effectLst/>
-                        <a:latin typeface="Arial" panose="020B0604020202020204" pitchFamily="34" charset="0"/>
-                        <a:cs typeface="Arial" panose="020B0604020202020204" pitchFamily="34" charset="0"/>
-                      </a:endParaRPr>
-                    </a:p>
-                  </a:txBody>
-                  <a:tcPr marL="6350" marR="6350" marT="6350" marB="0" anchor="ctr">
-                    <a:lnL w="19050" cap="flat" cmpd="sng" algn="ctr">
-                      <a:solidFill>
-                        <a:schemeClr val="bg1"/>
-                      </a:solidFill>
-                      <a:prstDash val="solid"/>
-                      <a:round/>
-                      <a:headEnd type="none" w="med" len="med"/>
-                      <a:tailEnd type="none" w="med" len="med"/>
-                    </a:lnL>
-                    <a:lnR w="19050" cap="flat" cmpd="sng" algn="ctr">
-                      <a:solidFill>
-                        <a:schemeClr val="bg1"/>
-                      </a:solidFill>
-                      <a:prstDash val="solid"/>
-                      <a:round/>
-                      <a:headEnd type="none" w="med" len="med"/>
-                      <a:tailEnd type="none" w="med" len="med"/>
-                    </a:lnR>
-                    <a:lnT w="19050" cap="flat" cmpd="sng" algn="ctr">
-                      <a:solidFill>
-                        <a:schemeClr val="bg1"/>
-                      </a:solidFill>
-                      <a:prstDash val="solid"/>
-                      <a:round/>
-                      <a:headEnd type="none" w="med" len="med"/>
-                      <a:tailEnd type="none" w="med" len="med"/>
-                    </a:lnT>
-                    <a:lnB w="19050" cap="flat" cmpd="sng" algn="ctr">
-                      <a:solidFill>
-                        <a:schemeClr val="bg1"/>
-                      </a:solidFill>
-                      <a:prstDash val="solid"/>
-                      <a:round/>
-                      <a:headEnd type="none" w="med" len="med"/>
-                      <a:tailEnd type="none" w="med" len="med"/>
-                    </a:lnB>
-                    <a:noFill/>
-                  </a:tcPr>
-                </a:tc>
-                <a:tc>
-                  <a:txBody>
-                    <a:bodyPr/>
-                    <a:lstStyle/>
-                    <a:p>
-                      <a:pPr algn="l" fontAlgn="ctr"/>
-                      <a:r>
-                        <a:rPr lang="pt-BR" sz="1400" b="0" i="0" u="none" strike="noStrike" dirty="0">
-                          <a:solidFill>
-                            <a:schemeClr val="tx2"/>
-                          </a:solidFill>
-                          <a:effectLst/>
-                          <a:latin typeface="Arial" panose="020B0604020202020204" pitchFamily="34" charset="0"/>
-                          <a:cs typeface="Arial" panose="020B0604020202020204" pitchFamily="34" charset="0"/>
-                        </a:rPr>
-                        <a:t>Ajustes</a:t>
-                      </a:r>
-                    </a:p>
-                  </a:txBody>
-                  <a:tcPr marL="6350" marR="6350" marT="6350" marB="0" anchor="ctr">
-                    <a:lnL w="19050" cap="flat" cmpd="sng" algn="ctr">
-                      <a:solidFill>
-                        <a:schemeClr val="bg1"/>
-                      </a:solidFill>
-                      <a:prstDash val="solid"/>
-                      <a:round/>
-                      <a:headEnd type="none" w="med" len="med"/>
-                      <a:tailEnd type="none" w="med" len="med"/>
-                    </a:lnL>
-                    <a:lnR w="19050" cap="flat" cmpd="sng" algn="ctr">
-                      <a:solidFill>
-                        <a:schemeClr val="bg1"/>
-                      </a:solidFill>
-                      <a:prstDash val="solid"/>
-                      <a:round/>
-                      <a:headEnd type="none" w="med" len="med"/>
-                      <a:tailEnd type="none" w="med" len="med"/>
-                    </a:lnR>
-                    <a:lnT w="19050" cap="flat" cmpd="sng" algn="ctr">
-                      <a:solidFill>
-                        <a:schemeClr val="bg1"/>
-                      </a:solidFill>
-                      <a:prstDash val="solid"/>
-                      <a:round/>
-                      <a:headEnd type="none" w="med" len="med"/>
-                      <a:tailEnd type="none" w="med" len="med"/>
-                    </a:lnT>
-                    <a:lnB w="19050" cap="flat" cmpd="sng" algn="ctr">
-                      <a:solidFill>
-                        <a:schemeClr val="bg1"/>
-                      </a:solidFill>
-                      <a:prstDash val="solid"/>
-                      <a:round/>
-                      <a:headEnd type="none" w="med" len="med"/>
-                      <a:tailEnd type="none" w="med" len="med"/>
-                    </a:lnB>
-                    <a:noFill/>
-                  </a:tcPr>
-                </a:tc>
-                <a:tc>
-                  <a:txBody>
-                    <a:bodyPr/>
-                    <a:lstStyle/>
-                    <a:p>
-                      <a:pPr lvl="0" algn="ctr">
-                        <a:buNone/>
-                      </a:pPr>
-                      <a:r>
-                        <a:rPr lang="pt-BR" sz="1400" b="0" i="0" u="none" strike="noStrike">
-                          <a:solidFill>
-                            <a:schemeClr val="tx2"/>
-                          </a:solidFill>
-                          <a:effectLst/>
-                          <a:latin typeface="Arial"/>
-                          <a:cs typeface="Arial"/>
-                        </a:rPr>
-                        <a:t>0%</a:t>
-                      </a:r>
-                    </a:p>
-                  </a:txBody>
-                  <a:tcPr marL="0" marR="0" marT="0" marB="0" anchor="ctr">
-                    <a:lnL w="19050" cap="flat" cmpd="sng" algn="ctr">
-                      <a:solidFill>
-                        <a:schemeClr val="bg1"/>
-                      </a:solidFill>
-                      <a:prstDash val="solid"/>
-                      <a:round/>
-                      <a:headEnd type="none" w="med" len="med"/>
-                      <a:tailEnd type="none" w="med" len="med"/>
-                    </a:lnL>
-                    <a:lnR w="19050" cap="flat" cmpd="sng" algn="ctr">
-                      <a:solidFill>
-                        <a:schemeClr val="bg1"/>
-                      </a:solidFill>
-                      <a:prstDash val="solid"/>
-                      <a:round/>
-                      <a:headEnd type="none" w="med" len="med"/>
-                      <a:tailEnd type="none" w="med" len="med"/>
-                    </a:lnR>
-                    <a:lnT w="19050" cap="flat" cmpd="sng" algn="ctr">
-                      <a:solidFill>
-                        <a:schemeClr val="bg1"/>
-                      </a:solidFill>
-                      <a:prstDash val="solid"/>
-                      <a:round/>
-                      <a:headEnd type="none" w="med" len="med"/>
-                      <a:tailEnd type="none" w="med" len="med"/>
-                    </a:lnT>
-                    <a:lnB w="19050" cap="flat" cmpd="sng" algn="ctr">
-                      <a:solidFill>
-                        <a:schemeClr val="bg1"/>
-                      </a:solidFill>
-                      <a:prstDash val="solid"/>
-                      <a:round/>
-                      <a:headEnd type="none" w="med" len="med"/>
-                      <a:tailEnd type="none" w="med" len="med"/>
-                    </a:lnB>
-                    <a:noFill/>
-                  </a:tcPr>
-                </a:tc>
-                <a:extLst>
-                  <a:ext uri="{0D108BD9-81ED-4DB2-BD59-A6C34878D82A}">
-                    <a16:rowId xmlns:a16="http://schemas.microsoft.com/office/drawing/2014/main" val="1508046890"/>
-                  </a:ext>
-                </a:extLst>
-              </a:tr>
-              <a:tr h="252000">
-                <a:tc>
-                  <a:txBody>
-                    <a:bodyPr/>
-                    <a:lstStyle/>
-                    <a:p>
-                      <a:pPr algn="ctr" fontAlgn="ctr"/>
-                      <a:endParaRPr lang="pt-BR" sz="1400" b="0" i="0" u="none" strike="noStrike" dirty="0">
-                        <a:solidFill>
-                          <a:schemeClr val="tx2"/>
-                        </a:solidFill>
-                        <a:effectLst/>
-                        <a:latin typeface="Arial" panose="020B0604020202020204" pitchFamily="34" charset="0"/>
-                        <a:cs typeface="Arial" panose="020B0604020202020204" pitchFamily="34" charset="0"/>
-                      </a:endParaRPr>
-                    </a:p>
-                  </a:txBody>
-                  <a:tcPr marL="6350" marR="6350" marT="6350" marB="0" anchor="ctr">
-                    <a:lnL w="19050" cap="flat" cmpd="sng" algn="ctr">
-                      <a:solidFill>
-                        <a:schemeClr val="bg1"/>
-                      </a:solidFill>
-                      <a:prstDash val="solid"/>
-                      <a:round/>
-                      <a:headEnd type="none" w="med" len="med"/>
-                      <a:tailEnd type="none" w="med" len="med"/>
-                    </a:lnL>
-                    <a:lnR w="19050" cap="flat" cmpd="sng" algn="ctr">
-                      <a:solidFill>
-                        <a:schemeClr val="bg1"/>
-                      </a:solidFill>
-                      <a:prstDash val="solid"/>
-                      <a:round/>
-                      <a:headEnd type="none" w="med" len="med"/>
-                      <a:tailEnd type="none" w="med" len="med"/>
-                    </a:lnR>
-                    <a:lnT w="19050" cap="flat" cmpd="sng" algn="ctr">
-                      <a:solidFill>
-                        <a:schemeClr val="bg1"/>
-                      </a:solidFill>
-                      <a:prstDash val="solid"/>
-                      <a:round/>
-                      <a:headEnd type="none" w="med" len="med"/>
-                      <a:tailEnd type="none" w="med" len="med"/>
-                    </a:lnT>
-                    <a:lnB w="19050" cap="flat" cmpd="sng" algn="ctr">
-                      <a:solidFill>
-                        <a:schemeClr val="bg1"/>
-                      </a:solidFill>
-                      <a:prstDash val="solid"/>
-                      <a:round/>
-                      <a:headEnd type="none" w="med" len="med"/>
-                      <a:tailEnd type="none" w="med" len="med"/>
-                    </a:lnB>
-                    <a:solidFill>
-                      <a:schemeClr val="tx1">
-                        <a:lumMod val="50000"/>
-                        <a:lumOff val="50000"/>
-                      </a:schemeClr>
-                    </a:solidFill>
-                  </a:tcPr>
-                </a:tc>
-                <a:tc>
-                  <a:txBody>
-                    <a:bodyPr/>
-                    <a:lstStyle/>
-                    <a:p>
-                      <a:pPr algn="ctr" fontAlgn="ctr"/>
-                      <a:endParaRPr lang="pt-BR" sz="1400" b="0" i="0" u="none" strike="noStrike">
-                        <a:solidFill>
-                          <a:schemeClr val="tx2"/>
-                        </a:solidFill>
-                        <a:effectLst/>
-                        <a:latin typeface="Arial" panose="020B0604020202020204" pitchFamily="34" charset="0"/>
-                        <a:cs typeface="Arial" panose="020B0604020202020204" pitchFamily="34" charset="0"/>
-                      </a:endParaRPr>
-                    </a:p>
-                  </a:txBody>
-                  <a:tcPr marL="6350" marR="6350" marT="6350" marB="0" anchor="ctr">
-                    <a:lnL w="19050" cap="flat" cmpd="sng" algn="ctr">
-                      <a:solidFill>
-                        <a:schemeClr val="bg1"/>
-                      </a:solidFill>
-                      <a:prstDash val="solid"/>
-                      <a:round/>
-                      <a:headEnd type="none" w="med" len="med"/>
-                      <a:tailEnd type="none" w="med" len="med"/>
-                    </a:lnL>
-                    <a:lnR w="19050" cap="flat" cmpd="sng" algn="ctr">
-                      <a:solidFill>
-                        <a:schemeClr val="bg1"/>
-                      </a:solidFill>
-                      <a:prstDash val="solid"/>
-                      <a:round/>
-                      <a:headEnd type="none" w="med" len="med"/>
-                      <a:tailEnd type="none" w="med" len="med"/>
-                    </a:lnR>
-                    <a:lnT w="19050" cap="flat" cmpd="sng" algn="ctr">
-                      <a:solidFill>
-                        <a:schemeClr val="bg1"/>
-                      </a:solidFill>
-                      <a:prstDash val="solid"/>
-                      <a:round/>
-                      <a:headEnd type="none" w="med" len="med"/>
-                      <a:tailEnd type="none" w="med" len="med"/>
-                    </a:lnT>
-                    <a:lnB w="19050" cap="flat" cmpd="sng" algn="ctr">
-                      <a:solidFill>
-                        <a:schemeClr val="bg1"/>
-                      </a:solidFill>
-                      <a:prstDash val="solid"/>
-                      <a:round/>
-                      <a:headEnd type="none" w="med" len="med"/>
-                      <a:tailEnd type="none" w="med" len="med"/>
-                    </a:lnB>
-                    <a:noFill/>
-                  </a:tcPr>
-                </a:tc>
-                <a:tc>
-                  <a:txBody>
-                    <a:bodyPr/>
-                    <a:lstStyle/>
-                    <a:p>
-                      <a:pPr algn="l" fontAlgn="ctr"/>
-                      <a:r>
-                        <a:rPr lang="pt-BR" sz="1400" u="none" strike="noStrike" dirty="0">
-                          <a:solidFill>
-                            <a:schemeClr val="tx2"/>
-                          </a:solidFill>
-                          <a:effectLst/>
-                          <a:latin typeface="Arial" panose="020B0604020202020204" pitchFamily="34" charset="0"/>
-                          <a:cs typeface="Arial" panose="020B0604020202020204" pitchFamily="34" charset="0"/>
-                        </a:rPr>
-                        <a:t>Implementação</a:t>
-                      </a:r>
-                      <a:endParaRPr lang="pt-BR" sz="1400" b="0" i="0" u="none" strike="noStrike" dirty="0">
-                        <a:solidFill>
-                          <a:schemeClr val="tx2"/>
-                        </a:solidFill>
-                        <a:effectLst/>
-                        <a:latin typeface="Arial" panose="020B0604020202020204" pitchFamily="34" charset="0"/>
-                        <a:cs typeface="Arial" panose="020B0604020202020204" pitchFamily="34" charset="0"/>
-                      </a:endParaRPr>
-                    </a:p>
-                  </a:txBody>
-                  <a:tcPr marL="6350" marR="6350" marT="6350" marB="0" anchor="ctr">
-                    <a:lnL w="19050" cap="flat" cmpd="sng" algn="ctr">
-                      <a:solidFill>
-                        <a:schemeClr val="bg1"/>
-                      </a:solidFill>
-                      <a:prstDash val="solid"/>
-                      <a:round/>
-                      <a:headEnd type="none" w="med" len="med"/>
-                      <a:tailEnd type="none" w="med" len="med"/>
-                    </a:lnL>
-                    <a:lnR w="19050" cap="flat" cmpd="sng" algn="ctr">
-                      <a:solidFill>
-                        <a:schemeClr val="bg1"/>
-                      </a:solidFill>
-                      <a:prstDash val="solid"/>
-                      <a:round/>
-                      <a:headEnd type="none" w="med" len="med"/>
-                      <a:tailEnd type="none" w="med" len="med"/>
-                    </a:lnR>
-                    <a:lnT w="19050" cap="flat" cmpd="sng" algn="ctr">
-                      <a:solidFill>
-                        <a:schemeClr val="bg1"/>
-                      </a:solidFill>
-                      <a:prstDash val="solid"/>
-                      <a:round/>
-                      <a:headEnd type="none" w="med" len="med"/>
-                      <a:tailEnd type="none" w="med" len="med"/>
-                    </a:lnT>
-                    <a:lnB w="19050" cap="flat" cmpd="sng" algn="ctr">
-                      <a:solidFill>
-                        <a:schemeClr val="bg1"/>
-                      </a:solidFill>
-                      <a:prstDash val="solid"/>
-                      <a:round/>
-                      <a:headEnd type="none" w="med" len="med"/>
-                      <a:tailEnd type="none" w="med" len="med"/>
-                    </a:lnB>
-                    <a:noFill/>
-                  </a:tcPr>
-                </a:tc>
-                <a:tc>
-                  <a:txBody>
-                    <a:bodyPr/>
-                    <a:lstStyle/>
-                    <a:p>
-                      <a:pPr lvl="0" algn="ctr">
-                        <a:buNone/>
-                      </a:pPr>
-                      <a:r>
-                        <a:rPr lang="pt-BR" sz="1400" b="0" i="0" u="none" strike="noStrike" dirty="0">
-                          <a:solidFill>
-                            <a:schemeClr val="tx2"/>
-                          </a:solidFill>
-                          <a:effectLst/>
-                          <a:latin typeface="Arial"/>
-                          <a:cs typeface="Arial"/>
-                        </a:rPr>
-                        <a:t>0%</a:t>
-                      </a:r>
-                    </a:p>
-                  </a:txBody>
-                  <a:tcPr marL="0" marR="0" marT="0" marB="0" anchor="ctr">
-                    <a:lnL w="19050" cap="flat" cmpd="sng" algn="ctr">
-                      <a:solidFill>
-                        <a:schemeClr val="bg1"/>
-                      </a:solidFill>
-                      <a:prstDash val="solid"/>
-                      <a:round/>
-                      <a:headEnd type="none" w="med" len="med"/>
-                      <a:tailEnd type="none" w="med" len="med"/>
-                    </a:lnL>
-                    <a:lnR w="19050" cap="flat" cmpd="sng" algn="ctr">
-                      <a:solidFill>
-                        <a:schemeClr val="bg1"/>
-                      </a:solidFill>
-                      <a:prstDash val="solid"/>
-                      <a:round/>
-                      <a:headEnd type="none" w="med" len="med"/>
-                      <a:tailEnd type="none" w="med" len="med"/>
-                    </a:lnR>
-                    <a:lnT w="19050" cap="flat" cmpd="sng" algn="ctr">
-                      <a:solidFill>
-                        <a:schemeClr val="bg1"/>
-                      </a:solidFill>
-                      <a:prstDash val="solid"/>
-                      <a:round/>
-                      <a:headEnd type="none" w="med" len="med"/>
-                      <a:tailEnd type="none" w="med" len="med"/>
-                    </a:lnT>
-                    <a:lnB w="19050" cap="flat" cmpd="sng" algn="ctr">
-                      <a:solidFill>
-                        <a:schemeClr val="bg1"/>
-                      </a:solidFill>
-                      <a:prstDash val="solid"/>
-                      <a:round/>
-                      <a:headEnd type="none" w="med" len="med"/>
-                      <a:tailEnd type="none" w="med" len="med"/>
-                    </a:lnB>
-                    <a:noFill/>
-                  </a:tcPr>
-                </a:tc>
-                <a:extLst>
-                  <a:ext uri="{0D108BD9-81ED-4DB2-BD59-A6C34878D82A}">
-                    <a16:rowId xmlns:a16="http://schemas.microsoft.com/office/drawing/2014/main" val="1683099304"/>
-                  </a:ext>
-                </a:extLst>
-              </a:tr>
-            </a:tbl>
-          </a:graphicData>
-        </a:graphic>
-      </p:graphicFrame>
       <p:sp>
         <p:nvSpPr>
           <p:cNvPr id="47" name="CaixaDeTexto 46">
@@ -16974,7 +14904,7 @@
                 </a:solidFill>
                 <a:latin typeface="Arial Black" panose="020B0A04020102020204" pitchFamily="34" charset="0"/>
               </a:rPr>
-              <a:t>63%</a:t>
+              <a:t>71%</a:t>
             </a:r>
           </a:p>
         </p:txBody>
@@ -17085,7 +15015,7 @@
           <p:nvPr/>
         </p:nvPicPr>
         <p:blipFill>
-          <a:blip r:embed="rId3">
+          <a:blip r:embed="rId3" cstate="print">
             <a:extLst>
               <a:ext uri="{28A0092B-C50C-407E-A947-70E740481C1C}">
                 <a14:useLocalDpi xmlns:a14="http://schemas.microsoft.com/office/drawing/2010/main" val="0"/>
@@ -17098,7 +15028,7 @@
         </p:blipFill>
         <p:spPr>
           <a:xfrm>
-            <a:off x="549307" y="242934"/>
+            <a:off x="811244" y="231028"/>
             <a:ext cx="1247185" cy="675894"/>
           </a:xfrm>
           <a:prstGeom prst="rect">
@@ -17120,21 +15050,22 @@
         </p:nvSpPr>
         <p:spPr>
           <a:xfrm>
-            <a:off x="3270000" y="1554176"/>
-            <a:ext cx="8026650" cy="338554"/>
+            <a:off x="3683288" y="1425023"/>
+            <a:ext cx="4113328" cy="523220"/>
           </a:xfrm>
           <a:prstGeom prst="rect">
             <a:avLst/>
           </a:prstGeom>
         </p:spPr>
         <p:txBody>
-          <a:bodyPr wrap="square">
+          <a:bodyPr wrap="square" lIns="91440" tIns="45720" rIns="91440" bIns="45720" anchor="t">
             <a:spAutoFit/>
           </a:bodyPr>
           <a:lstStyle/>
           <a:p>
+            <a:pPr algn="ctr"/>
             <a:r>
-              <a:rPr lang="pt-BR" sz="1600" dirty="0">
+              <a:rPr lang="pt-BR" sz="1400" dirty="0">
                 <a:solidFill>
                   <a:schemeClr val="tx2"/>
                 </a:solidFill>
@@ -17143,7 +15074,7 @@
               </a:rPr>
               <a:t>Tornar o fluxo de dados mais rápido, assertivo, confiável, flexível e escalável.</a:t>
             </a:r>
-            <a:endParaRPr lang="pt-BR" sz="1600" dirty="0"/>
+            <a:endParaRPr lang="pt-BR" sz="1400" dirty="0"/>
           </a:p>
         </p:txBody>
       </p:sp>
@@ -17161,8 +15092,8 @@
         </p:nvSpPr>
         <p:spPr>
           <a:xfrm>
-            <a:off x="598098" y="2772251"/>
-            <a:ext cx="5296315" cy="646331"/>
+            <a:off x="598098" y="2719497"/>
+            <a:ext cx="5296315" cy="830997"/>
           </a:xfrm>
           <a:prstGeom prst="rect">
             <a:avLst/>
@@ -17173,6 +15104,22 @@
             <a:spAutoFit/>
           </a:bodyPr>
           <a:lstStyle/>
+          <a:p>
+            <a:pPr marL="285750" indent="-285750">
+              <a:buFont typeface="Arial" panose="020B0604020202020204" pitchFamily="34" charset="0"/>
+              <a:buChar char="•"/>
+            </a:pPr>
+            <a:r>
+              <a:rPr lang="pt-BR" sz="1200" dirty="0">
+                <a:solidFill>
+                  <a:schemeClr val="tx2"/>
+                </a:solidFill>
+                <a:latin typeface="Arial" panose="020B0604020202020204" pitchFamily="34" charset="0"/>
+                <a:cs typeface="Arial" panose="020B0604020202020204" pitchFamily="34" charset="0"/>
+              </a:rPr>
+              <a:t>Viabilidade técnica dos itens 2 e 3 do material de sugestão</a:t>
+            </a:r>
+          </a:p>
           <a:p>
             <a:pPr marL="285750" indent="-285750">
               <a:buFont typeface="Arial" panose="020B0604020202020204" pitchFamily="34" charset="0"/>
@@ -17237,8 +15184,8 @@
         </p:nvSpPr>
         <p:spPr>
           <a:xfrm>
-            <a:off x="6318000" y="2742196"/>
-            <a:ext cx="5296315" cy="646331"/>
+            <a:off x="6318000" y="2680650"/>
+            <a:ext cx="5296315" cy="830997"/>
           </a:xfrm>
           <a:prstGeom prst="rect">
             <a:avLst/>
@@ -17249,6 +15196,38 @@
             <a:spAutoFit/>
           </a:bodyPr>
           <a:lstStyle/>
+          <a:p>
+            <a:pPr marL="285750" indent="-285750">
+              <a:buFont typeface="Arial" panose="020B0604020202020204" pitchFamily="34" charset="0"/>
+              <a:buChar char="•"/>
+            </a:pPr>
+            <a:r>
+              <a:rPr lang="pt-BR" sz="1200" dirty="0">
+                <a:solidFill>
+                  <a:schemeClr val="tx2"/>
+                </a:solidFill>
+                <a:latin typeface="Arial" panose="020B0604020202020204" pitchFamily="34" charset="0"/>
+                <a:cs typeface="Arial" panose="020B0604020202020204" pitchFamily="34" charset="0"/>
+              </a:rPr>
+              <a:t>Viabilidade técnica dos itens 2 e 3 do material de sugestão até 18/11</a:t>
+            </a:r>
+          </a:p>
+          <a:p>
+            <a:pPr marL="285750" indent="-285750">
+              <a:buFont typeface="Arial" panose="020B0604020202020204" pitchFamily="34" charset="0"/>
+              <a:buChar char="•"/>
+            </a:pPr>
+            <a:r>
+              <a:rPr lang="pt-BR" sz="1200" dirty="0">
+                <a:solidFill>
+                  <a:schemeClr val="tx2"/>
+                </a:solidFill>
+                <a:latin typeface="Arial" panose="020B0604020202020204" pitchFamily="34" charset="0"/>
+                <a:cs typeface="Arial" panose="020B0604020202020204" pitchFamily="34" charset="0"/>
+              </a:rPr>
+              <a:t>Demais itens irão ter viabilidade após finalização de projetos internos Robbyson</a:t>
+            </a:r>
+          </a:p>
           <a:p>
             <a:pPr marL="285750" indent="-285750">
               <a:buFont typeface="Arial" panose="020B0604020202020204" pitchFamily="34" charset="0"/>
@@ -17265,86 +15244,6 @@
               <a:t>Monitoramento de tempos de replicação do ambiente E.O.</a:t>
             </a:r>
           </a:p>
-          <a:p>
-            <a:pPr marL="285750" indent="-285750">
-              <a:buFont typeface="Arial" panose="020B0604020202020204" pitchFamily="34" charset="0"/>
-              <a:buChar char="•"/>
-            </a:pPr>
-            <a:r>
-              <a:rPr lang="pt-BR" sz="1200" dirty="0">
-                <a:solidFill>
-                  <a:schemeClr val="tx2"/>
-                </a:solidFill>
-                <a:latin typeface="Arial" panose="020B0604020202020204" pitchFamily="34" charset="0"/>
-                <a:cs typeface="Arial" panose="020B0604020202020204" pitchFamily="34" charset="0"/>
-              </a:rPr>
-              <a:t>Retomar agendas com a </a:t>
-            </a:r>
-            <a:r>
-              <a:rPr lang="pt-BR" sz="1200" dirty="0" err="1">
-                <a:solidFill>
-                  <a:schemeClr val="tx2"/>
-                </a:solidFill>
-                <a:latin typeface="Arial" panose="020B0604020202020204" pitchFamily="34" charset="0"/>
-                <a:cs typeface="Arial" panose="020B0604020202020204" pitchFamily="34" charset="0"/>
-              </a:rPr>
-              <a:t>Robbyson</a:t>
-            </a:r>
-            <a:r>
-              <a:rPr lang="pt-BR" sz="1200" dirty="0">
-                <a:solidFill>
-                  <a:schemeClr val="tx2"/>
-                </a:solidFill>
-                <a:latin typeface="Arial" panose="020B0604020202020204" pitchFamily="34" charset="0"/>
-                <a:cs typeface="Arial" panose="020B0604020202020204" pitchFamily="34" charset="0"/>
-              </a:rPr>
-              <a:t> sobre implementação de soluções, à partir de 31/10/2024.</a:t>
-            </a:r>
-          </a:p>
-        </p:txBody>
-      </p:sp>
-      <p:sp>
-        <p:nvSpPr>
-          <p:cNvPr id="30" name="Retângulo 29">
-            <a:extLst>
-              <a:ext uri="{FF2B5EF4-FFF2-40B4-BE49-F238E27FC236}">
-                <a16:creationId xmlns:a16="http://schemas.microsoft.com/office/drawing/2014/main" id="{562C6161-0003-421D-9317-BDCD3BC318D7}"/>
-              </a:ext>
-            </a:extLst>
-          </p:cNvPr>
-          <p:cNvSpPr/>
-          <p:nvPr/>
-        </p:nvSpPr>
-        <p:spPr>
-          <a:xfrm>
-            <a:off x="4003425" y="4657493"/>
-            <a:ext cx="5296315" cy="276999"/>
-          </a:xfrm>
-          <a:prstGeom prst="rect">
-            <a:avLst/>
-          </a:prstGeom>
-        </p:spPr>
-        <p:txBody>
-          <a:bodyPr wrap="square">
-            <a:spAutoFit/>
-          </a:bodyPr>
-          <a:lstStyle/>
-          <a:p>
-            <a:pPr marL="285750" indent="-285750">
-              <a:buFont typeface="Arial" panose="020B0604020202020204" pitchFamily="34" charset="0"/>
-              <a:buChar char="•"/>
-            </a:pPr>
-            <a:r>
-              <a:rPr lang="pt-BR" sz="1200" dirty="0">
-                <a:solidFill>
-                  <a:schemeClr val="tx2"/>
-                </a:solidFill>
-                <a:latin typeface="Arial" panose="020B0604020202020204" pitchFamily="34" charset="0"/>
-                <a:cs typeface="Arial" panose="020B0604020202020204" pitchFamily="34" charset="0"/>
-              </a:rPr>
-              <a:t>Necessidade de adaptação do sistema de SMP (MOVA).</a:t>
-            </a:r>
-          </a:p>
         </p:txBody>
       </p:sp>
       <p:graphicFrame>
@@ -17359,9 +15258,7 @@
           <p:cNvGraphicFramePr>
             <a:graphicFrameLocks noGrp="1"/>
           </p:cNvGraphicFramePr>
-          <p:nvPr>
-            <p:extLst/>
-          </p:nvPr>
+          <p:nvPr/>
         </p:nvGraphicFramePr>
         <p:xfrm>
           <a:off x="593475" y="6562453"/>
@@ -17497,12 +15394,12 @@
                     <a:lstStyle/>
                     <a:p>
                       <a:r>
-                        <a:rPr lang="pt-BR" sz="1200" b="0">
+                        <a:rPr lang="pt-BR" sz="1200" b="0" dirty="0">
                           <a:solidFill>
                             <a:schemeClr val="tx2"/>
                           </a:solidFill>
-                          <a:latin typeface="Arial" panose="020B0604020202020204" pitchFamily="34" charset="0"/>
-                          <a:cs typeface="Arial" panose="020B0604020202020204" pitchFamily="34" charset="0"/>
+                          <a:latin typeface="Arial"/>
+                          <a:cs typeface="Arial"/>
                         </a:rPr>
                         <a:t>A fazer</a:t>
                       </a:r>
@@ -17723,12 +15620,12 @@
                     <a:lstStyle/>
                     <a:p>
                       <a:r>
-                        <a:rPr lang="pt-BR" sz="1200" b="0">
+                        <a:rPr lang="pt-BR" sz="1200" b="0" dirty="0">
                           <a:solidFill>
                             <a:schemeClr val="tx2"/>
                           </a:solidFill>
-                          <a:latin typeface="Arial" panose="020B0604020202020204" pitchFamily="34" charset="0"/>
-                          <a:cs typeface="Arial" panose="020B0604020202020204" pitchFamily="34" charset="0"/>
+                          <a:latin typeface="Arial"/>
+                          <a:cs typeface="Arial"/>
                         </a:rPr>
                         <a:t>Concluído</a:t>
                       </a:r>
@@ -17897,10 +15794,2194 @@
           </a:graphicData>
         </a:graphic>
       </p:graphicFrame>
+      <p:pic>
+        <p:nvPicPr>
+          <p:cNvPr id="3" name="Imagem 2" descr="Homem olhando para o lado&#10;&#10;Descrição gerada automaticamente">
+            <a:extLst>
+              <a:ext uri="{FF2B5EF4-FFF2-40B4-BE49-F238E27FC236}">
+                <a16:creationId xmlns:a16="http://schemas.microsoft.com/office/drawing/2014/main" id="{3EC70E50-9B55-CCEE-B167-6DA1418D3C03}"/>
+              </a:ext>
+            </a:extLst>
+          </p:cNvPr>
+          <p:cNvPicPr>
+            <a:picLocks noChangeAspect="1"/>
+          </p:cNvPicPr>
+          <p:nvPr/>
+        </p:nvPicPr>
+        <p:blipFill>
+          <a:blip r:embed="rId4"/>
+          <a:srcRect t="2288" b="2288"/>
+          <a:stretch>
+            <a:fillRect/>
+          </a:stretch>
+        </p:blipFill>
+        <p:spPr>
+          <a:xfrm>
+            <a:off x="9272623" y="1118225"/>
+            <a:ext cx="971550" cy="935832"/>
+          </a:xfrm>
+          <a:prstGeom prst="ellipse">
+            <a:avLst/>
+          </a:prstGeom>
+          <a:ln w="12700" cap="rnd">
+            <a:solidFill>
+              <a:srgbClr val="4EC0E1"/>
+            </a:solidFill>
+          </a:ln>
+          <a:effectLst>
+            <a:outerShdw blurRad="381000" dist="292100" dir="5400000" sx="-80000" sy="-18000" rotWithShape="0">
+              <a:srgbClr val="000000">
+                <a:alpha val="22000"/>
+              </a:srgbClr>
+            </a:outerShdw>
+          </a:effectLst>
+          <a:scene3d>
+            <a:camera prst="orthographicFront"/>
+            <a:lightRig rig="contrasting" dir="t">
+              <a:rot lat="0" lon="0" rev="3000000"/>
+            </a:lightRig>
+          </a:scene3d>
+          <a:sp3d contourW="7620">
+            <a:bevelT w="95250" h="31750"/>
+            <a:contourClr>
+              <a:srgbClr val="333333"/>
+            </a:contourClr>
+          </a:sp3d>
+        </p:spPr>
+      </p:pic>
+      <p:sp>
+        <p:nvSpPr>
+          <p:cNvPr id="5" name="CaixaDeTexto 15">
+            <a:extLst>
+              <a:ext uri="{FF2B5EF4-FFF2-40B4-BE49-F238E27FC236}">
+                <a16:creationId xmlns:a16="http://schemas.microsoft.com/office/drawing/2014/main" id="{A3459D9E-7E21-BA1B-4F56-BE96DB048663}"/>
+              </a:ext>
+            </a:extLst>
+          </p:cNvPr>
+          <p:cNvSpPr txBox="1"/>
+          <p:nvPr/>
+        </p:nvSpPr>
+        <p:spPr>
+          <a:xfrm>
+            <a:off x="10353448" y="1250900"/>
+            <a:ext cx="1585234" cy="245199"/>
+          </a:xfrm>
+          <a:prstGeom prst="roundRect">
+            <a:avLst>
+              <a:gd name="adj" fmla="val 50000"/>
+            </a:avLst>
+          </a:prstGeom>
+          <a:solidFill>
+            <a:srgbClr val="00BFE3"/>
+          </a:solidFill>
+        </p:spPr>
+        <p:txBody>
+          <a:bodyPr wrap="none" lIns="0" tIns="0" rIns="0" bIns="0" rtlCol="0" anchor="ctr">
+            <a:noAutofit/>
+          </a:bodyPr>
+          <a:lstStyle>
+            <a:defPPr>
+              <a:defRPr lang="pt-BR"/>
+            </a:defPPr>
+            <a:lvl1pPr marL="0" algn="l" defTabSz="914400" rtl="0" eaLnBrk="1" latinLnBrk="0" hangingPunct="1">
+              <a:defRPr sz="1800" kern="1200">
+                <a:solidFill>
+                  <a:schemeClr val="tx1"/>
+                </a:solidFill>
+                <a:latin typeface="+mn-lt"/>
+                <a:ea typeface="+mn-ea"/>
+                <a:cs typeface="+mn-cs"/>
+              </a:defRPr>
+            </a:lvl1pPr>
+            <a:lvl2pPr marL="457200" algn="l" defTabSz="914400" rtl="0" eaLnBrk="1" latinLnBrk="0" hangingPunct="1">
+              <a:defRPr sz="1800" kern="1200">
+                <a:solidFill>
+                  <a:schemeClr val="tx1"/>
+                </a:solidFill>
+                <a:latin typeface="+mn-lt"/>
+                <a:ea typeface="+mn-ea"/>
+                <a:cs typeface="+mn-cs"/>
+              </a:defRPr>
+            </a:lvl2pPr>
+            <a:lvl3pPr marL="914400" algn="l" defTabSz="914400" rtl="0" eaLnBrk="1" latinLnBrk="0" hangingPunct="1">
+              <a:defRPr sz="1800" kern="1200">
+                <a:solidFill>
+                  <a:schemeClr val="tx1"/>
+                </a:solidFill>
+                <a:latin typeface="+mn-lt"/>
+                <a:ea typeface="+mn-ea"/>
+                <a:cs typeface="+mn-cs"/>
+              </a:defRPr>
+            </a:lvl3pPr>
+            <a:lvl4pPr marL="1371600" algn="l" defTabSz="914400" rtl="0" eaLnBrk="1" latinLnBrk="0" hangingPunct="1">
+              <a:defRPr sz="1800" kern="1200">
+                <a:solidFill>
+                  <a:schemeClr val="tx1"/>
+                </a:solidFill>
+                <a:latin typeface="+mn-lt"/>
+                <a:ea typeface="+mn-ea"/>
+                <a:cs typeface="+mn-cs"/>
+              </a:defRPr>
+            </a:lvl4pPr>
+            <a:lvl5pPr marL="1828800" algn="l" defTabSz="914400" rtl="0" eaLnBrk="1" latinLnBrk="0" hangingPunct="1">
+              <a:defRPr sz="1800" kern="1200">
+                <a:solidFill>
+                  <a:schemeClr val="tx1"/>
+                </a:solidFill>
+                <a:latin typeface="+mn-lt"/>
+                <a:ea typeface="+mn-ea"/>
+                <a:cs typeface="+mn-cs"/>
+              </a:defRPr>
+            </a:lvl5pPr>
+            <a:lvl6pPr marL="2286000" algn="l" defTabSz="914400" rtl="0" eaLnBrk="1" latinLnBrk="0" hangingPunct="1">
+              <a:defRPr sz="1800" kern="1200">
+                <a:solidFill>
+                  <a:schemeClr val="tx1"/>
+                </a:solidFill>
+                <a:latin typeface="+mn-lt"/>
+                <a:ea typeface="+mn-ea"/>
+                <a:cs typeface="+mn-cs"/>
+              </a:defRPr>
+            </a:lvl6pPr>
+            <a:lvl7pPr marL="2743200" algn="l" defTabSz="914400" rtl="0" eaLnBrk="1" latinLnBrk="0" hangingPunct="1">
+              <a:defRPr sz="1800" kern="1200">
+                <a:solidFill>
+                  <a:schemeClr val="tx1"/>
+                </a:solidFill>
+                <a:latin typeface="+mn-lt"/>
+                <a:ea typeface="+mn-ea"/>
+                <a:cs typeface="+mn-cs"/>
+              </a:defRPr>
+            </a:lvl7pPr>
+            <a:lvl8pPr marL="3200400" algn="l" defTabSz="914400" rtl="0" eaLnBrk="1" latinLnBrk="0" hangingPunct="1">
+              <a:defRPr sz="1800" kern="1200">
+                <a:solidFill>
+                  <a:schemeClr val="tx1"/>
+                </a:solidFill>
+                <a:latin typeface="+mn-lt"/>
+                <a:ea typeface="+mn-ea"/>
+                <a:cs typeface="+mn-cs"/>
+              </a:defRPr>
+            </a:lvl8pPr>
+            <a:lvl9pPr marL="3657600" algn="l" defTabSz="914400" rtl="0" eaLnBrk="1" latinLnBrk="0" hangingPunct="1">
+              <a:defRPr sz="1800" kern="1200">
+                <a:solidFill>
+                  <a:schemeClr val="tx1"/>
+                </a:solidFill>
+                <a:latin typeface="+mn-lt"/>
+                <a:ea typeface="+mn-ea"/>
+                <a:cs typeface="+mn-cs"/>
+              </a:defRPr>
+            </a:lvl9pPr>
+          </a:lstStyle>
+          <a:p>
+            <a:pPr algn="ctr"/>
+            <a:r>
+              <a:rPr lang="pt-BR" sz="1400" b="1">
+                <a:solidFill>
+                  <a:schemeClr val="bg1"/>
+                </a:solidFill>
+                <a:latin typeface="Arial"/>
+                <a:cs typeface="Arial"/>
+              </a:rPr>
+              <a:t>RESPONSÁVEL</a:t>
+            </a:r>
+          </a:p>
+        </p:txBody>
+      </p:sp>
+      <p:sp>
+        <p:nvSpPr>
+          <p:cNvPr id="7" name="CaixaDeTexto 2">
+            <a:extLst>
+              <a:ext uri="{FF2B5EF4-FFF2-40B4-BE49-F238E27FC236}">
+                <a16:creationId xmlns:a16="http://schemas.microsoft.com/office/drawing/2014/main" id="{5F655C2F-9781-DB83-F76A-121359C69230}"/>
+              </a:ext>
+            </a:extLst>
+          </p:cNvPr>
+          <p:cNvSpPr txBox="1"/>
+          <p:nvPr/>
+        </p:nvSpPr>
+        <p:spPr>
+          <a:xfrm>
+            <a:off x="9555678" y="1522023"/>
+            <a:ext cx="3183466" cy="307777"/>
+          </a:xfrm>
+          <a:prstGeom prst="rect">
+            <a:avLst/>
+          </a:prstGeom>
+          <a:noFill/>
+        </p:spPr>
+        <p:txBody>
+          <a:bodyPr wrap="square" lIns="91440" tIns="45720" rIns="91440" bIns="45720" rtlCol="0" anchor="t">
+            <a:spAutoFit/>
+          </a:bodyPr>
+          <a:lstStyle>
+            <a:defPPr>
+              <a:defRPr lang="pt-BR"/>
+            </a:defPPr>
+            <a:lvl1pPr marL="0" algn="l" defTabSz="914400" rtl="0" eaLnBrk="1" latinLnBrk="0" hangingPunct="1">
+              <a:defRPr sz="1800" kern="1200">
+                <a:solidFill>
+                  <a:schemeClr val="tx1"/>
+                </a:solidFill>
+                <a:latin typeface="+mn-lt"/>
+                <a:ea typeface="+mn-ea"/>
+                <a:cs typeface="+mn-cs"/>
+              </a:defRPr>
+            </a:lvl1pPr>
+            <a:lvl2pPr marL="457200" algn="l" defTabSz="914400" rtl="0" eaLnBrk="1" latinLnBrk="0" hangingPunct="1">
+              <a:defRPr sz="1800" kern="1200">
+                <a:solidFill>
+                  <a:schemeClr val="tx1"/>
+                </a:solidFill>
+                <a:latin typeface="+mn-lt"/>
+                <a:ea typeface="+mn-ea"/>
+                <a:cs typeface="+mn-cs"/>
+              </a:defRPr>
+            </a:lvl2pPr>
+            <a:lvl3pPr marL="914400" algn="l" defTabSz="914400" rtl="0" eaLnBrk="1" latinLnBrk="0" hangingPunct="1">
+              <a:defRPr sz="1800" kern="1200">
+                <a:solidFill>
+                  <a:schemeClr val="tx1"/>
+                </a:solidFill>
+                <a:latin typeface="+mn-lt"/>
+                <a:ea typeface="+mn-ea"/>
+                <a:cs typeface="+mn-cs"/>
+              </a:defRPr>
+            </a:lvl3pPr>
+            <a:lvl4pPr marL="1371600" algn="l" defTabSz="914400" rtl="0" eaLnBrk="1" latinLnBrk="0" hangingPunct="1">
+              <a:defRPr sz="1800" kern="1200">
+                <a:solidFill>
+                  <a:schemeClr val="tx1"/>
+                </a:solidFill>
+                <a:latin typeface="+mn-lt"/>
+                <a:ea typeface="+mn-ea"/>
+                <a:cs typeface="+mn-cs"/>
+              </a:defRPr>
+            </a:lvl4pPr>
+            <a:lvl5pPr marL="1828800" algn="l" defTabSz="914400" rtl="0" eaLnBrk="1" latinLnBrk="0" hangingPunct="1">
+              <a:defRPr sz="1800" kern="1200">
+                <a:solidFill>
+                  <a:schemeClr val="tx1"/>
+                </a:solidFill>
+                <a:latin typeface="+mn-lt"/>
+                <a:ea typeface="+mn-ea"/>
+                <a:cs typeface="+mn-cs"/>
+              </a:defRPr>
+            </a:lvl5pPr>
+            <a:lvl6pPr marL="2286000" algn="l" defTabSz="914400" rtl="0" eaLnBrk="1" latinLnBrk="0" hangingPunct="1">
+              <a:defRPr sz="1800" kern="1200">
+                <a:solidFill>
+                  <a:schemeClr val="tx1"/>
+                </a:solidFill>
+                <a:latin typeface="+mn-lt"/>
+                <a:ea typeface="+mn-ea"/>
+                <a:cs typeface="+mn-cs"/>
+              </a:defRPr>
+            </a:lvl6pPr>
+            <a:lvl7pPr marL="2743200" algn="l" defTabSz="914400" rtl="0" eaLnBrk="1" latinLnBrk="0" hangingPunct="1">
+              <a:defRPr sz="1800" kern="1200">
+                <a:solidFill>
+                  <a:schemeClr val="tx1"/>
+                </a:solidFill>
+                <a:latin typeface="+mn-lt"/>
+                <a:ea typeface="+mn-ea"/>
+                <a:cs typeface="+mn-cs"/>
+              </a:defRPr>
+            </a:lvl7pPr>
+            <a:lvl8pPr marL="3200400" algn="l" defTabSz="914400" rtl="0" eaLnBrk="1" latinLnBrk="0" hangingPunct="1">
+              <a:defRPr sz="1800" kern="1200">
+                <a:solidFill>
+                  <a:schemeClr val="tx1"/>
+                </a:solidFill>
+                <a:latin typeface="+mn-lt"/>
+                <a:ea typeface="+mn-ea"/>
+                <a:cs typeface="+mn-cs"/>
+              </a:defRPr>
+            </a:lvl8pPr>
+            <a:lvl9pPr marL="3657600" algn="l" defTabSz="914400" rtl="0" eaLnBrk="1" latinLnBrk="0" hangingPunct="1">
+              <a:defRPr sz="1800" kern="1200">
+                <a:solidFill>
+                  <a:schemeClr val="tx1"/>
+                </a:solidFill>
+                <a:latin typeface="+mn-lt"/>
+                <a:ea typeface="+mn-ea"/>
+                <a:cs typeface="+mn-cs"/>
+              </a:defRPr>
+            </a:lvl9pPr>
+          </a:lstStyle>
+          <a:p>
+            <a:pPr algn="ctr"/>
+            <a:r>
+              <a:rPr lang="pt-BR" sz="1400" dirty="0">
+                <a:solidFill>
+                  <a:schemeClr val="tx2"/>
+                </a:solidFill>
+                <a:latin typeface="Arial Black"/>
+              </a:rPr>
+              <a:t>Danilo Cabral</a:t>
+            </a:r>
+            <a:endParaRPr lang="pt-BR" dirty="0"/>
+          </a:p>
+        </p:txBody>
+      </p:sp>
+      <p:pic>
+        <p:nvPicPr>
+          <p:cNvPr id="8" name="Imagem 7" descr="Placa de letreiro luminoso&#10;&#10;Descrição gerada automaticamente">
+            <a:extLst>
+              <a:ext uri="{FF2B5EF4-FFF2-40B4-BE49-F238E27FC236}">
+                <a16:creationId xmlns:a16="http://schemas.microsoft.com/office/drawing/2014/main" id="{89773929-A68A-4928-FAB1-4B85434E37F3}"/>
+              </a:ext>
+            </a:extLst>
+          </p:cNvPr>
+          <p:cNvPicPr>
+            <a:picLocks noChangeAspect="1"/>
+          </p:cNvPicPr>
+          <p:nvPr/>
+        </p:nvPicPr>
+        <p:blipFill>
+          <a:blip r:embed="rId5"/>
+          <a:stretch>
+            <a:fillRect/>
+          </a:stretch>
+        </p:blipFill>
+        <p:spPr>
+          <a:xfrm>
+            <a:off x="9299790" y="414095"/>
+            <a:ext cx="1304925" cy="371475"/>
+          </a:xfrm>
+          <a:prstGeom prst="rect">
+            <a:avLst/>
+          </a:prstGeom>
+        </p:spPr>
+      </p:pic>
+      <p:pic>
+        <p:nvPicPr>
+          <p:cNvPr id="9" name="Imagem 8" descr="Logotipo&#10;&#10;Descrição gerada automaticamente">
+            <a:extLst>
+              <a:ext uri="{FF2B5EF4-FFF2-40B4-BE49-F238E27FC236}">
+                <a16:creationId xmlns:a16="http://schemas.microsoft.com/office/drawing/2014/main" id="{1A07FE0E-C230-11D9-9A50-19ECBD79D329}"/>
+              </a:ext>
+            </a:extLst>
+          </p:cNvPr>
+          <p:cNvPicPr>
+            <a:picLocks noChangeAspect="1"/>
+          </p:cNvPicPr>
+          <p:nvPr/>
+        </p:nvPicPr>
+        <p:blipFill>
+          <a:blip r:embed="rId6"/>
+          <a:stretch>
+            <a:fillRect/>
+          </a:stretch>
+        </p:blipFill>
+        <p:spPr>
+          <a:xfrm>
+            <a:off x="10824597" y="466563"/>
+            <a:ext cx="638175" cy="257175"/>
+          </a:xfrm>
+          <a:prstGeom prst="rect">
+            <a:avLst/>
+          </a:prstGeom>
+        </p:spPr>
+      </p:pic>
+      <p:graphicFrame>
+        <p:nvGraphicFramePr>
+          <p:cNvPr id="33" name="Tabela 32">
+            <a:extLst>
+              <a:ext uri="{FF2B5EF4-FFF2-40B4-BE49-F238E27FC236}">
+                <a16:creationId xmlns:a16="http://schemas.microsoft.com/office/drawing/2014/main" id="{31D3A3A6-8DD5-4DD2-91BD-67E2EE318B63}"/>
+              </a:ext>
+            </a:extLst>
+          </p:cNvPr>
+          <p:cNvGraphicFramePr>
+            <a:graphicFrameLocks noGrp="1"/>
+          </p:cNvGraphicFramePr>
+          <p:nvPr>
+            <p:extLst/>
+          </p:nvPr>
+        </p:nvGraphicFramePr>
+        <p:xfrm>
+          <a:off x="587578" y="4240453"/>
+          <a:ext cx="2598965" cy="1764000"/>
+        </p:xfrm>
+        <a:graphic>
+          <a:graphicData uri="http://schemas.openxmlformats.org/drawingml/2006/table">
+            <a:tbl>
+              <a:tblPr>
+                <a:tableStyleId>{5C22544A-7EE6-4342-B048-85BDC9FD1C3A}</a:tableStyleId>
+              </a:tblPr>
+              <a:tblGrid>
+                <a:gridCol w="252000">
+                  <a:extLst>
+                    <a:ext uri="{9D8B030D-6E8A-4147-A177-3AD203B41FA5}">
+                      <a16:colId xmlns:a16="http://schemas.microsoft.com/office/drawing/2014/main" val="2659013763"/>
+                    </a:ext>
+                  </a:extLst>
+                </a:gridCol>
+                <a:gridCol w="78965">
+                  <a:extLst>
+                    <a:ext uri="{9D8B030D-6E8A-4147-A177-3AD203B41FA5}">
+                      <a16:colId xmlns:a16="http://schemas.microsoft.com/office/drawing/2014/main" val="3408455369"/>
+                    </a:ext>
+                  </a:extLst>
+                </a:gridCol>
+                <a:gridCol w="1512000">
+                  <a:extLst>
+                    <a:ext uri="{9D8B030D-6E8A-4147-A177-3AD203B41FA5}">
+                      <a16:colId xmlns:a16="http://schemas.microsoft.com/office/drawing/2014/main" val="4128488300"/>
+                    </a:ext>
+                  </a:extLst>
+                </a:gridCol>
+                <a:gridCol w="756000">
+                  <a:extLst>
+                    <a:ext uri="{9D8B030D-6E8A-4147-A177-3AD203B41FA5}">
+                      <a16:colId xmlns:a16="http://schemas.microsoft.com/office/drawing/2014/main" val="4197296562"/>
+                    </a:ext>
+                  </a:extLst>
+                </a:gridCol>
+              </a:tblGrid>
+              <a:tr h="252000">
+                <a:tc>
+                  <a:txBody>
+                    <a:bodyPr/>
+                    <a:lstStyle/>
+                    <a:p>
+                      <a:pPr algn="ctr" fontAlgn="ctr"/>
+                      <a:endParaRPr lang="pt-BR" sz="1400" b="0" i="0" u="none" strike="noStrike" dirty="0">
+                        <a:solidFill>
+                          <a:schemeClr val="tx2"/>
+                        </a:solidFill>
+                        <a:effectLst/>
+                        <a:latin typeface="Arial" panose="020B0604020202020204" pitchFamily="34" charset="0"/>
+                        <a:cs typeface="Arial" panose="020B0604020202020204" pitchFamily="34" charset="0"/>
+                      </a:endParaRPr>
+                    </a:p>
+                  </a:txBody>
+                  <a:tcPr marL="6350" marR="6350" marT="6350" marB="0" anchor="ctr">
+                    <a:lnL w="19050" cap="flat" cmpd="sng" algn="ctr">
+                      <a:solidFill>
+                        <a:schemeClr val="bg1"/>
+                      </a:solidFill>
+                      <a:prstDash val="solid"/>
+                      <a:round/>
+                      <a:headEnd type="none" w="med" len="med"/>
+                      <a:tailEnd type="none" w="med" len="med"/>
+                    </a:lnL>
+                    <a:lnR w="19050" cap="flat" cmpd="sng" algn="ctr">
+                      <a:solidFill>
+                        <a:schemeClr val="bg1"/>
+                      </a:solidFill>
+                      <a:prstDash val="solid"/>
+                      <a:round/>
+                      <a:headEnd type="none" w="med" len="med"/>
+                      <a:tailEnd type="none" w="med" len="med"/>
+                    </a:lnR>
+                    <a:lnT w="19050" cap="flat" cmpd="sng" algn="ctr">
+                      <a:solidFill>
+                        <a:schemeClr val="bg1"/>
+                      </a:solidFill>
+                      <a:prstDash val="solid"/>
+                      <a:round/>
+                      <a:headEnd type="none" w="med" len="med"/>
+                      <a:tailEnd type="none" w="med" len="med"/>
+                    </a:lnT>
+                    <a:lnB w="19050" cap="flat" cmpd="sng" algn="ctr">
+                      <a:solidFill>
+                        <a:schemeClr val="bg1"/>
+                      </a:solidFill>
+                      <a:prstDash val="solid"/>
+                      <a:round/>
+                      <a:headEnd type="none" w="med" len="med"/>
+                      <a:tailEnd type="none" w="med" len="med"/>
+                    </a:lnB>
+                    <a:solidFill>
+                      <a:srgbClr val="00B050"/>
+                    </a:solidFill>
+                  </a:tcPr>
+                </a:tc>
+                <a:tc>
+                  <a:txBody>
+                    <a:bodyPr/>
+                    <a:lstStyle/>
+                    <a:p>
+                      <a:pPr algn="ctr" fontAlgn="ctr"/>
+                      <a:endParaRPr lang="pt-BR" sz="1400" b="0" i="0" u="none" strike="noStrike">
+                        <a:solidFill>
+                          <a:schemeClr val="tx2"/>
+                        </a:solidFill>
+                        <a:effectLst/>
+                        <a:latin typeface="Arial" panose="020B0604020202020204" pitchFamily="34" charset="0"/>
+                        <a:cs typeface="Arial" panose="020B0604020202020204" pitchFamily="34" charset="0"/>
+                      </a:endParaRPr>
+                    </a:p>
+                  </a:txBody>
+                  <a:tcPr marL="6350" marR="6350" marT="6350" marB="0" anchor="ctr">
+                    <a:lnL w="19050" cap="flat" cmpd="sng" algn="ctr">
+                      <a:solidFill>
+                        <a:schemeClr val="bg1"/>
+                      </a:solidFill>
+                      <a:prstDash val="solid"/>
+                      <a:round/>
+                      <a:headEnd type="none" w="med" len="med"/>
+                      <a:tailEnd type="none" w="med" len="med"/>
+                    </a:lnL>
+                    <a:lnR w="19050" cap="flat" cmpd="sng" algn="ctr">
+                      <a:solidFill>
+                        <a:schemeClr val="bg1"/>
+                      </a:solidFill>
+                      <a:prstDash val="solid"/>
+                      <a:round/>
+                      <a:headEnd type="none" w="med" len="med"/>
+                      <a:tailEnd type="none" w="med" len="med"/>
+                    </a:lnR>
+                    <a:lnT w="19050" cap="flat" cmpd="sng" algn="ctr">
+                      <a:solidFill>
+                        <a:schemeClr val="bg1"/>
+                      </a:solidFill>
+                      <a:prstDash val="solid"/>
+                      <a:round/>
+                      <a:headEnd type="none" w="med" len="med"/>
+                      <a:tailEnd type="none" w="med" len="med"/>
+                    </a:lnT>
+                    <a:lnB w="19050" cap="flat" cmpd="sng" algn="ctr">
+                      <a:solidFill>
+                        <a:schemeClr val="bg1"/>
+                      </a:solidFill>
+                      <a:prstDash val="solid"/>
+                      <a:round/>
+                      <a:headEnd type="none" w="med" len="med"/>
+                      <a:tailEnd type="none" w="med" len="med"/>
+                    </a:lnB>
+                    <a:noFill/>
+                  </a:tcPr>
+                </a:tc>
+                <a:tc>
+                  <a:txBody>
+                    <a:bodyPr/>
+                    <a:lstStyle/>
+                    <a:p>
+                      <a:pPr algn="l" fontAlgn="ctr"/>
+                      <a:r>
+                        <a:rPr lang="pt-BR" sz="1400" u="none" strike="noStrike" dirty="0">
+                          <a:solidFill>
+                            <a:schemeClr val="tx2"/>
+                          </a:solidFill>
+                          <a:effectLst/>
+                          <a:latin typeface="Arial" panose="020B0604020202020204" pitchFamily="34" charset="0"/>
+                          <a:cs typeface="Arial" panose="020B0604020202020204" pitchFamily="34" charset="0"/>
+                        </a:rPr>
+                        <a:t>Diagnóstico inicial</a:t>
+                      </a:r>
+                      <a:endParaRPr lang="pt-BR" sz="1400" b="0" i="0" u="none" strike="noStrike" dirty="0">
+                        <a:solidFill>
+                          <a:schemeClr val="tx2"/>
+                        </a:solidFill>
+                        <a:effectLst/>
+                        <a:latin typeface="Arial" panose="020B0604020202020204" pitchFamily="34" charset="0"/>
+                        <a:cs typeface="Arial" panose="020B0604020202020204" pitchFamily="34" charset="0"/>
+                      </a:endParaRPr>
+                    </a:p>
+                  </a:txBody>
+                  <a:tcPr marL="6350" marR="6350" marT="6350" marB="0" anchor="ctr">
+                    <a:lnL w="19050" cap="flat" cmpd="sng" algn="ctr">
+                      <a:solidFill>
+                        <a:schemeClr val="bg1"/>
+                      </a:solidFill>
+                      <a:prstDash val="solid"/>
+                      <a:round/>
+                      <a:headEnd type="none" w="med" len="med"/>
+                      <a:tailEnd type="none" w="med" len="med"/>
+                    </a:lnL>
+                    <a:lnR w="19050" cap="flat" cmpd="sng" algn="ctr">
+                      <a:solidFill>
+                        <a:schemeClr val="bg1"/>
+                      </a:solidFill>
+                      <a:prstDash val="solid"/>
+                      <a:round/>
+                      <a:headEnd type="none" w="med" len="med"/>
+                      <a:tailEnd type="none" w="med" len="med"/>
+                    </a:lnR>
+                    <a:lnT w="19050" cap="flat" cmpd="sng" algn="ctr">
+                      <a:solidFill>
+                        <a:schemeClr val="bg1"/>
+                      </a:solidFill>
+                      <a:prstDash val="solid"/>
+                      <a:round/>
+                      <a:headEnd type="none" w="med" len="med"/>
+                      <a:tailEnd type="none" w="med" len="med"/>
+                    </a:lnT>
+                    <a:lnB w="19050" cap="flat" cmpd="sng" algn="ctr">
+                      <a:solidFill>
+                        <a:schemeClr val="bg1"/>
+                      </a:solidFill>
+                      <a:prstDash val="solid"/>
+                      <a:round/>
+                      <a:headEnd type="none" w="med" len="med"/>
+                      <a:tailEnd type="none" w="med" len="med"/>
+                    </a:lnB>
+                    <a:noFill/>
+                  </a:tcPr>
+                </a:tc>
+                <a:tc>
+                  <a:txBody>
+                    <a:bodyPr/>
+                    <a:lstStyle/>
+                    <a:p>
+                      <a:pPr algn="ctr" fontAlgn="ctr"/>
+                      <a:r>
+                        <a:rPr lang="pt-BR" sz="1400" b="0" i="0" u="none" strike="noStrike" dirty="0">
+                          <a:solidFill>
+                            <a:schemeClr val="tx2"/>
+                          </a:solidFill>
+                          <a:effectLst/>
+                          <a:latin typeface="Arial"/>
+                          <a:cs typeface="Arial"/>
+                        </a:rPr>
+                        <a:t>100%</a:t>
+                      </a:r>
+                      <a:endParaRPr lang="pt-BR" sz="1400" b="0" i="0" u="none" strike="noStrike" dirty="0">
+                        <a:solidFill>
+                          <a:schemeClr val="tx2"/>
+                        </a:solidFill>
+                        <a:effectLst/>
+                        <a:latin typeface="Arial" panose="020B0604020202020204" pitchFamily="34" charset="0"/>
+                        <a:cs typeface="Arial" panose="020B0604020202020204" pitchFamily="34" charset="0"/>
+                      </a:endParaRPr>
+                    </a:p>
+                  </a:txBody>
+                  <a:tcPr marL="0" marR="0" marT="0" marB="0" anchor="ctr">
+                    <a:lnL w="19050" cap="flat" cmpd="sng" algn="ctr">
+                      <a:solidFill>
+                        <a:schemeClr val="bg1"/>
+                      </a:solidFill>
+                      <a:prstDash val="solid"/>
+                      <a:round/>
+                      <a:headEnd type="none" w="med" len="med"/>
+                      <a:tailEnd type="none" w="med" len="med"/>
+                    </a:lnL>
+                    <a:lnR w="19050" cap="flat" cmpd="sng" algn="ctr">
+                      <a:solidFill>
+                        <a:schemeClr val="bg1"/>
+                      </a:solidFill>
+                      <a:prstDash val="solid"/>
+                      <a:round/>
+                      <a:headEnd type="none" w="med" len="med"/>
+                      <a:tailEnd type="none" w="med" len="med"/>
+                    </a:lnR>
+                    <a:lnT w="19050" cap="flat" cmpd="sng" algn="ctr">
+                      <a:solidFill>
+                        <a:schemeClr val="bg1"/>
+                      </a:solidFill>
+                      <a:prstDash val="solid"/>
+                      <a:round/>
+                      <a:headEnd type="none" w="med" len="med"/>
+                      <a:tailEnd type="none" w="med" len="med"/>
+                    </a:lnT>
+                    <a:lnB w="19050" cap="flat" cmpd="sng" algn="ctr">
+                      <a:solidFill>
+                        <a:schemeClr val="bg1"/>
+                      </a:solidFill>
+                      <a:prstDash val="solid"/>
+                      <a:round/>
+                      <a:headEnd type="none" w="med" len="med"/>
+                      <a:tailEnd type="none" w="med" len="med"/>
+                    </a:lnB>
+                    <a:noFill/>
+                  </a:tcPr>
+                </a:tc>
+                <a:extLst>
+                  <a:ext uri="{0D108BD9-81ED-4DB2-BD59-A6C34878D82A}">
+                    <a16:rowId xmlns:a16="http://schemas.microsoft.com/office/drawing/2014/main" val="1907476501"/>
+                  </a:ext>
+                </a:extLst>
+              </a:tr>
+              <a:tr h="252000">
+                <a:tc>
+                  <a:txBody>
+                    <a:bodyPr/>
+                    <a:lstStyle/>
+                    <a:p>
+                      <a:pPr algn="ctr" fontAlgn="ctr"/>
+                      <a:endParaRPr lang="pt-BR" sz="1400" b="0" i="0" u="none" strike="noStrike" dirty="0">
+                        <a:solidFill>
+                          <a:schemeClr val="tx2"/>
+                        </a:solidFill>
+                        <a:effectLst/>
+                        <a:latin typeface="Arial" panose="020B0604020202020204" pitchFamily="34" charset="0"/>
+                        <a:cs typeface="Arial" panose="020B0604020202020204" pitchFamily="34" charset="0"/>
+                      </a:endParaRPr>
+                    </a:p>
+                  </a:txBody>
+                  <a:tcPr marL="6350" marR="6350" marT="6350" marB="0" anchor="ctr">
+                    <a:lnL w="19050" cap="flat" cmpd="sng" algn="ctr">
+                      <a:solidFill>
+                        <a:schemeClr val="bg1"/>
+                      </a:solidFill>
+                      <a:prstDash val="solid"/>
+                      <a:round/>
+                      <a:headEnd type="none" w="med" len="med"/>
+                      <a:tailEnd type="none" w="med" len="med"/>
+                    </a:lnL>
+                    <a:lnR w="19050" cap="flat" cmpd="sng" algn="ctr">
+                      <a:solidFill>
+                        <a:schemeClr val="bg1"/>
+                      </a:solidFill>
+                      <a:prstDash val="solid"/>
+                      <a:round/>
+                      <a:headEnd type="none" w="med" len="med"/>
+                      <a:tailEnd type="none" w="med" len="med"/>
+                    </a:lnR>
+                    <a:lnT w="19050" cap="flat" cmpd="sng" algn="ctr">
+                      <a:solidFill>
+                        <a:schemeClr val="bg1"/>
+                      </a:solidFill>
+                      <a:prstDash val="solid"/>
+                      <a:round/>
+                      <a:headEnd type="none" w="med" len="med"/>
+                      <a:tailEnd type="none" w="med" len="med"/>
+                    </a:lnT>
+                    <a:lnB w="19050" cap="flat" cmpd="sng" algn="ctr">
+                      <a:solidFill>
+                        <a:schemeClr val="bg1"/>
+                      </a:solidFill>
+                      <a:prstDash val="solid"/>
+                      <a:round/>
+                      <a:headEnd type="none" w="med" len="med"/>
+                      <a:tailEnd type="none" w="med" len="med"/>
+                    </a:lnB>
+                    <a:solidFill>
+                      <a:srgbClr val="00B050"/>
+                    </a:solidFill>
+                  </a:tcPr>
+                </a:tc>
+                <a:tc>
+                  <a:txBody>
+                    <a:bodyPr/>
+                    <a:lstStyle/>
+                    <a:p>
+                      <a:pPr algn="ctr" fontAlgn="ctr"/>
+                      <a:endParaRPr lang="pt-BR" sz="1400" b="0" i="0" u="none" strike="noStrike">
+                        <a:solidFill>
+                          <a:schemeClr val="tx2"/>
+                        </a:solidFill>
+                        <a:effectLst/>
+                        <a:latin typeface="Arial" panose="020B0604020202020204" pitchFamily="34" charset="0"/>
+                        <a:cs typeface="Arial" panose="020B0604020202020204" pitchFamily="34" charset="0"/>
+                      </a:endParaRPr>
+                    </a:p>
+                  </a:txBody>
+                  <a:tcPr marL="6350" marR="6350" marT="6350" marB="0" anchor="ctr">
+                    <a:lnL w="19050" cap="flat" cmpd="sng" algn="ctr">
+                      <a:solidFill>
+                        <a:schemeClr val="bg1"/>
+                      </a:solidFill>
+                      <a:prstDash val="solid"/>
+                      <a:round/>
+                      <a:headEnd type="none" w="med" len="med"/>
+                      <a:tailEnd type="none" w="med" len="med"/>
+                    </a:lnL>
+                    <a:lnR w="19050" cap="flat" cmpd="sng" algn="ctr">
+                      <a:solidFill>
+                        <a:schemeClr val="bg1"/>
+                      </a:solidFill>
+                      <a:prstDash val="solid"/>
+                      <a:round/>
+                      <a:headEnd type="none" w="med" len="med"/>
+                      <a:tailEnd type="none" w="med" len="med"/>
+                    </a:lnR>
+                    <a:lnT w="19050" cap="flat" cmpd="sng" algn="ctr">
+                      <a:solidFill>
+                        <a:schemeClr val="bg1"/>
+                      </a:solidFill>
+                      <a:prstDash val="solid"/>
+                      <a:round/>
+                      <a:headEnd type="none" w="med" len="med"/>
+                      <a:tailEnd type="none" w="med" len="med"/>
+                    </a:lnT>
+                    <a:lnB w="19050" cap="flat" cmpd="sng" algn="ctr">
+                      <a:solidFill>
+                        <a:schemeClr val="bg1"/>
+                      </a:solidFill>
+                      <a:prstDash val="solid"/>
+                      <a:round/>
+                      <a:headEnd type="none" w="med" len="med"/>
+                      <a:tailEnd type="none" w="med" len="med"/>
+                    </a:lnB>
+                    <a:noFill/>
+                  </a:tcPr>
+                </a:tc>
+                <a:tc>
+                  <a:txBody>
+                    <a:bodyPr/>
+                    <a:lstStyle/>
+                    <a:p>
+                      <a:pPr algn="l" fontAlgn="ctr"/>
+                      <a:r>
+                        <a:rPr lang="pt-BR" sz="1400" u="none" strike="noStrike" dirty="0">
+                          <a:solidFill>
+                            <a:schemeClr val="tx2"/>
+                          </a:solidFill>
+                          <a:effectLst/>
+                          <a:latin typeface="Arial" panose="020B0604020202020204" pitchFamily="34" charset="0"/>
+                          <a:cs typeface="Arial" panose="020B0604020202020204" pitchFamily="34" charset="0"/>
+                        </a:rPr>
+                        <a:t>Brainstorm</a:t>
+                      </a:r>
+                      <a:endParaRPr lang="pt-BR" sz="1400" b="0" i="0" u="none" strike="noStrike" dirty="0">
+                        <a:solidFill>
+                          <a:schemeClr val="tx2"/>
+                        </a:solidFill>
+                        <a:effectLst/>
+                        <a:latin typeface="Arial" panose="020B0604020202020204" pitchFamily="34" charset="0"/>
+                        <a:cs typeface="Arial" panose="020B0604020202020204" pitchFamily="34" charset="0"/>
+                      </a:endParaRPr>
+                    </a:p>
+                  </a:txBody>
+                  <a:tcPr marL="6350" marR="6350" marT="6350" marB="0" anchor="ctr">
+                    <a:lnL w="19050" cap="flat" cmpd="sng" algn="ctr">
+                      <a:solidFill>
+                        <a:schemeClr val="bg1"/>
+                      </a:solidFill>
+                      <a:prstDash val="solid"/>
+                      <a:round/>
+                      <a:headEnd type="none" w="med" len="med"/>
+                      <a:tailEnd type="none" w="med" len="med"/>
+                    </a:lnL>
+                    <a:lnR w="19050" cap="flat" cmpd="sng" algn="ctr">
+                      <a:solidFill>
+                        <a:schemeClr val="bg1"/>
+                      </a:solidFill>
+                      <a:prstDash val="solid"/>
+                      <a:round/>
+                      <a:headEnd type="none" w="med" len="med"/>
+                      <a:tailEnd type="none" w="med" len="med"/>
+                    </a:lnR>
+                    <a:lnT w="19050" cap="flat" cmpd="sng" algn="ctr">
+                      <a:solidFill>
+                        <a:schemeClr val="bg1"/>
+                      </a:solidFill>
+                      <a:prstDash val="solid"/>
+                      <a:round/>
+                      <a:headEnd type="none" w="med" len="med"/>
+                      <a:tailEnd type="none" w="med" len="med"/>
+                    </a:lnT>
+                    <a:lnB w="19050" cap="flat" cmpd="sng" algn="ctr">
+                      <a:solidFill>
+                        <a:schemeClr val="bg1"/>
+                      </a:solidFill>
+                      <a:prstDash val="solid"/>
+                      <a:round/>
+                      <a:headEnd type="none" w="med" len="med"/>
+                      <a:tailEnd type="none" w="med" len="med"/>
+                    </a:lnB>
+                    <a:noFill/>
+                  </a:tcPr>
+                </a:tc>
+                <a:tc>
+                  <a:txBody>
+                    <a:bodyPr/>
+                    <a:lstStyle/>
+                    <a:p>
+                      <a:pPr algn="ctr" fontAlgn="ctr"/>
+                      <a:r>
+                        <a:rPr lang="pt-BR" sz="1400" b="0" i="0" u="none" strike="noStrike" dirty="0">
+                          <a:solidFill>
+                            <a:schemeClr val="tx2"/>
+                          </a:solidFill>
+                          <a:effectLst/>
+                          <a:latin typeface="Arial"/>
+                          <a:cs typeface="Arial"/>
+                        </a:rPr>
+                        <a:t>100%</a:t>
+                      </a:r>
+                    </a:p>
+                  </a:txBody>
+                  <a:tcPr marL="0" marR="0" marT="0" marB="0" anchor="ctr">
+                    <a:lnL w="19050" cap="flat" cmpd="sng" algn="ctr">
+                      <a:solidFill>
+                        <a:schemeClr val="bg1"/>
+                      </a:solidFill>
+                      <a:prstDash val="solid"/>
+                      <a:round/>
+                      <a:headEnd type="none" w="med" len="med"/>
+                      <a:tailEnd type="none" w="med" len="med"/>
+                    </a:lnL>
+                    <a:lnR w="19050" cap="flat" cmpd="sng" algn="ctr">
+                      <a:solidFill>
+                        <a:schemeClr val="bg1"/>
+                      </a:solidFill>
+                      <a:prstDash val="solid"/>
+                      <a:round/>
+                      <a:headEnd type="none" w="med" len="med"/>
+                      <a:tailEnd type="none" w="med" len="med"/>
+                    </a:lnR>
+                    <a:lnT w="19050" cap="flat" cmpd="sng" algn="ctr">
+                      <a:solidFill>
+                        <a:schemeClr val="bg1"/>
+                      </a:solidFill>
+                      <a:prstDash val="solid"/>
+                      <a:round/>
+                      <a:headEnd type="none" w="med" len="med"/>
+                      <a:tailEnd type="none" w="med" len="med"/>
+                    </a:lnT>
+                    <a:lnB w="19050" cap="flat" cmpd="sng" algn="ctr">
+                      <a:solidFill>
+                        <a:schemeClr val="bg1"/>
+                      </a:solidFill>
+                      <a:prstDash val="solid"/>
+                      <a:round/>
+                      <a:headEnd type="none" w="med" len="med"/>
+                      <a:tailEnd type="none" w="med" len="med"/>
+                    </a:lnB>
+                    <a:noFill/>
+                  </a:tcPr>
+                </a:tc>
+                <a:extLst>
+                  <a:ext uri="{0D108BD9-81ED-4DB2-BD59-A6C34878D82A}">
+                    <a16:rowId xmlns:a16="http://schemas.microsoft.com/office/drawing/2014/main" val="2204163848"/>
+                  </a:ext>
+                </a:extLst>
+              </a:tr>
+              <a:tr h="252000">
+                <a:tc>
+                  <a:txBody>
+                    <a:bodyPr/>
+                    <a:lstStyle/>
+                    <a:p>
+                      <a:pPr algn="ctr" fontAlgn="ctr"/>
+                      <a:endParaRPr lang="pt-BR" sz="1400" b="0" i="0" u="none" strike="noStrike" dirty="0">
+                        <a:solidFill>
+                          <a:schemeClr val="tx2"/>
+                        </a:solidFill>
+                        <a:effectLst/>
+                        <a:latin typeface="Arial" panose="020B0604020202020204" pitchFamily="34" charset="0"/>
+                        <a:cs typeface="Arial" panose="020B0604020202020204" pitchFamily="34" charset="0"/>
+                      </a:endParaRPr>
+                    </a:p>
+                  </a:txBody>
+                  <a:tcPr marL="6350" marR="6350" marT="6350" marB="0" anchor="ctr">
+                    <a:lnL w="19050" cap="flat" cmpd="sng" algn="ctr">
+                      <a:solidFill>
+                        <a:schemeClr val="bg1"/>
+                      </a:solidFill>
+                      <a:prstDash val="solid"/>
+                      <a:round/>
+                      <a:headEnd type="none" w="med" len="med"/>
+                      <a:tailEnd type="none" w="med" len="med"/>
+                    </a:lnL>
+                    <a:lnR w="19050" cap="flat" cmpd="sng" algn="ctr">
+                      <a:solidFill>
+                        <a:schemeClr val="bg1"/>
+                      </a:solidFill>
+                      <a:prstDash val="solid"/>
+                      <a:round/>
+                      <a:headEnd type="none" w="med" len="med"/>
+                      <a:tailEnd type="none" w="med" len="med"/>
+                    </a:lnR>
+                    <a:lnT w="19050" cap="flat" cmpd="sng" algn="ctr">
+                      <a:solidFill>
+                        <a:schemeClr val="bg1"/>
+                      </a:solidFill>
+                      <a:prstDash val="solid"/>
+                      <a:round/>
+                      <a:headEnd type="none" w="med" len="med"/>
+                      <a:tailEnd type="none" w="med" len="med"/>
+                    </a:lnT>
+                    <a:lnB w="19050" cap="flat" cmpd="sng" algn="ctr">
+                      <a:solidFill>
+                        <a:schemeClr val="bg1"/>
+                      </a:solidFill>
+                      <a:prstDash val="solid"/>
+                      <a:round/>
+                      <a:headEnd type="none" w="med" len="med"/>
+                      <a:tailEnd type="none" w="med" len="med"/>
+                    </a:lnB>
+                    <a:solidFill>
+                      <a:srgbClr val="00B050"/>
+                    </a:solidFill>
+                  </a:tcPr>
+                </a:tc>
+                <a:tc>
+                  <a:txBody>
+                    <a:bodyPr/>
+                    <a:lstStyle/>
+                    <a:p>
+                      <a:pPr algn="ctr" fontAlgn="ctr"/>
+                      <a:endParaRPr lang="pt-BR" sz="1400" b="0" i="0" u="none" strike="noStrike">
+                        <a:solidFill>
+                          <a:schemeClr val="tx2"/>
+                        </a:solidFill>
+                        <a:effectLst/>
+                        <a:latin typeface="Arial" panose="020B0604020202020204" pitchFamily="34" charset="0"/>
+                        <a:cs typeface="Arial" panose="020B0604020202020204" pitchFamily="34" charset="0"/>
+                      </a:endParaRPr>
+                    </a:p>
+                  </a:txBody>
+                  <a:tcPr marL="6350" marR="6350" marT="6350" marB="0" anchor="ctr">
+                    <a:lnL w="19050" cap="flat" cmpd="sng" algn="ctr">
+                      <a:solidFill>
+                        <a:schemeClr val="bg1"/>
+                      </a:solidFill>
+                      <a:prstDash val="solid"/>
+                      <a:round/>
+                      <a:headEnd type="none" w="med" len="med"/>
+                      <a:tailEnd type="none" w="med" len="med"/>
+                    </a:lnL>
+                    <a:lnR w="19050" cap="flat" cmpd="sng" algn="ctr">
+                      <a:solidFill>
+                        <a:schemeClr val="bg1"/>
+                      </a:solidFill>
+                      <a:prstDash val="solid"/>
+                      <a:round/>
+                      <a:headEnd type="none" w="med" len="med"/>
+                      <a:tailEnd type="none" w="med" len="med"/>
+                    </a:lnR>
+                    <a:lnT w="19050" cap="flat" cmpd="sng" algn="ctr">
+                      <a:solidFill>
+                        <a:schemeClr val="bg1"/>
+                      </a:solidFill>
+                      <a:prstDash val="solid"/>
+                      <a:round/>
+                      <a:headEnd type="none" w="med" len="med"/>
+                      <a:tailEnd type="none" w="med" len="med"/>
+                    </a:lnT>
+                    <a:lnB w="19050" cap="flat" cmpd="sng" algn="ctr">
+                      <a:solidFill>
+                        <a:schemeClr val="bg1"/>
+                      </a:solidFill>
+                      <a:prstDash val="solid"/>
+                      <a:round/>
+                      <a:headEnd type="none" w="med" len="med"/>
+                      <a:tailEnd type="none" w="med" len="med"/>
+                    </a:lnB>
+                    <a:noFill/>
+                  </a:tcPr>
+                </a:tc>
+                <a:tc>
+                  <a:txBody>
+                    <a:bodyPr/>
+                    <a:lstStyle/>
+                    <a:p>
+                      <a:pPr algn="l" fontAlgn="ctr"/>
+                      <a:r>
+                        <a:rPr lang="pt-BR" sz="1400" b="0" i="0" u="none" strike="noStrike" dirty="0">
+                          <a:solidFill>
+                            <a:schemeClr val="tx2"/>
+                          </a:solidFill>
+                          <a:effectLst/>
+                          <a:latin typeface="Arial" panose="020B0604020202020204" pitchFamily="34" charset="0"/>
+                          <a:cs typeface="Arial" panose="020B0604020202020204" pitchFamily="34" charset="0"/>
+                        </a:rPr>
+                        <a:t>Métricas</a:t>
+                      </a:r>
+                    </a:p>
+                  </a:txBody>
+                  <a:tcPr marL="6350" marR="6350" marT="6350" marB="0" anchor="ctr">
+                    <a:lnL w="19050" cap="flat" cmpd="sng" algn="ctr">
+                      <a:solidFill>
+                        <a:schemeClr val="bg1"/>
+                      </a:solidFill>
+                      <a:prstDash val="solid"/>
+                      <a:round/>
+                      <a:headEnd type="none" w="med" len="med"/>
+                      <a:tailEnd type="none" w="med" len="med"/>
+                    </a:lnL>
+                    <a:lnR w="19050" cap="flat" cmpd="sng" algn="ctr">
+                      <a:solidFill>
+                        <a:schemeClr val="bg1"/>
+                      </a:solidFill>
+                      <a:prstDash val="solid"/>
+                      <a:round/>
+                      <a:headEnd type="none" w="med" len="med"/>
+                      <a:tailEnd type="none" w="med" len="med"/>
+                    </a:lnR>
+                    <a:lnT w="19050" cap="flat" cmpd="sng" algn="ctr">
+                      <a:solidFill>
+                        <a:schemeClr val="bg1"/>
+                      </a:solidFill>
+                      <a:prstDash val="solid"/>
+                      <a:round/>
+                      <a:headEnd type="none" w="med" len="med"/>
+                      <a:tailEnd type="none" w="med" len="med"/>
+                    </a:lnT>
+                    <a:lnB w="19050" cap="flat" cmpd="sng" algn="ctr">
+                      <a:solidFill>
+                        <a:schemeClr val="bg1"/>
+                      </a:solidFill>
+                      <a:prstDash val="solid"/>
+                      <a:round/>
+                      <a:headEnd type="none" w="med" len="med"/>
+                      <a:tailEnd type="none" w="med" len="med"/>
+                    </a:lnB>
+                    <a:noFill/>
+                  </a:tcPr>
+                </a:tc>
+                <a:tc>
+                  <a:txBody>
+                    <a:bodyPr/>
+                    <a:lstStyle/>
+                    <a:p>
+                      <a:pPr algn="ctr" fontAlgn="ctr"/>
+                      <a:r>
+                        <a:rPr lang="pt-BR" sz="1400" b="0" i="0" u="none" strike="noStrike" dirty="0">
+                          <a:solidFill>
+                            <a:schemeClr val="tx2"/>
+                          </a:solidFill>
+                          <a:effectLst/>
+                          <a:latin typeface="Arial"/>
+                          <a:cs typeface="Arial"/>
+                        </a:rPr>
+                        <a:t>100%</a:t>
+                      </a:r>
+                    </a:p>
+                  </a:txBody>
+                  <a:tcPr marL="0" marR="0" marT="0" marB="0" anchor="ctr">
+                    <a:lnL w="19050" cap="flat" cmpd="sng" algn="ctr">
+                      <a:solidFill>
+                        <a:schemeClr val="bg1"/>
+                      </a:solidFill>
+                      <a:prstDash val="solid"/>
+                      <a:round/>
+                      <a:headEnd type="none" w="med" len="med"/>
+                      <a:tailEnd type="none" w="med" len="med"/>
+                    </a:lnL>
+                    <a:lnR w="19050" cap="flat" cmpd="sng" algn="ctr">
+                      <a:solidFill>
+                        <a:schemeClr val="bg1"/>
+                      </a:solidFill>
+                      <a:prstDash val="solid"/>
+                      <a:round/>
+                      <a:headEnd type="none" w="med" len="med"/>
+                      <a:tailEnd type="none" w="med" len="med"/>
+                    </a:lnR>
+                    <a:lnT w="19050" cap="flat" cmpd="sng" algn="ctr">
+                      <a:solidFill>
+                        <a:schemeClr val="bg1"/>
+                      </a:solidFill>
+                      <a:prstDash val="solid"/>
+                      <a:round/>
+                      <a:headEnd type="none" w="med" len="med"/>
+                      <a:tailEnd type="none" w="med" len="med"/>
+                    </a:lnT>
+                    <a:lnB w="19050" cap="flat" cmpd="sng" algn="ctr">
+                      <a:solidFill>
+                        <a:schemeClr val="bg1"/>
+                      </a:solidFill>
+                      <a:prstDash val="solid"/>
+                      <a:round/>
+                      <a:headEnd type="none" w="med" len="med"/>
+                      <a:tailEnd type="none" w="med" len="med"/>
+                    </a:lnB>
+                    <a:noFill/>
+                  </a:tcPr>
+                </a:tc>
+                <a:extLst>
+                  <a:ext uri="{0D108BD9-81ED-4DB2-BD59-A6C34878D82A}">
+                    <a16:rowId xmlns:a16="http://schemas.microsoft.com/office/drawing/2014/main" val="3108259092"/>
+                  </a:ext>
+                </a:extLst>
+              </a:tr>
+              <a:tr h="252000">
+                <a:tc>
+                  <a:txBody>
+                    <a:bodyPr/>
+                    <a:lstStyle/>
+                    <a:p>
+                      <a:pPr algn="ctr" fontAlgn="ctr"/>
+                      <a:endParaRPr lang="pt-BR" sz="1400" b="0" i="0" u="none" strike="noStrike" dirty="0">
+                        <a:solidFill>
+                          <a:schemeClr val="tx2"/>
+                        </a:solidFill>
+                        <a:effectLst/>
+                        <a:latin typeface="Arial" panose="020B0604020202020204" pitchFamily="34" charset="0"/>
+                        <a:cs typeface="Arial" panose="020B0604020202020204" pitchFamily="34" charset="0"/>
+                      </a:endParaRPr>
+                    </a:p>
+                  </a:txBody>
+                  <a:tcPr marL="6350" marR="6350" marT="6350" marB="0" anchor="ctr">
+                    <a:lnL w="19050" cap="flat" cmpd="sng" algn="ctr">
+                      <a:solidFill>
+                        <a:schemeClr val="bg1"/>
+                      </a:solidFill>
+                      <a:prstDash val="solid"/>
+                      <a:round/>
+                      <a:headEnd type="none" w="med" len="med"/>
+                      <a:tailEnd type="none" w="med" len="med"/>
+                    </a:lnL>
+                    <a:lnR w="19050" cap="flat" cmpd="sng" algn="ctr">
+                      <a:solidFill>
+                        <a:schemeClr val="bg1"/>
+                      </a:solidFill>
+                      <a:prstDash val="solid"/>
+                      <a:round/>
+                      <a:headEnd type="none" w="med" len="med"/>
+                      <a:tailEnd type="none" w="med" len="med"/>
+                    </a:lnR>
+                    <a:lnT w="19050" cap="flat" cmpd="sng" algn="ctr">
+                      <a:solidFill>
+                        <a:schemeClr val="bg1"/>
+                      </a:solidFill>
+                      <a:prstDash val="solid"/>
+                      <a:round/>
+                      <a:headEnd type="none" w="med" len="med"/>
+                      <a:tailEnd type="none" w="med" len="med"/>
+                    </a:lnT>
+                    <a:lnB w="19050" cap="flat" cmpd="sng" algn="ctr">
+                      <a:solidFill>
+                        <a:schemeClr val="bg1"/>
+                      </a:solidFill>
+                      <a:prstDash val="solid"/>
+                      <a:round/>
+                      <a:headEnd type="none" w="med" len="med"/>
+                      <a:tailEnd type="none" w="med" len="med"/>
+                    </a:lnB>
+                    <a:solidFill>
+                      <a:srgbClr val="FFFF00"/>
+                    </a:solidFill>
+                  </a:tcPr>
+                </a:tc>
+                <a:tc>
+                  <a:txBody>
+                    <a:bodyPr/>
+                    <a:lstStyle/>
+                    <a:p>
+                      <a:pPr algn="ctr" fontAlgn="ctr"/>
+                      <a:endParaRPr lang="pt-BR" sz="1400" b="0" i="0" u="none" strike="noStrike" dirty="0">
+                        <a:solidFill>
+                          <a:schemeClr val="tx2"/>
+                        </a:solidFill>
+                        <a:effectLst/>
+                        <a:latin typeface="Arial" panose="020B0604020202020204" pitchFamily="34" charset="0"/>
+                        <a:cs typeface="Arial" panose="020B0604020202020204" pitchFamily="34" charset="0"/>
+                      </a:endParaRPr>
+                    </a:p>
+                  </a:txBody>
+                  <a:tcPr marL="6350" marR="6350" marT="6350" marB="0" anchor="ctr">
+                    <a:lnL w="19050" cap="flat" cmpd="sng" algn="ctr">
+                      <a:solidFill>
+                        <a:schemeClr val="bg1"/>
+                      </a:solidFill>
+                      <a:prstDash val="solid"/>
+                      <a:round/>
+                      <a:headEnd type="none" w="med" len="med"/>
+                      <a:tailEnd type="none" w="med" len="med"/>
+                    </a:lnL>
+                    <a:lnR w="19050" cap="flat" cmpd="sng" algn="ctr">
+                      <a:solidFill>
+                        <a:schemeClr val="bg1"/>
+                      </a:solidFill>
+                      <a:prstDash val="solid"/>
+                      <a:round/>
+                      <a:headEnd type="none" w="med" len="med"/>
+                      <a:tailEnd type="none" w="med" len="med"/>
+                    </a:lnR>
+                    <a:lnT w="19050" cap="flat" cmpd="sng" algn="ctr">
+                      <a:solidFill>
+                        <a:schemeClr val="bg1"/>
+                      </a:solidFill>
+                      <a:prstDash val="solid"/>
+                      <a:round/>
+                      <a:headEnd type="none" w="med" len="med"/>
+                      <a:tailEnd type="none" w="med" len="med"/>
+                    </a:lnT>
+                    <a:lnB w="19050" cap="flat" cmpd="sng" algn="ctr">
+                      <a:solidFill>
+                        <a:schemeClr val="bg1"/>
+                      </a:solidFill>
+                      <a:prstDash val="solid"/>
+                      <a:round/>
+                      <a:headEnd type="none" w="med" len="med"/>
+                      <a:tailEnd type="none" w="med" len="med"/>
+                    </a:lnB>
+                    <a:noFill/>
+                  </a:tcPr>
+                </a:tc>
+                <a:tc>
+                  <a:txBody>
+                    <a:bodyPr/>
+                    <a:lstStyle/>
+                    <a:p>
+                      <a:pPr algn="l" fontAlgn="ctr"/>
+                      <a:r>
+                        <a:rPr lang="pt-BR" sz="1400" u="none" strike="noStrike" dirty="0">
+                          <a:solidFill>
+                            <a:schemeClr val="tx2"/>
+                          </a:solidFill>
+                          <a:effectLst/>
+                          <a:latin typeface="Arial" panose="020B0604020202020204" pitchFamily="34" charset="0"/>
+                          <a:cs typeface="Arial" panose="020B0604020202020204" pitchFamily="34" charset="0"/>
+                        </a:rPr>
+                        <a:t>Viabilização</a:t>
+                      </a:r>
+                      <a:endParaRPr lang="pt-BR" sz="1400" b="0" i="0" u="none" strike="noStrike" dirty="0">
+                        <a:solidFill>
+                          <a:schemeClr val="tx2"/>
+                        </a:solidFill>
+                        <a:effectLst/>
+                        <a:latin typeface="Arial" panose="020B0604020202020204" pitchFamily="34" charset="0"/>
+                        <a:cs typeface="Arial" panose="020B0604020202020204" pitchFamily="34" charset="0"/>
+                      </a:endParaRPr>
+                    </a:p>
+                  </a:txBody>
+                  <a:tcPr marL="6350" marR="6350" marT="6350" marB="0" anchor="ctr">
+                    <a:lnL w="19050" cap="flat" cmpd="sng" algn="ctr">
+                      <a:solidFill>
+                        <a:schemeClr val="bg1"/>
+                      </a:solidFill>
+                      <a:prstDash val="solid"/>
+                      <a:round/>
+                      <a:headEnd type="none" w="med" len="med"/>
+                      <a:tailEnd type="none" w="med" len="med"/>
+                    </a:lnL>
+                    <a:lnR w="19050" cap="flat" cmpd="sng" algn="ctr">
+                      <a:solidFill>
+                        <a:schemeClr val="bg1"/>
+                      </a:solidFill>
+                      <a:prstDash val="solid"/>
+                      <a:round/>
+                      <a:headEnd type="none" w="med" len="med"/>
+                      <a:tailEnd type="none" w="med" len="med"/>
+                    </a:lnR>
+                    <a:lnT w="19050" cap="flat" cmpd="sng" algn="ctr">
+                      <a:solidFill>
+                        <a:schemeClr val="bg1"/>
+                      </a:solidFill>
+                      <a:prstDash val="solid"/>
+                      <a:round/>
+                      <a:headEnd type="none" w="med" len="med"/>
+                      <a:tailEnd type="none" w="med" len="med"/>
+                    </a:lnT>
+                    <a:lnB w="19050" cap="flat" cmpd="sng" algn="ctr">
+                      <a:solidFill>
+                        <a:schemeClr val="bg1"/>
+                      </a:solidFill>
+                      <a:prstDash val="solid"/>
+                      <a:round/>
+                      <a:headEnd type="none" w="med" len="med"/>
+                      <a:tailEnd type="none" w="med" len="med"/>
+                    </a:lnB>
+                    <a:noFill/>
+                  </a:tcPr>
+                </a:tc>
+                <a:tc>
+                  <a:txBody>
+                    <a:bodyPr/>
+                    <a:lstStyle/>
+                    <a:p>
+                      <a:pPr algn="ctr" fontAlgn="ctr"/>
+                      <a:r>
+                        <a:rPr lang="pt-BR" sz="1400" b="0" i="0" u="none" strike="noStrike" dirty="0">
+                          <a:solidFill>
+                            <a:schemeClr val="tx2"/>
+                          </a:solidFill>
+                          <a:effectLst/>
+                          <a:latin typeface="Arial"/>
+                          <a:cs typeface="Arial"/>
+                        </a:rPr>
+                        <a:t>40%</a:t>
+                      </a:r>
+                    </a:p>
+                  </a:txBody>
+                  <a:tcPr marL="0" marR="0" marT="0" marB="0" anchor="ctr">
+                    <a:lnL w="19050" cap="flat" cmpd="sng" algn="ctr">
+                      <a:solidFill>
+                        <a:schemeClr val="bg1"/>
+                      </a:solidFill>
+                      <a:prstDash val="solid"/>
+                      <a:round/>
+                      <a:headEnd type="none" w="med" len="med"/>
+                      <a:tailEnd type="none" w="med" len="med"/>
+                    </a:lnL>
+                    <a:lnR w="19050" cap="flat" cmpd="sng" algn="ctr">
+                      <a:solidFill>
+                        <a:schemeClr val="bg1"/>
+                      </a:solidFill>
+                      <a:prstDash val="solid"/>
+                      <a:round/>
+                      <a:headEnd type="none" w="med" len="med"/>
+                      <a:tailEnd type="none" w="med" len="med"/>
+                    </a:lnR>
+                    <a:lnT w="19050" cap="flat" cmpd="sng" algn="ctr">
+                      <a:solidFill>
+                        <a:schemeClr val="bg1"/>
+                      </a:solidFill>
+                      <a:prstDash val="solid"/>
+                      <a:round/>
+                      <a:headEnd type="none" w="med" len="med"/>
+                      <a:tailEnd type="none" w="med" len="med"/>
+                    </a:lnT>
+                    <a:lnB w="19050" cap="flat" cmpd="sng" algn="ctr">
+                      <a:solidFill>
+                        <a:schemeClr val="bg1"/>
+                      </a:solidFill>
+                      <a:prstDash val="solid"/>
+                      <a:round/>
+                      <a:headEnd type="none" w="med" len="med"/>
+                      <a:tailEnd type="none" w="med" len="med"/>
+                    </a:lnB>
+                    <a:noFill/>
+                  </a:tcPr>
+                </a:tc>
+                <a:extLst>
+                  <a:ext uri="{0D108BD9-81ED-4DB2-BD59-A6C34878D82A}">
+                    <a16:rowId xmlns:a16="http://schemas.microsoft.com/office/drawing/2014/main" val="3206921140"/>
+                  </a:ext>
+                </a:extLst>
+              </a:tr>
+              <a:tr h="252000">
+                <a:tc>
+                  <a:txBody>
+                    <a:bodyPr/>
+                    <a:lstStyle/>
+                    <a:p>
+                      <a:pPr algn="ctr" fontAlgn="ctr"/>
+                      <a:endParaRPr lang="pt-BR" sz="1400" b="0" i="0" u="none" strike="noStrike" dirty="0">
+                        <a:solidFill>
+                          <a:schemeClr val="tx2"/>
+                        </a:solidFill>
+                        <a:effectLst/>
+                        <a:latin typeface="Arial" panose="020B0604020202020204" pitchFamily="34" charset="0"/>
+                        <a:cs typeface="Arial" panose="020B0604020202020204" pitchFamily="34" charset="0"/>
+                      </a:endParaRPr>
+                    </a:p>
+                  </a:txBody>
+                  <a:tcPr marL="6350" marR="6350" marT="6350" marB="0" anchor="ctr">
+                    <a:lnL w="19050" cap="flat" cmpd="sng" algn="ctr">
+                      <a:solidFill>
+                        <a:schemeClr val="bg1"/>
+                      </a:solidFill>
+                      <a:prstDash val="solid"/>
+                      <a:round/>
+                      <a:headEnd type="none" w="med" len="med"/>
+                      <a:tailEnd type="none" w="med" len="med"/>
+                    </a:lnL>
+                    <a:lnR w="19050" cap="flat" cmpd="sng" algn="ctr">
+                      <a:solidFill>
+                        <a:schemeClr val="bg1"/>
+                      </a:solidFill>
+                      <a:prstDash val="solid"/>
+                      <a:round/>
+                      <a:headEnd type="none" w="med" len="med"/>
+                      <a:tailEnd type="none" w="med" len="med"/>
+                    </a:lnR>
+                    <a:lnT w="19050" cap="flat" cmpd="sng" algn="ctr">
+                      <a:solidFill>
+                        <a:schemeClr val="bg1"/>
+                      </a:solidFill>
+                      <a:prstDash val="solid"/>
+                      <a:round/>
+                      <a:headEnd type="none" w="med" len="med"/>
+                      <a:tailEnd type="none" w="med" len="med"/>
+                    </a:lnT>
+                    <a:lnB w="19050" cap="flat" cmpd="sng" algn="ctr">
+                      <a:solidFill>
+                        <a:schemeClr val="bg1"/>
+                      </a:solidFill>
+                      <a:prstDash val="solid"/>
+                      <a:round/>
+                      <a:headEnd type="none" w="med" len="med"/>
+                      <a:tailEnd type="none" w="med" len="med"/>
+                    </a:lnB>
+                    <a:solidFill>
+                      <a:srgbClr val="FFFF00"/>
+                    </a:solidFill>
+                  </a:tcPr>
+                </a:tc>
+                <a:tc>
+                  <a:txBody>
+                    <a:bodyPr/>
+                    <a:lstStyle/>
+                    <a:p>
+                      <a:pPr algn="ctr" fontAlgn="ctr"/>
+                      <a:endParaRPr lang="pt-BR" sz="1400" b="0" i="0" u="none" strike="noStrike">
+                        <a:solidFill>
+                          <a:schemeClr val="tx2"/>
+                        </a:solidFill>
+                        <a:effectLst/>
+                        <a:latin typeface="Arial" panose="020B0604020202020204" pitchFamily="34" charset="0"/>
+                        <a:cs typeface="Arial" panose="020B0604020202020204" pitchFamily="34" charset="0"/>
+                      </a:endParaRPr>
+                    </a:p>
+                  </a:txBody>
+                  <a:tcPr marL="6350" marR="6350" marT="6350" marB="0" anchor="ctr">
+                    <a:lnL w="19050" cap="flat" cmpd="sng" algn="ctr">
+                      <a:solidFill>
+                        <a:schemeClr val="bg1"/>
+                      </a:solidFill>
+                      <a:prstDash val="solid"/>
+                      <a:round/>
+                      <a:headEnd type="none" w="med" len="med"/>
+                      <a:tailEnd type="none" w="med" len="med"/>
+                    </a:lnL>
+                    <a:lnR w="19050" cap="flat" cmpd="sng" algn="ctr">
+                      <a:solidFill>
+                        <a:schemeClr val="bg1"/>
+                      </a:solidFill>
+                      <a:prstDash val="solid"/>
+                      <a:round/>
+                      <a:headEnd type="none" w="med" len="med"/>
+                      <a:tailEnd type="none" w="med" len="med"/>
+                    </a:lnR>
+                    <a:lnT w="19050" cap="flat" cmpd="sng" algn="ctr">
+                      <a:solidFill>
+                        <a:schemeClr val="bg1"/>
+                      </a:solidFill>
+                      <a:prstDash val="solid"/>
+                      <a:round/>
+                      <a:headEnd type="none" w="med" len="med"/>
+                      <a:tailEnd type="none" w="med" len="med"/>
+                    </a:lnT>
+                    <a:lnB w="19050" cap="flat" cmpd="sng" algn="ctr">
+                      <a:solidFill>
+                        <a:schemeClr val="bg1"/>
+                      </a:solidFill>
+                      <a:prstDash val="solid"/>
+                      <a:round/>
+                      <a:headEnd type="none" w="med" len="med"/>
+                      <a:tailEnd type="none" w="med" len="med"/>
+                    </a:lnB>
+                    <a:noFill/>
+                  </a:tcPr>
+                </a:tc>
+                <a:tc>
+                  <a:txBody>
+                    <a:bodyPr/>
+                    <a:lstStyle/>
+                    <a:p>
+                      <a:pPr algn="l" fontAlgn="ctr"/>
+                      <a:r>
+                        <a:rPr lang="pt-BR" sz="1400" u="none" strike="noStrike" dirty="0">
+                          <a:solidFill>
+                            <a:schemeClr val="tx2"/>
+                          </a:solidFill>
+                          <a:effectLst/>
+                          <a:latin typeface="Arial" panose="020B0604020202020204" pitchFamily="34" charset="0"/>
+                          <a:cs typeface="Arial" panose="020B0604020202020204" pitchFamily="34" charset="0"/>
+                        </a:rPr>
+                        <a:t>Otimizações</a:t>
+                      </a:r>
+                      <a:endParaRPr lang="pt-BR" sz="1400" b="0" i="0" u="none" strike="noStrike" dirty="0">
+                        <a:solidFill>
+                          <a:schemeClr val="tx2"/>
+                        </a:solidFill>
+                        <a:effectLst/>
+                        <a:latin typeface="Arial" panose="020B0604020202020204" pitchFamily="34" charset="0"/>
+                        <a:cs typeface="Arial" panose="020B0604020202020204" pitchFamily="34" charset="0"/>
+                      </a:endParaRPr>
+                    </a:p>
+                  </a:txBody>
+                  <a:tcPr marL="6350" marR="6350" marT="6350" marB="0" anchor="ctr">
+                    <a:lnL w="19050" cap="flat" cmpd="sng" algn="ctr">
+                      <a:solidFill>
+                        <a:schemeClr val="bg1"/>
+                      </a:solidFill>
+                      <a:prstDash val="solid"/>
+                      <a:round/>
+                      <a:headEnd type="none" w="med" len="med"/>
+                      <a:tailEnd type="none" w="med" len="med"/>
+                    </a:lnL>
+                    <a:lnR w="19050" cap="flat" cmpd="sng" algn="ctr">
+                      <a:solidFill>
+                        <a:schemeClr val="bg1"/>
+                      </a:solidFill>
+                      <a:prstDash val="solid"/>
+                      <a:round/>
+                      <a:headEnd type="none" w="med" len="med"/>
+                      <a:tailEnd type="none" w="med" len="med"/>
+                    </a:lnR>
+                    <a:lnT w="19050" cap="flat" cmpd="sng" algn="ctr">
+                      <a:solidFill>
+                        <a:schemeClr val="bg1"/>
+                      </a:solidFill>
+                      <a:prstDash val="solid"/>
+                      <a:round/>
+                      <a:headEnd type="none" w="med" len="med"/>
+                      <a:tailEnd type="none" w="med" len="med"/>
+                    </a:lnT>
+                    <a:lnB w="19050" cap="flat" cmpd="sng" algn="ctr">
+                      <a:solidFill>
+                        <a:schemeClr val="bg1"/>
+                      </a:solidFill>
+                      <a:prstDash val="solid"/>
+                      <a:round/>
+                      <a:headEnd type="none" w="med" len="med"/>
+                      <a:tailEnd type="none" w="med" len="med"/>
+                    </a:lnB>
+                    <a:noFill/>
+                  </a:tcPr>
+                </a:tc>
+                <a:tc>
+                  <a:txBody>
+                    <a:bodyPr/>
+                    <a:lstStyle/>
+                    <a:p>
+                      <a:pPr lvl="0" algn="ctr">
+                        <a:buNone/>
+                      </a:pPr>
+                      <a:r>
+                        <a:rPr lang="pt-BR" sz="1400" b="0" i="0" u="none" strike="noStrike" dirty="0">
+                          <a:solidFill>
+                            <a:schemeClr val="tx2"/>
+                          </a:solidFill>
+                          <a:effectLst/>
+                          <a:latin typeface="Arial"/>
+                          <a:cs typeface="Arial"/>
+                        </a:rPr>
+                        <a:t>80%</a:t>
+                      </a:r>
+                    </a:p>
+                  </a:txBody>
+                  <a:tcPr marL="0" marR="0" marT="0" marB="0" anchor="ctr">
+                    <a:lnL w="19050" cap="flat" cmpd="sng" algn="ctr">
+                      <a:solidFill>
+                        <a:schemeClr val="bg1"/>
+                      </a:solidFill>
+                      <a:prstDash val="solid"/>
+                      <a:round/>
+                      <a:headEnd type="none" w="med" len="med"/>
+                      <a:tailEnd type="none" w="med" len="med"/>
+                    </a:lnL>
+                    <a:lnR w="19050" cap="flat" cmpd="sng" algn="ctr">
+                      <a:solidFill>
+                        <a:schemeClr val="bg1"/>
+                      </a:solidFill>
+                      <a:prstDash val="solid"/>
+                      <a:round/>
+                      <a:headEnd type="none" w="med" len="med"/>
+                      <a:tailEnd type="none" w="med" len="med"/>
+                    </a:lnR>
+                    <a:lnT w="19050" cap="flat" cmpd="sng" algn="ctr">
+                      <a:solidFill>
+                        <a:schemeClr val="bg1"/>
+                      </a:solidFill>
+                      <a:prstDash val="solid"/>
+                      <a:round/>
+                      <a:headEnd type="none" w="med" len="med"/>
+                      <a:tailEnd type="none" w="med" len="med"/>
+                    </a:lnT>
+                    <a:lnB w="19050" cap="flat" cmpd="sng" algn="ctr">
+                      <a:solidFill>
+                        <a:schemeClr val="bg1"/>
+                      </a:solidFill>
+                      <a:prstDash val="solid"/>
+                      <a:round/>
+                      <a:headEnd type="none" w="med" len="med"/>
+                      <a:tailEnd type="none" w="med" len="med"/>
+                    </a:lnB>
+                    <a:noFill/>
+                  </a:tcPr>
+                </a:tc>
+                <a:extLst>
+                  <a:ext uri="{0D108BD9-81ED-4DB2-BD59-A6C34878D82A}">
+                    <a16:rowId xmlns:a16="http://schemas.microsoft.com/office/drawing/2014/main" val="2042666682"/>
+                  </a:ext>
+                </a:extLst>
+              </a:tr>
+              <a:tr h="252000">
+                <a:tc>
+                  <a:txBody>
+                    <a:bodyPr/>
+                    <a:lstStyle/>
+                    <a:p>
+                      <a:pPr algn="ctr" fontAlgn="ctr"/>
+                      <a:endParaRPr lang="pt-BR" sz="1400" b="0" i="0" u="none" strike="noStrike" dirty="0">
+                        <a:solidFill>
+                          <a:schemeClr val="tx2"/>
+                        </a:solidFill>
+                        <a:effectLst/>
+                        <a:latin typeface="Arial" panose="020B0604020202020204" pitchFamily="34" charset="0"/>
+                        <a:cs typeface="Arial" panose="020B0604020202020204" pitchFamily="34" charset="0"/>
+                      </a:endParaRPr>
+                    </a:p>
+                  </a:txBody>
+                  <a:tcPr marL="6350" marR="6350" marT="6350" marB="0" anchor="ctr">
+                    <a:lnL w="19050" cap="flat" cmpd="sng" algn="ctr">
+                      <a:solidFill>
+                        <a:schemeClr val="bg1"/>
+                      </a:solidFill>
+                      <a:prstDash val="solid"/>
+                      <a:round/>
+                      <a:headEnd type="none" w="med" len="med"/>
+                      <a:tailEnd type="none" w="med" len="med"/>
+                    </a:lnL>
+                    <a:lnR w="19050" cap="flat" cmpd="sng" algn="ctr">
+                      <a:solidFill>
+                        <a:schemeClr val="bg1"/>
+                      </a:solidFill>
+                      <a:prstDash val="solid"/>
+                      <a:round/>
+                      <a:headEnd type="none" w="med" len="med"/>
+                      <a:tailEnd type="none" w="med" len="med"/>
+                    </a:lnR>
+                    <a:lnT w="19050" cap="flat" cmpd="sng" algn="ctr">
+                      <a:solidFill>
+                        <a:schemeClr val="bg1"/>
+                      </a:solidFill>
+                      <a:prstDash val="solid"/>
+                      <a:round/>
+                      <a:headEnd type="none" w="med" len="med"/>
+                      <a:tailEnd type="none" w="med" len="med"/>
+                    </a:lnT>
+                    <a:lnB w="19050" cap="flat" cmpd="sng" algn="ctr">
+                      <a:solidFill>
+                        <a:schemeClr val="bg1"/>
+                      </a:solidFill>
+                      <a:prstDash val="solid"/>
+                      <a:round/>
+                      <a:headEnd type="none" w="med" len="med"/>
+                      <a:tailEnd type="none" w="med" len="med"/>
+                    </a:lnB>
+                    <a:solidFill>
+                      <a:schemeClr val="tx1">
+                        <a:lumMod val="50000"/>
+                        <a:lumOff val="50000"/>
+                      </a:schemeClr>
+                    </a:solidFill>
+                  </a:tcPr>
+                </a:tc>
+                <a:tc>
+                  <a:txBody>
+                    <a:bodyPr/>
+                    <a:lstStyle/>
+                    <a:p>
+                      <a:pPr algn="ctr" fontAlgn="ctr"/>
+                      <a:endParaRPr lang="pt-BR" sz="1400" b="0" i="0" u="none" strike="noStrike">
+                        <a:solidFill>
+                          <a:schemeClr val="tx2"/>
+                        </a:solidFill>
+                        <a:effectLst/>
+                        <a:latin typeface="Arial" panose="020B0604020202020204" pitchFamily="34" charset="0"/>
+                        <a:cs typeface="Arial" panose="020B0604020202020204" pitchFamily="34" charset="0"/>
+                      </a:endParaRPr>
+                    </a:p>
+                  </a:txBody>
+                  <a:tcPr marL="6350" marR="6350" marT="6350" marB="0" anchor="ctr">
+                    <a:lnL w="19050" cap="flat" cmpd="sng" algn="ctr">
+                      <a:solidFill>
+                        <a:schemeClr val="bg1"/>
+                      </a:solidFill>
+                      <a:prstDash val="solid"/>
+                      <a:round/>
+                      <a:headEnd type="none" w="med" len="med"/>
+                      <a:tailEnd type="none" w="med" len="med"/>
+                    </a:lnL>
+                    <a:lnR w="19050" cap="flat" cmpd="sng" algn="ctr">
+                      <a:solidFill>
+                        <a:schemeClr val="bg1"/>
+                      </a:solidFill>
+                      <a:prstDash val="solid"/>
+                      <a:round/>
+                      <a:headEnd type="none" w="med" len="med"/>
+                      <a:tailEnd type="none" w="med" len="med"/>
+                    </a:lnR>
+                    <a:lnT w="19050" cap="flat" cmpd="sng" algn="ctr">
+                      <a:solidFill>
+                        <a:schemeClr val="bg1"/>
+                      </a:solidFill>
+                      <a:prstDash val="solid"/>
+                      <a:round/>
+                      <a:headEnd type="none" w="med" len="med"/>
+                      <a:tailEnd type="none" w="med" len="med"/>
+                    </a:lnT>
+                    <a:lnB w="19050" cap="flat" cmpd="sng" algn="ctr">
+                      <a:solidFill>
+                        <a:schemeClr val="bg1"/>
+                      </a:solidFill>
+                      <a:prstDash val="solid"/>
+                      <a:round/>
+                      <a:headEnd type="none" w="med" len="med"/>
+                      <a:tailEnd type="none" w="med" len="med"/>
+                    </a:lnB>
+                    <a:noFill/>
+                  </a:tcPr>
+                </a:tc>
+                <a:tc>
+                  <a:txBody>
+                    <a:bodyPr/>
+                    <a:lstStyle/>
+                    <a:p>
+                      <a:pPr algn="l" fontAlgn="ctr"/>
+                      <a:r>
+                        <a:rPr lang="pt-BR" sz="1400" b="0" i="0" u="none" strike="noStrike" dirty="0">
+                          <a:solidFill>
+                            <a:schemeClr val="tx2"/>
+                          </a:solidFill>
+                          <a:effectLst/>
+                          <a:latin typeface="Arial" panose="020B0604020202020204" pitchFamily="34" charset="0"/>
+                          <a:cs typeface="Arial" panose="020B0604020202020204" pitchFamily="34" charset="0"/>
+                        </a:rPr>
+                        <a:t>Inicio melhorias</a:t>
+                      </a:r>
+                    </a:p>
+                  </a:txBody>
+                  <a:tcPr marL="6350" marR="6350" marT="6350" marB="0" anchor="ctr">
+                    <a:lnL w="19050" cap="flat" cmpd="sng" algn="ctr">
+                      <a:solidFill>
+                        <a:schemeClr val="bg1"/>
+                      </a:solidFill>
+                      <a:prstDash val="solid"/>
+                      <a:round/>
+                      <a:headEnd type="none" w="med" len="med"/>
+                      <a:tailEnd type="none" w="med" len="med"/>
+                    </a:lnL>
+                    <a:lnR w="19050" cap="flat" cmpd="sng" algn="ctr">
+                      <a:solidFill>
+                        <a:schemeClr val="bg1"/>
+                      </a:solidFill>
+                      <a:prstDash val="solid"/>
+                      <a:round/>
+                      <a:headEnd type="none" w="med" len="med"/>
+                      <a:tailEnd type="none" w="med" len="med"/>
+                    </a:lnR>
+                    <a:lnT w="19050" cap="flat" cmpd="sng" algn="ctr">
+                      <a:solidFill>
+                        <a:schemeClr val="bg1"/>
+                      </a:solidFill>
+                      <a:prstDash val="solid"/>
+                      <a:round/>
+                      <a:headEnd type="none" w="med" len="med"/>
+                      <a:tailEnd type="none" w="med" len="med"/>
+                    </a:lnT>
+                    <a:lnB w="19050" cap="flat" cmpd="sng" algn="ctr">
+                      <a:solidFill>
+                        <a:schemeClr val="bg1"/>
+                      </a:solidFill>
+                      <a:prstDash val="solid"/>
+                      <a:round/>
+                      <a:headEnd type="none" w="med" len="med"/>
+                      <a:tailEnd type="none" w="med" len="med"/>
+                    </a:lnB>
+                    <a:noFill/>
+                  </a:tcPr>
+                </a:tc>
+                <a:tc>
+                  <a:txBody>
+                    <a:bodyPr/>
+                    <a:lstStyle/>
+                    <a:p>
+                      <a:pPr lvl="0" algn="ctr">
+                        <a:buNone/>
+                      </a:pPr>
+                      <a:r>
+                        <a:rPr lang="pt-BR" sz="1400" b="0" i="0" u="none" strike="noStrike" dirty="0">
+                          <a:solidFill>
+                            <a:schemeClr val="tx2"/>
+                          </a:solidFill>
+                          <a:effectLst/>
+                          <a:latin typeface="Arial"/>
+                          <a:cs typeface="Arial"/>
+                        </a:rPr>
+                        <a:t>0%</a:t>
+                      </a:r>
+                    </a:p>
+                  </a:txBody>
+                  <a:tcPr marL="0" marR="0" marT="0" marB="0" anchor="ctr">
+                    <a:lnL w="19050" cap="flat" cmpd="sng" algn="ctr">
+                      <a:solidFill>
+                        <a:schemeClr val="bg1"/>
+                      </a:solidFill>
+                      <a:prstDash val="solid"/>
+                      <a:round/>
+                      <a:headEnd type="none" w="med" len="med"/>
+                      <a:tailEnd type="none" w="med" len="med"/>
+                    </a:lnL>
+                    <a:lnR w="19050" cap="flat" cmpd="sng" algn="ctr">
+                      <a:solidFill>
+                        <a:schemeClr val="bg1"/>
+                      </a:solidFill>
+                      <a:prstDash val="solid"/>
+                      <a:round/>
+                      <a:headEnd type="none" w="med" len="med"/>
+                      <a:tailEnd type="none" w="med" len="med"/>
+                    </a:lnR>
+                    <a:lnT w="19050" cap="flat" cmpd="sng" algn="ctr">
+                      <a:solidFill>
+                        <a:schemeClr val="bg1"/>
+                      </a:solidFill>
+                      <a:prstDash val="solid"/>
+                      <a:round/>
+                      <a:headEnd type="none" w="med" len="med"/>
+                      <a:tailEnd type="none" w="med" len="med"/>
+                    </a:lnT>
+                    <a:lnB w="19050" cap="flat" cmpd="sng" algn="ctr">
+                      <a:solidFill>
+                        <a:schemeClr val="bg1"/>
+                      </a:solidFill>
+                      <a:prstDash val="solid"/>
+                      <a:round/>
+                      <a:headEnd type="none" w="med" len="med"/>
+                      <a:tailEnd type="none" w="med" len="med"/>
+                    </a:lnB>
+                    <a:noFill/>
+                  </a:tcPr>
+                </a:tc>
+                <a:extLst>
+                  <a:ext uri="{0D108BD9-81ED-4DB2-BD59-A6C34878D82A}">
+                    <a16:rowId xmlns:a16="http://schemas.microsoft.com/office/drawing/2014/main" val="1508046890"/>
+                  </a:ext>
+                </a:extLst>
+              </a:tr>
+              <a:tr h="252000">
+                <a:tc>
+                  <a:txBody>
+                    <a:bodyPr/>
+                    <a:lstStyle/>
+                    <a:p>
+                      <a:pPr algn="ctr" fontAlgn="ctr"/>
+                      <a:endParaRPr lang="pt-BR" sz="1400" b="0" i="0" u="none" strike="noStrike" dirty="0">
+                        <a:solidFill>
+                          <a:schemeClr val="tx2"/>
+                        </a:solidFill>
+                        <a:effectLst/>
+                        <a:latin typeface="Arial" panose="020B0604020202020204" pitchFamily="34" charset="0"/>
+                        <a:cs typeface="Arial" panose="020B0604020202020204" pitchFamily="34" charset="0"/>
+                      </a:endParaRPr>
+                    </a:p>
+                  </a:txBody>
+                  <a:tcPr marL="6350" marR="6350" marT="6350" marB="0" anchor="ctr">
+                    <a:lnL w="19050" cap="flat" cmpd="sng" algn="ctr">
+                      <a:solidFill>
+                        <a:schemeClr val="bg1"/>
+                      </a:solidFill>
+                      <a:prstDash val="solid"/>
+                      <a:round/>
+                      <a:headEnd type="none" w="med" len="med"/>
+                      <a:tailEnd type="none" w="med" len="med"/>
+                    </a:lnL>
+                    <a:lnR w="19050" cap="flat" cmpd="sng" algn="ctr">
+                      <a:solidFill>
+                        <a:schemeClr val="bg1"/>
+                      </a:solidFill>
+                      <a:prstDash val="solid"/>
+                      <a:round/>
+                      <a:headEnd type="none" w="med" len="med"/>
+                      <a:tailEnd type="none" w="med" len="med"/>
+                    </a:lnR>
+                    <a:lnT w="19050" cap="flat" cmpd="sng" algn="ctr">
+                      <a:solidFill>
+                        <a:schemeClr val="bg1"/>
+                      </a:solidFill>
+                      <a:prstDash val="solid"/>
+                      <a:round/>
+                      <a:headEnd type="none" w="med" len="med"/>
+                      <a:tailEnd type="none" w="med" len="med"/>
+                    </a:lnT>
+                    <a:lnB w="19050" cap="flat" cmpd="sng" algn="ctr">
+                      <a:solidFill>
+                        <a:schemeClr val="bg1"/>
+                      </a:solidFill>
+                      <a:prstDash val="solid"/>
+                      <a:round/>
+                      <a:headEnd type="none" w="med" len="med"/>
+                      <a:tailEnd type="none" w="med" len="med"/>
+                    </a:lnB>
+                    <a:solidFill>
+                      <a:schemeClr val="tx1">
+                        <a:lumMod val="50000"/>
+                        <a:lumOff val="50000"/>
+                      </a:schemeClr>
+                    </a:solidFill>
+                  </a:tcPr>
+                </a:tc>
+                <a:tc>
+                  <a:txBody>
+                    <a:bodyPr/>
+                    <a:lstStyle/>
+                    <a:p>
+                      <a:pPr algn="ctr" fontAlgn="ctr"/>
+                      <a:endParaRPr lang="pt-BR" sz="1400" b="0" i="0" u="none" strike="noStrike">
+                        <a:solidFill>
+                          <a:schemeClr val="tx2"/>
+                        </a:solidFill>
+                        <a:effectLst/>
+                        <a:latin typeface="Arial" panose="020B0604020202020204" pitchFamily="34" charset="0"/>
+                        <a:cs typeface="Arial" panose="020B0604020202020204" pitchFamily="34" charset="0"/>
+                      </a:endParaRPr>
+                    </a:p>
+                  </a:txBody>
+                  <a:tcPr marL="6350" marR="6350" marT="6350" marB="0" anchor="ctr">
+                    <a:lnL w="19050" cap="flat" cmpd="sng" algn="ctr">
+                      <a:solidFill>
+                        <a:schemeClr val="bg1"/>
+                      </a:solidFill>
+                      <a:prstDash val="solid"/>
+                      <a:round/>
+                      <a:headEnd type="none" w="med" len="med"/>
+                      <a:tailEnd type="none" w="med" len="med"/>
+                    </a:lnL>
+                    <a:lnR w="19050" cap="flat" cmpd="sng" algn="ctr">
+                      <a:solidFill>
+                        <a:schemeClr val="bg1"/>
+                      </a:solidFill>
+                      <a:prstDash val="solid"/>
+                      <a:round/>
+                      <a:headEnd type="none" w="med" len="med"/>
+                      <a:tailEnd type="none" w="med" len="med"/>
+                    </a:lnR>
+                    <a:lnT w="19050" cap="flat" cmpd="sng" algn="ctr">
+                      <a:solidFill>
+                        <a:schemeClr val="bg1"/>
+                      </a:solidFill>
+                      <a:prstDash val="solid"/>
+                      <a:round/>
+                      <a:headEnd type="none" w="med" len="med"/>
+                      <a:tailEnd type="none" w="med" len="med"/>
+                    </a:lnT>
+                    <a:lnB w="19050" cap="flat" cmpd="sng" algn="ctr">
+                      <a:solidFill>
+                        <a:schemeClr val="bg1"/>
+                      </a:solidFill>
+                      <a:prstDash val="solid"/>
+                      <a:round/>
+                      <a:headEnd type="none" w="med" len="med"/>
+                      <a:tailEnd type="none" w="med" len="med"/>
+                    </a:lnB>
+                    <a:noFill/>
+                  </a:tcPr>
+                </a:tc>
+                <a:tc>
+                  <a:txBody>
+                    <a:bodyPr/>
+                    <a:lstStyle/>
+                    <a:p>
+                      <a:pPr algn="l" fontAlgn="ctr"/>
+                      <a:r>
+                        <a:rPr lang="pt-BR" sz="1400" u="none" strike="noStrike" dirty="0">
+                          <a:solidFill>
+                            <a:schemeClr val="tx2"/>
+                          </a:solidFill>
+                          <a:effectLst/>
+                          <a:latin typeface="Arial" panose="020B0604020202020204" pitchFamily="34" charset="0"/>
+                          <a:cs typeface="Arial" panose="020B0604020202020204" pitchFamily="34" charset="0"/>
+                        </a:rPr>
+                        <a:t>Implementação</a:t>
+                      </a:r>
+                      <a:endParaRPr lang="pt-BR" sz="1400" b="0" i="0" u="none" strike="noStrike" dirty="0">
+                        <a:solidFill>
+                          <a:schemeClr val="tx2"/>
+                        </a:solidFill>
+                        <a:effectLst/>
+                        <a:latin typeface="Arial" panose="020B0604020202020204" pitchFamily="34" charset="0"/>
+                        <a:cs typeface="Arial" panose="020B0604020202020204" pitchFamily="34" charset="0"/>
+                      </a:endParaRPr>
+                    </a:p>
+                  </a:txBody>
+                  <a:tcPr marL="6350" marR="6350" marT="6350" marB="0" anchor="ctr">
+                    <a:lnL w="19050" cap="flat" cmpd="sng" algn="ctr">
+                      <a:solidFill>
+                        <a:schemeClr val="bg1"/>
+                      </a:solidFill>
+                      <a:prstDash val="solid"/>
+                      <a:round/>
+                      <a:headEnd type="none" w="med" len="med"/>
+                      <a:tailEnd type="none" w="med" len="med"/>
+                    </a:lnL>
+                    <a:lnR w="19050" cap="flat" cmpd="sng" algn="ctr">
+                      <a:solidFill>
+                        <a:schemeClr val="bg1"/>
+                      </a:solidFill>
+                      <a:prstDash val="solid"/>
+                      <a:round/>
+                      <a:headEnd type="none" w="med" len="med"/>
+                      <a:tailEnd type="none" w="med" len="med"/>
+                    </a:lnR>
+                    <a:lnT w="19050" cap="flat" cmpd="sng" algn="ctr">
+                      <a:solidFill>
+                        <a:schemeClr val="bg1"/>
+                      </a:solidFill>
+                      <a:prstDash val="solid"/>
+                      <a:round/>
+                      <a:headEnd type="none" w="med" len="med"/>
+                      <a:tailEnd type="none" w="med" len="med"/>
+                    </a:lnT>
+                    <a:lnB w="19050" cap="flat" cmpd="sng" algn="ctr">
+                      <a:solidFill>
+                        <a:schemeClr val="bg1"/>
+                      </a:solidFill>
+                      <a:prstDash val="solid"/>
+                      <a:round/>
+                      <a:headEnd type="none" w="med" len="med"/>
+                      <a:tailEnd type="none" w="med" len="med"/>
+                    </a:lnB>
+                    <a:noFill/>
+                  </a:tcPr>
+                </a:tc>
+                <a:tc>
+                  <a:txBody>
+                    <a:bodyPr/>
+                    <a:lstStyle/>
+                    <a:p>
+                      <a:pPr lvl="0" algn="ctr">
+                        <a:buNone/>
+                      </a:pPr>
+                      <a:r>
+                        <a:rPr lang="pt-BR" sz="1400" b="0" i="0" u="none" strike="noStrike" dirty="0">
+                          <a:solidFill>
+                            <a:schemeClr val="tx2"/>
+                          </a:solidFill>
+                          <a:effectLst/>
+                          <a:latin typeface="Arial"/>
+                          <a:cs typeface="Arial"/>
+                        </a:rPr>
+                        <a:t>0%</a:t>
+                      </a:r>
+                    </a:p>
+                  </a:txBody>
+                  <a:tcPr marL="0" marR="0" marT="0" marB="0" anchor="ctr">
+                    <a:lnL w="19050" cap="flat" cmpd="sng" algn="ctr">
+                      <a:solidFill>
+                        <a:schemeClr val="bg1"/>
+                      </a:solidFill>
+                      <a:prstDash val="solid"/>
+                      <a:round/>
+                      <a:headEnd type="none" w="med" len="med"/>
+                      <a:tailEnd type="none" w="med" len="med"/>
+                    </a:lnL>
+                    <a:lnR w="19050" cap="flat" cmpd="sng" algn="ctr">
+                      <a:solidFill>
+                        <a:schemeClr val="bg1"/>
+                      </a:solidFill>
+                      <a:prstDash val="solid"/>
+                      <a:round/>
+                      <a:headEnd type="none" w="med" len="med"/>
+                      <a:tailEnd type="none" w="med" len="med"/>
+                    </a:lnR>
+                    <a:lnT w="19050" cap="flat" cmpd="sng" algn="ctr">
+                      <a:solidFill>
+                        <a:schemeClr val="bg1"/>
+                      </a:solidFill>
+                      <a:prstDash val="solid"/>
+                      <a:round/>
+                      <a:headEnd type="none" w="med" len="med"/>
+                      <a:tailEnd type="none" w="med" len="med"/>
+                    </a:lnT>
+                    <a:lnB w="19050" cap="flat" cmpd="sng" algn="ctr">
+                      <a:solidFill>
+                        <a:schemeClr val="bg1"/>
+                      </a:solidFill>
+                      <a:prstDash val="solid"/>
+                      <a:round/>
+                      <a:headEnd type="none" w="med" len="med"/>
+                      <a:tailEnd type="none" w="med" len="med"/>
+                    </a:lnB>
+                    <a:noFill/>
+                  </a:tcPr>
+                </a:tc>
+                <a:extLst>
+                  <a:ext uri="{0D108BD9-81ED-4DB2-BD59-A6C34878D82A}">
+                    <a16:rowId xmlns:a16="http://schemas.microsoft.com/office/drawing/2014/main" val="1683099304"/>
+                  </a:ext>
+                </a:extLst>
+              </a:tr>
+            </a:tbl>
+          </a:graphicData>
+        </a:graphic>
+      </p:graphicFrame>
     </p:spTree>
     <p:extLst>
       <p:ext uri="{BB962C8B-B14F-4D97-AF65-F5344CB8AC3E}">
-        <p14:creationId xmlns:p14="http://schemas.microsoft.com/office/powerpoint/2010/main" val="3550694143"/>
+        <p14:creationId xmlns:p14="http://schemas.microsoft.com/office/powerpoint/2010/main" val="3715639504"/>
       </p:ext>
     </p:extLst>
   </p:cSld>
@@ -18501,23 +18582,6 @@
 </file>
 
 <file path=customXml/item1.xml><?xml version="1.0" encoding="utf-8"?>
-<?mso-contentType ?>
-<FormTemplates xmlns="http://schemas.microsoft.com/sharepoint/v3/contenttype/forms">
-  <Display>DocumentLibraryForm</Display>
-  <Edit>DocumentLibraryForm</Edit>
-  <New>DocumentLibraryForm</New>
-</FormTemplates>
-</file>
-
-<file path=customXml/item2.xml><?xml version="1.0" encoding="utf-8"?>
-<p:properties xmlns:p="http://schemas.microsoft.com/office/2006/metadata/properties" xmlns:xsi="http://www.w3.org/2001/XMLSchema-instance" xmlns:pc="http://schemas.microsoft.com/office/infopath/2007/PartnerControls">
-  <documentManagement>
-    <_activity xmlns="43b3fe5f-adb5-4775-a561-fb96bccdc956" xsi:nil="true"/>
-  </documentManagement>
-</p:properties>
-</file>
-
-<file path=customXml/item3.xml><?xml version="1.0" encoding="utf-8"?>
 <ct:contentTypeSchema xmlns:ct="http://schemas.microsoft.com/office/2006/metadata/contentType" xmlns:ma="http://schemas.microsoft.com/office/2006/metadata/properties/metaAttributes" ct:_="" ma:_="" ma:contentTypeName="Document" ma:contentTypeID="0x010100E4C7B7E119A8F44DAE7D2EC57BFB20DF" ma:contentTypeVersion="16" ma:contentTypeDescription="Create a new document." ma:contentTypeScope="" ma:versionID="23b496c71f8281f920c082abed119a09">
   <xsd:schema xmlns:xsd="http://www.w3.org/2001/XMLSchema" xmlns:xs="http://www.w3.org/2001/XMLSchema" xmlns:p="http://schemas.microsoft.com/office/2006/metadata/properties" xmlns:ns3="43b3fe5f-adb5-4775-a561-fb96bccdc956" xmlns:ns4="4ead1c3a-9639-400f-aa54-0ddf70c3e816" targetNamespace="http://schemas.microsoft.com/office/2006/metadata/properties" ma:root="true" ma:fieldsID="ecb2f5f658d77469b3c6b2498ea5de5c" ns3:_="" ns4:_="">
     <xsd:import namespace="43b3fe5f-adb5-4775-a561-fb96bccdc956"/>
@@ -18756,10 +18820,38 @@
 </ct:contentTypeSchema>
 </file>
 
+<file path=customXml/item2.xml><?xml version="1.0" encoding="utf-8"?>
+<p:properties xmlns:p="http://schemas.microsoft.com/office/2006/metadata/properties" xmlns:xsi="http://www.w3.org/2001/XMLSchema-instance" xmlns:pc="http://schemas.microsoft.com/office/infopath/2007/PartnerControls">
+  <documentManagement>
+    <_activity xmlns="43b3fe5f-adb5-4775-a561-fb96bccdc956" xsi:nil="true"/>
+  </documentManagement>
+</p:properties>
+</file>
+
+<file path=customXml/item3.xml><?xml version="1.0" encoding="utf-8"?>
+<?mso-contentType ?>
+<FormTemplates xmlns="http://schemas.microsoft.com/sharepoint/v3/contenttype/forms">
+  <Display>DocumentLibraryForm</Display>
+  <Edit>DocumentLibraryForm</Edit>
+  <New>DocumentLibraryForm</New>
+</FormTemplates>
+</file>
+
 <file path=customXml/itemProps1.xml><?xml version="1.0" encoding="utf-8"?>
-<ds:datastoreItem xmlns:ds="http://schemas.openxmlformats.org/officeDocument/2006/customXml" ds:itemID="{D4A6090A-5DF7-4587-A0D0-ED25B6920BF9}">
+<ds:datastoreItem xmlns:ds="http://schemas.openxmlformats.org/officeDocument/2006/customXml" ds:itemID="{2D569DDA-FBC4-40C1-B948-F27056FEACAE}">
   <ds:schemaRefs>
-    <ds:schemaRef ds:uri="http://schemas.microsoft.com/sharepoint/v3/contenttype/forms"/>
+    <ds:schemaRef ds:uri="43b3fe5f-adb5-4775-a561-fb96bccdc956"/>
+    <ds:schemaRef ds:uri="4ead1c3a-9639-400f-aa54-0ddf70c3e816"/>
+    <ds:schemaRef ds:uri="http://purl.org/dc/elements/1.1/"/>
+    <ds:schemaRef ds:uri="http://purl.org/dc/terms/"/>
+    <ds:schemaRef ds:uri="http://schemas.microsoft.com/internal/obd"/>
+    <ds:schemaRef ds:uri="http://schemas.microsoft.com/office/2006/documentManagement/types"/>
+    <ds:schemaRef ds:uri="http://schemas.microsoft.com/office/2006/metadata/contentType"/>
+    <ds:schemaRef ds:uri="http://schemas.microsoft.com/office/2006/metadata/properties"/>
+    <ds:schemaRef ds:uri="http://schemas.microsoft.com/office/2006/metadata/properties/metaAttributes"/>
+    <ds:schemaRef ds:uri="http://schemas.microsoft.com/office/infopath/2007/PartnerControls"/>
+    <ds:schemaRef ds:uri="http://schemas.openxmlformats.org/package/2006/metadata/core-properties"/>
+    <ds:schemaRef ds:uri="http://www.w3.org/2001/XMLSchema"/>
   </ds:schemaRefs>
 </ds:datastoreItem>
 </file>
@@ -18782,20 +18874,9 @@
 </file>
 
 <file path=customXml/itemProps3.xml><?xml version="1.0" encoding="utf-8"?>
-<ds:datastoreItem xmlns:ds="http://schemas.openxmlformats.org/officeDocument/2006/customXml" ds:itemID="{2D569DDA-FBC4-40C1-B948-F27056FEACAE}">
+<ds:datastoreItem xmlns:ds="http://schemas.openxmlformats.org/officeDocument/2006/customXml" ds:itemID="{D4A6090A-5DF7-4587-A0D0-ED25B6920BF9}">
   <ds:schemaRefs>
-    <ds:schemaRef ds:uri="43b3fe5f-adb5-4775-a561-fb96bccdc956"/>
-    <ds:schemaRef ds:uri="4ead1c3a-9639-400f-aa54-0ddf70c3e816"/>
-    <ds:schemaRef ds:uri="http://purl.org/dc/elements/1.1/"/>
-    <ds:schemaRef ds:uri="http://purl.org/dc/terms/"/>
-    <ds:schemaRef ds:uri="http://schemas.microsoft.com/internal/obd"/>
-    <ds:schemaRef ds:uri="http://schemas.microsoft.com/office/2006/documentManagement/types"/>
-    <ds:schemaRef ds:uri="http://schemas.microsoft.com/office/2006/metadata/contentType"/>
-    <ds:schemaRef ds:uri="http://schemas.microsoft.com/office/2006/metadata/properties"/>
-    <ds:schemaRef ds:uri="http://schemas.microsoft.com/office/2006/metadata/properties/metaAttributes"/>
-    <ds:schemaRef ds:uri="http://schemas.microsoft.com/office/infopath/2007/PartnerControls"/>
-    <ds:schemaRef ds:uri="http://schemas.openxmlformats.org/package/2006/metadata/core-properties"/>
-    <ds:schemaRef ds:uri="http://www.w3.org/2001/XMLSchema"/>
+    <ds:schemaRef ds:uri="http://schemas.microsoft.com/sharepoint/v3/contenttype/forms"/>
   </ds:schemaRefs>
 </ds:datastoreItem>
 </file>
</xml_diff>